<commit_message>
updated obstacle notation in cropped-instruction-color-blind-friendly.pptx
</commit_message>
<xml_diff>
--- a/XPlanningEvaluation/data/instruction/instruction-color-blind-friendly.pptx
+++ b/XPlanningEvaluation/data/instruction/instruction-color-blind-friendly.pptx
@@ -16848,1509 +16848,12 @@
           <a:chExt cx="0" cy="0"/>
         </a:xfrm>
       </p:grpSpPr>
-      <p:sp>
-        <p:nvSpPr>
-          <p:cNvPr id="3" name="TextBox 2">
+      <p:grpSp>
+        <p:nvGrpSpPr>
+          <p:cNvPr id="2" name="Group 1">
             <a:extLst>
               <a:ext uri="{FF2B5EF4-FFF2-40B4-BE49-F238E27FC236}">
-                <a16:creationId xmlns:a16="http://schemas.microsoft.com/office/drawing/2014/main" id="{2C94D679-543C-A340-A345-33F730C738E7}"/>
-              </a:ext>
-            </a:extLst>
-          </p:cNvPr>
-          <p:cNvSpPr txBox="1"/>
-          <p:nvPr/>
-        </p:nvSpPr>
-        <p:spPr>
-          <a:xfrm>
-            <a:off x="48876" y="2552327"/>
-            <a:ext cx="632289" cy="369332"/>
-          </a:xfrm>
-          <a:prstGeom prst="rect">
-            <a:avLst/>
-          </a:prstGeom>
-          <a:noFill/>
-        </p:spPr>
-        <p:txBody>
-          <a:bodyPr wrap="none" rtlCol="0">
-            <a:spAutoFit/>
-          </a:bodyPr>
-          <a:lstStyle/>
-          <a:p>
-            <a:r>
-              <a:rPr lang="en-US" dirty="0"/>
-              <a:t>Start</a:t>
-            </a:r>
-          </a:p>
-        </p:txBody>
-      </p:sp>
-      <p:sp>
-        <p:nvSpPr>
-          <p:cNvPr id="4" name="TextBox 3">
-            <a:extLst>
-              <a:ext uri="{FF2B5EF4-FFF2-40B4-BE49-F238E27FC236}">
-                <a16:creationId xmlns:a16="http://schemas.microsoft.com/office/drawing/2014/main" id="{1C522E09-4F41-034B-B36B-9CBA742CC400}"/>
-              </a:ext>
-            </a:extLst>
-          </p:cNvPr>
-          <p:cNvSpPr txBox="1"/>
-          <p:nvPr/>
-        </p:nvSpPr>
-        <p:spPr>
-          <a:xfrm>
-            <a:off x="6308726" y="2556882"/>
-            <a:ext cx="615874" cy="369332"/>
-          </a:xfrm>
-          <a:prstGeom prst="rect">
-            <a:avLst/>
-          </a:prstGeom>
-          <a:noFill/>
-        </p:spPr>
-        <p:txBody>
-          <a:bodyPr wrap="none" rtlCol="0">
-            <a:spAutoFit/>
-          </a:bodyPr>
-          <a:lstStyle/>
-          <a:p>
-            <a:r>
-              <a:rPr lang="en-US" dirty="0"/>
-              <a:t>Goal</a:t>
-            </a:r>
-          </a:p>
-        </p:txBody>
-      </p:sp>
-      <p:cxnSp>
-        <p:nvCxnSpPr>
-          <p:cNvPr id="7" name="Straight Connector 6">
-            <a:extLst>
-              <a:ext uri="{FF2B5EF4-FFF2-40B4-BE49-F238E27FC236}">
-                <a16:creationId xmlns:a16="http://schemas.microsoft.com/office/drawing/2014/main" id="{7E164774-1763-0740-BCF8-583DF131BB93}"/>
-              </a:ext>
-            </a:extLst>
-          </p:cNvPr>
-          <p:cNvCxnSpPr>
-            <a:cxnSpLocks/>
-          </p:cNvCxnSpPr>
-          <p:nvPr/>
-        </p:nvCxnSpPr>
-        <p:spPr>
-          <a:xfrm>
-            <a:off x="1508532" y="2419723"/>
-            <a:ext cx="799054" cy="0"/>
-          </a:xfrm>
-          <a:prstGeom prst="line">
-            <a:avLst/>
-          </a:prstGeom>
-          <a:ln w="114300">
-            <a:solidFill>
-              <a:srgbClr val="0000FF"/>
-            </a:solidFill>
-          </a:ln>
-        </p:spPr>
-        <p:style>
-          <a:lnRef idx="1">
-            <a:schemeClr val="accent1"/>
-          </a:lnRef>
-          <a:fillRef idx="0">
-            <a:schemeClr val="accent1"/>
-          </a:fillRef>
-          <a:effectRef idx="0">
-            <a:schemeClr val="accent1"/>
-          </a:effectRef>
-          <a:fontRef idx="minor">
-            <a:schemeClr val="tx1"/>
-          </a:fontRef>
-        </p:style>
-      </p:cxnSp>
-      <p:cxnSp>
-        <p:nvCxnSpPr>
-          <p:cNvPr id="8" name="Straight Connector 7">
-            <a:extLst>
-              <a:ext uri="{FF2B5EF4-FFF2-40B4-BE49-F238E27FC236}">
-                <a16:creationId xmlns:a16="http://schemas.microsoft.com/office/drawing/2014/main" id="{3349C344-9F1D-864B-8468-1E3AB14F84C8}"/>
-              </a:ext>
-            </a:extLst>
-          </p:cNvPr>
-          <p:cNvCxnSpPr>
-            <a:cxnSpLocks/>
-          </p:cNvCxnSpPr>
-          <p:nvPr/>
-        </p:nvCxnSpPr>
-        <p:spPr>
-          <a:xfrm>
-            <a:off x="2581906" y="2419723"/>
-            <a:ext cx="1197886" cy="0"/>
-          </a:xfrm>
-          <a:prstGeom prst="line">
-            <a:avLst/>
-          </a:prstGeom>
-          <a:ln w="114300">
-            <a:solidFill>
-              <a:srgbClr val="0000FF"/>
-            </a:solidFill>
-          </a:ln>
-        </p:spPr>
-        <p:style>
-          <a:lnRef idx="1">
-            <a:schemeClr val="accent1"/>
-          </a:lnRef>
-          <a:fillRef idx="0">
-            <a:schemeClr val="accent1"/>
-          </a:fillRef>
-          <a:effectRef idx="0">
-            <a:schemeClr val="accent1"/>
-          </a:effectRef>
-          <a:fontRef idx="minor">
-            <a:schemeClr val="tx1"/>
-          </a:fontRef>
-        </p:style>
-      </p:cxnSp>
-      <p:cxnSp>
-        <p:nvCxnSpPr>
-          <p:cNvPr id="9" name="Straight Connector 8">
-            <a:extLst>
-              <a:ext uri="{FF2B5EF4-FFF2-40B4-BE49-F238E27FC236}">
-                <a16:creationId xmlns:a16="http://schemas.microsoft.com/office/drawing/2014/main" id="{182AD316-59B5-E647-A99D-FE98C4F93D41}"/>
-              </a:ext>
-            </a:extLst>
-          </p:cNvPr>
-          <p:cNvCxnSpPr>
-            <a:cxnSpLocks/>
-          </p:cNvCxnSpPr>
-          <p:nvPr/>
-        </p:nvCxnSpPr>
-        <p:spPr>
-          <a:xfrm>
-            <a:off x="4054112" y="2419723"/>
-            <a:ext cx="1069914" cy="0"/>
-          </a:xfrm>
-          <a:prstGeom prst="line">
-            <a:avLst/>
-          </a:prstGeom>
-          <a:ln w="114300">
-            <a:solidFill>
-              <a:srgbClr val="0000FF"/>
-            </a:solidFill>
-          </a:ln>
-        </p:spPr>
-        <p:style>
-          <a:lnRef idx="1">
-            <a:schemeClr val="accent1"/>
-          </a:lnRef>
-          <a:fillRef idx="0">
-            <a:schemeClr val="accent1"/>
-          </a:fillRef>
-          <a:effectRef idx="0">
-            <a:schemeClr val="accent1"/>
-          </a:effectRef>
-          <a:fontRef idx="minor">
-            <a:schemeClr val="tx1"/>
-          </a:fontRef>
-        </p:style>
-      </p:cxnSp>
-      <p:cxnSp>
-        <p:nvCxnSpPr>
-          <p:cNvPr id="10" name="Straight Connector 9">
-            <a:extLst>
-              <a:ext uri="{FF2B5EF4-FFF2-40B4-BE49-F238E27FC236}">
-                <a16:creationId xmlns:a16="http://schemas.microsoft.com/office/drawing/2014/main" id="{33C851E7-0364-1944-A0D2-A028FDFA40E0}"/>
-              </a:ext>
-            </a:extLst>
-          </p:cNvPr>
-          <p:cNvCxnSpPr>
-            <a:cxnSpLocks/>
-            <a:endCxn id="23" idx="2"/>
-          </p:cNvCxnSpPr>
-          <p:nvPr/>
-        </p:nvCxnSpPr>
-        <p:spPr>
-          <a:xfrm>
-            <a:off x="5398346" y="2419723"/>
-            <a:ext cx="910380" cy="0"/>
-          </a:xfrm>
-          <a:prstGeom prst="line">
-            <a:avLst/>
-          </a:prstGeom>
-          <a:ln w="114300">
-            <a:solidFill>
-              <a:srgbClr val="0000FF"/>
-            </a:solidFill>
-          </a:ln>
-        </p:spPr>
-        <p:style>
-          <a:lnRef idx="1">
-            <a:schemeClr val="accent1"/>
-          </a:lnRef>
-          <a:fillRef idx="0">
-            <a:schemeClr val="accent1"/>
-          </a:fillRef>
-          <a:effectRef idx="0">
-            <a:schemeClr val="accent1"/>
-          </a:effectRef>
-          <a:fontRef idx="minor">
-            <a:schemeClr val="tx1"/>
-          </a:fontRef>
-        </p:style>
-      </p:cxnSp>
-      <p:cxnSp>
-        <p:nvCxnSpPr>
-          <p:cNvPr id="11" name="Straight Connector 10">
-            <a:extLst>
-              <a:ext uri="{FF2B5EF4-FFF2-40B4-BE49-F238E27FC236}">
-                <a16:creationId xmlns:a16="http://schemas.microsoft.com/office/drawing/2014/main" id="{CA73BAFD-63EF-7149-9677-DF9BAEDB80CD}"/>
-              </a:ext>
-            </a:extLst>
-          </p:cNvPr>
-          <p:cNvCxnSpPr>
-            <a:cxnSpLocks/>
-            <a:stCxn id="23" idx="0"/>
-          </p:cNvCxnSpPr>
-          <p:nvPr/>
-        </p:nvCxnSpPr>
-        <p:spPr>
-          <a:xfrm flipV="1">
-            <a:off x="6445886" y="1334941"/>
-            <a:ext cx="13844" cy="947622"/>
-          </a:xfrm>
-          <a:prstGeom prst="line">
-            <a:avLst/>
-          </a:prstGeom>
-          <a:ln w="38100">
-            <a:solidFill>
-              <a:schemeClr val="tx1"/>
-            </a:solidFill>
-          </a:ln>
-        </p:spPr>
-        <p:style>
-          <a:lnRef idx="1">
-            <a:schemeClr val="accent1"/>
-          </a:lnRef>
-          <a:fillRef idx="0">
-            <a:schemeClr val="accent1"/>
-          </a:fillRef>
-          <a:effectRef idx="0">
-            <a:schemeClr val="accent1"/>
-          </a:effectRef>
-          <a:fontRef idx="minor">
-            <a:schemeClr val="tx1"/>
-          </a:fontRef>
-        </p:style>
-      </p:cxnSp>
-      <p:cxnSp>
-        <p:nvCxnSpPr>
-          <p:cNvPr id="12" name="Straight Connector 11">
-            <a:extLst>
-              <a:ext uri="{FF2B5EF4-FFF2-40B4-BE49-F238E27FC236}">
-                <a16:creationId xmlns:a16="http://schemas.microsoft.com/office/drawing/2014/main" id="{EE4014C9-3444-F640-9F0E-80E18F590AE2}"/>
-              </a:ext>
-            </a:extLst>
-          </p:cNvPr>
-          <p:cNvCxnSpPr>
-            <a:cxnSpLocks/>
-            <a:stCxn id="21" idx="0"/>
-            <a:endCxn id="22" idx="4"/>
-          </p:cNvCxnSpPr>
-          <p:nvPr/>
-        </p:nvCxnSpPr>
-        <p:spPr>
-          <a:xfrm flipH="1" flipV="1">
-            <a:off x="6446520" y="383123"/>
-            <a:ext cx="1886" cy="676163"/>
-          </a:xfrm>
-          <a:prstGeom prst="line">
-            <a:avLst/>
-          </a:prstGeom>
-          <a:ln w="38100">
-            <a:solidFill>
-              <a:schemeClr val="tx1"/>
-            </a:solidFill>
-          </a:ln>
-        </p:spPr>
-        <p:style>
-          <a:lnRef idx="1">
-            <a:schemeClr val="accent1"/>
-          </a:lnRef>
-          <a:fillRef idx="0">
-            <a:schemeClr val="accent1"/>
-          </a:fillRef>
-          <a:effectRef idx="0">
-            <a:schemeClr val="accent1"/>
-          </a:effectRef>
-          <a:fontRef idx="minor">
-            <a:schemeClr val="tx1"/>
-          </a:fontRef>
-        </p:style>
-      </p:cxnSp>
-      <p:cxnSp>
-        <p:nvCxnSpPr>
-          <p:cNvPr id="13" name="Straight Connector 12">
-            <a:extLst>
-              <a:ext uri="{FF2B5EF4-FFF2-40B4-BE49-F238E27FC236}">
-                <a16:creationId xmlns:a16="http://schemas.microsoft.com/office/drawing/2014/main" id="{AD635A72-BE53-E24A-8EA4-D0567576B544}"/>
-              </a:ext>
-            </a:extLst>
-          </p:cNvPr>
-          <p:cNvCxnSpPr>
-            <a:cxnSpLocks/>
-            <a:stCxn id="21" idx="2"/>
-            <a:endCxn id="20" idx="6"/>
-          </p:cNvCxnSpPr>
-          <p:nvPr/>
-        </p:nvCxnSpPr>
-        <p:spPr>
-          <a:xfrm flipH="1">
-            <a:off x="5394960" y="1196446"/>
-            <a:ext cx="916286" cy="0"/>
-          </a:xfrm>
-          <a:prstGeom prst="line">
-            <a:avLst/>
-          </a:prstGeom>
-          <a:ln w="38100">
-            <a:solidFill>
-              <a:schemeClr val="tx1"/>
-            </a:solidFill>
-          </a:ln>
-        </p:spPr>
-        <p:style>
-          <a:lnRef idx="1">
-            <a:schemeClr val="accent1"/>
-          </a:lnRef>
-          <a:fillRef idx="0">
-            <a:schemeClr val="accent1"/>
-          </a:fillRef>
-          <a:effectRef idx="0">
-            <a:schemeClr val="accent1"/>
-          </a:effectRef>
-          <a:fontRef idx="minor">
-            <a:schemeClr val="tx1"/>
-          </a:fontRef>
-        </p:style>
-      </p:cxnSp>
-      <p:cxnSp>
-        <p:nvCxnSpPr>
-          <p:cNvPr id="14" name="Straight Connector 13">
-            <a:extLst>
-              <a:ext uri="{FF2B5EF4-FFF2-40B4-BE49-F238E27FC236}">
-                <a16:creationId xmlns:a16="http://schemas.microsoft.com/office/drawing/2014/main" id="{5DB123DA-C920-6840-A0B9-FC89E51A04D7}"/>
-              </a:ext>
-            </a:extLst>
-          </p:cNvPr>
-          <p:cNvCxnSpPr>
-            <a:cxnSpLocks/>
-            <a:stCxn id="20" idx="2"/>
-            <a:endCxn id="19" idx="6"/>
-          </p:cNvCxnSpPr>
-          <p:nvPr/>
-        </p:nvCxnSpPr>
-        <p:spPr>
-          <a:xfrm flipH="1">
-            <a:off x="4050792" y="1196446"/>
-            <a:ext cx="1069848" cy="0"/>
-          </a:xfrm>
-          <a:prstGeom prst="line">
-            <a:avLst/>
-          </a:prstGeom>
-          <a:ln w="38100">
-            <a:solidFill>
-              <a:schemeClr val="tx1"/>
-            </a:solidFill>
-          </a:ln>
-        </p:spPr>
-        <p:style>
-          <a:lnRef idx="1">
-            <a:schemeClr val="accent1"/>
-          </a:lnRef>
-          <a:fillRef idx="0">
-            <a:schemeClr val="accent1"/>
-          </a:fillRef>
-          <a:effectRef idx="0">
-            <a:schemeClr val="accent1"/>
-          </a:effectRef>
-          <a:fontRef idx="minor">
-            <a:schemeClr val="tx1"/>
-          </a:fontRef>
-        </p:style>
-      </p:cxnSp>
-      <p:cxnSp>
-        <p:nvCxnSpPr>
-          <p:cNvPr id="15" name="Straight Connector 14">
-            <a:extLst>
-              <a:ext uri="{FF2B5EF4-FFF2-40B4-BE49-F238E27FC236}">
-                <a16:creationId xmlns:a16="http://schemas.microsoft.com/office/drawing/2014/main" id="{2F26FDCA-C8E3-1349-87BA-3A7EB30606B7}"/>
-              </a:ext>
-            </a:extLst>
-          </p:cNvPr>
-          <p:cNvCxnSpPr>
-            <a:cxnSpLocks/>
-            <a:stCxn id="19" idx="2"/>
-            <a:endCxn id="18" idx="6"/>
-          </p:cNvCxnSpPr>
-          <p:nvPr/>
-        </p:nvCxnSpPr>
-        <p:spPr>
-          <a:xfrm flipH="1">
-            <a:off x="2578608" y="1196446"/>
-            <a:ext cx="1197864" cy="0"/>
-          </a:xfrm>
-          <a:prstGeom prst="line">
-            <a:avLst/>
-          </a:prstGeom>
-          <a:ln w="38100">
-            <a:solidFill>
-              <a:schemeClr val="tx1"/>
-            </a:solidFill>
-          </a:ln>
-        </p:spPr>
-        <p:style>
-          <a:lnRef idx="1">
-            <a:schemeClr val="accent1"/>
-          </a:lnRef>
-          <a:fillRef idx="0">
-            <a:schemeClr val="accent1"/>
-          </a:fillRef>
-          <a:effectRef idx="0">
-            <a:schemeClr val="accent1"/>
-          </a:effectRef>
-          <a:fontRef idx="minor">
-            <a:schemeClr val="tx1"/>
-          </a:fontRef>
-        </p:style>
-      </p:cxnSp>
-      <p:cxnSp>
-        <p:nvCxnSpPr>
-          <p:cNvPr id="16" name="Straight Connector 15">
-            <a:extLst>
-              <a:ext uri="{FF2B5EF4-FFF2-40B4-BE49-F238E27FC236}">
-                <a16:creationId xmlns:a16="http://schemas.microsoft.com/office/drawing/2014/main" id="{E5454824-1BC6-F740-A27E-0CEAEB85FB4E}"/>
-              </a:ext>
-            </a:extLst>
-          </p:cNvPr>
-          <p:cNvCxnSpPr>
-            <a:cxnSpLocks/>
-          </p:cNvCxnSpPr>
-          <p:nvPr/>
-        </p:nvCxnSpPr>
-        <p:spPr>
-          <a:xfrm flipH="1">
-            <a:off x="2444746" y="1334940"/>
-            <a:ext cx="8890" cy="947623"/>
-          </a:xfrm>
-          <a:prstGeom prst="line">
-            <a:avLst/>
-          </a:prstGeom>
-          <a:ln w="38100">
-            <a:solidFill>
-              <a:schemeClr val="tx1"/>
-            </a:solidFill>
-          </a:ln>
-        </p:spPr>
-        <p:style>
-          <a:lnRef idx="1">
-            <a:schemeClr val="accent1"/>
-          </a:lnRef>
-          <a:fillRef idx="0">
-            <a:schemeClr val="accent1"/>
-          </a:fillRef>
-          <a:effectRef idx="0">
-            <a:schemeClr val="accent1"/>
-          </a:effectRef>
-          <a:fontRef idx="minor">
-            <a:schemeClr val="tx1"/>
-          </a:fontRef>
-        </p:style>
-      </p:cxnSp>
-      <p:cxnSp>
-        <p:nvCxnSpPr>
-          <p:cNvPr id="17" name="Straight Connector 16">
-            <a:extLst>
-              <a:ext uri="{FF2B5EF4-FFF2-40B4-BE49-F238E27FC236}">
-                <a16:creationId xmlns:a16="http://schemas.microsoft.com/office/drawing/2014/main" id="{1E46AB9E-02B0-2B49-BEE4-A32F2768318A}"/>
-              </a:ext>
-            </a:extLst>
-          </p:cNvPr>
-          <p:cNvCxnSpPr>
-            <a:cxnSpLocks/>
-          </p:cNvCxnSpPr>
-          <p:nvPr/>
-        </p:nvCxnSpPr>
-        <p:spPr>
-          <a:xfrm>
-            <a:off x="5261186" y="1334940"/>
-            <a:ext cx="0" cy="938733"/>
-          </a:xfrm>
-          <a:prstGeom prst="line">
-            <a:avLst/>
-          </a:prstGeom>
-          <a:ln w="38100">
-            <a:solidFill>
-              <a:schemeClr val="tx1"/>
-            </a:solidFill>
-          </a:ln>
-        </p:spPr>
-        <p:style>
-          <a:lnRef idx="1">
-            <a:schemeClr val="accent1"/>
-          </a:lnRef>
-          <a:fillRef idx="0">
-            <a:schemeClr val="accent1"/>
-          </a:fillRef>
-          <a:effectRef idx="0">
-            <a:schemeClr val="accent1"/>
-          </a:effectRef>
-          <a:fontRef idx="minor">
-            <a:schemeClr val="tx1"/>
-          </a:fontRef>
-        </p:style>
-      </p:cxnSp>
-      <p:sp>
-        <p:nvSpPr>
-          <p:cNvPr id="18" name="Oval 17">
-            <a:extLst>
-              <a:ext uri="{FF2B5EF4-FFF2-40B4-BE49-F238E27FC236}">
-                <a16:creationId xmlns:a16="http://schemas.microsoft.com/office/drawing/2014/main" id="{ACF6D42E-97A0-6440-9E31-4835DB55D85D}"/>
-              </a:ext>
-            </a:extLst>
-          </p:cNvPr>
-          <p:cNvSpPr>
-            <a:spLocks noChangeAspect="1"/>
-          </p:cNvSpPr>
-          <p:nvPr/>
-        </p:nvSpPr>
-        <p:spPr>
-          <a:xfrm>
-            <a:off x="2304288" y="1059286"/>
-            <a:ext cx="274320" cy="274320"/>
-          </a:xfrm>
-          <a:prstGeom prst="ellipse">
-            <a:avLst/>
-          </a:prstGeom>
-          <a:solidFill>
-            <a:srgbClr val="00FF00"/>
-          </a:solidFill>
-          <a:ln w="19050">
-            <a:solidFill>
-              <a:schemeClr val="tx1"/>
-            </a:solidFill>
-          </a:ln>
-        </p:spPr>
-        <p:style>
-          <a:lnRef idx="2">
-            <a:schemeClr val="accent1">
-              <a:shade val="50000"/>
-            </a:schemeClr>
-          </a:lnRef>
-          <a:fillRef idx="1">
-            <a:schemeClr val="accent1"/>
-          </a:fillRef>
-          <a:effectRef idx="0">
-            <a:schemeClr val="accent1"/>
-          </a:effectRef>
-          <a:fontRef idx="minor">
-            <a:schemeClr val="lt1"/>
-          </a:fontRef>
-        </p:style>
-        <p:txBody>
-          <a:bodyPr rtlCol="0" anchor="ctr"/>
-          <a:lstStyle/>
-          <a:p>
-            <a:pPr algn="ctr"/>
-            <a:r>
-              <a:rPr lang="en-US" sz="1600" dirty="0">
-                <a:solidFill>
-                  <a:schemeClr val="tx1"/>
-                </a:solidFill>
-              </a:rPr>
-              <a:t>8</a:t>
-            </a:r>
-          </a:p>
-        </p:txBody>
-      </p:sp>
-      <p:sp>
-        <p:nvSpPr>
-          <p:cNvPr id="19" name="Oval 18">
-            <a:extLst>
-              <a:ext uri="{FF2B5EF4-FFF2-40B4-BE49-F238E27FC236}">
-                <a16:creationId xmlns:a16="http://schemas.microsoft.com/office/drawing/2014/main" id="{AE81604C-95FA-7440-9242-11FB4B5C8DF7}"/>
-              </a:ext>
-            </a:extLst>
-          </p:cNvPr>
-          <p:cNvSpPr>
-            <a:spLocks noChangeAspect="1"/>
-          </p:cNvSpPr>
-          <p:nvPr/>
-        </p:nvSpPr>
-        <p:spPr>
-          <a:xfrm>
-            <a:off x="3776472" y="1059286"/>
-            <a:ext cx="274320" cy="274320"/>
-          </a:xfrm>
-          <a:prstGeom prst="ellipse">
-            <a:avLst/>
-          </a:prstGeom>
-          <a:solidFill>
-            <a:srgbClr val="00FF00"/>
-          </a:solidFill>
-          <a:ln w="19050">
-            <a:solidFill>
-              <a:schemeClr val="tx1"/>
-            </a:solidFill>
-          </a:ln>
-        </p:spPr>
-        <p:style>
-          <a:lnRef idx="2">
-            <a:schemeClr val="accent1">
-              <a:shade val="50000"/>
-            </a:schemeClr>
-          </a:lnRef>
-          <a:fillRef idx="1">
-            <a:schemeClr val="accent1"/>
-          </a:fillRef>
-          <a:effectRef idx="0">
-            <a:schemeClr val="accent1"/>
-          </a:effectRef>
-          <a:fontRef idx="minor">
-            <a:schemeClr val="lt1"/>
-          </a:fontRef>
-        </p:style>
-        <p:txBody>
-          <a:bodyPr rtlCol="0" anchor="ctr"/>
-          <a:lstStyle/>
-          <a:p>
-            <a:pPr algn="ctr"/>
-            <a:r>
-              <a:rPr lang="en-US" sz="1600" dirty="0">
-                <a:solidFill>
-                  <a:schemeClr val="tx1"/>
-                </a:solidFill>
-              </a:rPr>
-              <a:t>9</a:t>
-            </a:r>
-          </a:p>
-        </p:txBody>
-      </p:sp>
-      <p:sp>
-        <p:nvSpPr>
-          <p:cNvPr id="20" name="Oval 19">
-            <a:extLst>
-              <a:ext uri="{FF2B5EF4-FFF2-40B4-BE49-F238E27FC236}">
-                <a16:creationId xmlns:a16="http://schemas.microsoft.com/office/drawing/2014/main" id="{0B877335-667F-0747-99D9-B05F9C40C785}"/>
-              </a:ext>
-            </a:extLst>
-          </p:cNvPr>
-          <p:cNvSpPr>
-            <a:spLocks noChangeAspect="1"/>
-          </p:cNvSpPr>
-          <p:nvPr/>
-        </p:nvSpPr>
-        <p:spPr>
-          <a:xfrm>
-            <a:off x="5120640" y="1059286"/>
-            <a:ext cx="274320" cy="274320"/>
-          </a:xfrm>
-          <a:prstGeom prst="ellipse">
-            <a:avLst/>
-          </a:prstGeom>
-          <a:solidFill>
-            <a:srgbClr val="00FF00"/>
-          </a:solidFill>
-          <a:ln w="19050">
-            <a:solidFill>
-              <a:schemeClr val="tx1"/>
-            </a:solidFill>
-          </a:ln>
-        </p:spPr>
-        <p:style>
-          <a:lnRef idx="2">
-            <a:schemeClr val="accent1">
-              <a:shade val="50000"/>
-            </a:schemeClr>
-          </a:lnRef>
-          <a:fillRef idx="1">
-            <a:schemeClr val="accent1"/>
-          </a:fillRef>
-          <a:effectRef idx="0">
-            <a:schemeClr val="accent1"/>
-          </a:effectRef>
-          <a:fontRef idx="minor">
-            <a:schemeClr val="lt1"/>
-          </a:fontRef>
-        </p:style>
-        <p:txBody>
-          <a:bodyPr rtlCol="0" anchor="ctr"/>
-          <a:lstStyle/>
-          <a:p>
-            <a:pPr algn="ctr"/>
-            <a:endParaRPr lang="en-US" sz="1050" dirty="0">
-              <a:solidFill>
-                <a:schemeClr val="tx1"/>
-              </a:solidFill>
-            </a:endParaRPr>
-          </a:p>
-        </p:txBody>
-      </p:sp>
-      <p:sp>
-        <p:nvSpPr>
-          <p:cNvPr id="21" name="Oval 20">
-            <a:extLst>
-              <a:ext uri="{FF2B5EF4-FFF2-40B4-BE49-F238E27FC236}">
-                <a16:creationId xmlns:a16="http://schemas.microsoft.com/office/drawing/2014/main" id="{089FC56E-F653-684C-B028-F479008635A1}"/>
-              </a:ext>
-            </a:extLst>
-          </p:cNvPr>
-          <p:cNvSpPr>
-            <a:spLocks noChangeAspect="1"/>
-          </p:cNvSpPr>
-          <p:nvPr/>
-        </p:nvSpPr>
-        <p:spPr>
-          <a:xfrm>
-            <a:off x="6311246" y="1059286"/>
-            <a:ext cx="274320" cy="274320"/>
-          </a:xfrm>
-          <a:prstGeom prst="ellipse">
-            <a:avLst/>
-          </a:prstGeom>
-          <a:solidFill>
-            <a:srgbClr val="00FF00"/>
-          </a:solidFill>
-          <a:ln w="19050">
-            <a:solidFill>
-              <a:schemeClr val="tx1"/>
-            </a:solidFill>
-          </a:ln>
-        </p:spPr>
-        <p:style>
-          <a:lnRef idx="2">
-            <a:schemeClr val="accent1">
-              <a:shade val="50000"/>
-            </a:schemeClr>
-          </a:lnRef>
-          <a:fillRef idx="1">
-            <a:schemeClr val="accent1"/>
-          </a:fillRef>
-          <a:effectRef idx="0">
-            <a:schemeClr val="accent1"/>
-          </a:effectRef>
-          <a:fontRef idx="minor">
-            <a:schemeClr val="lt1"/>
-          </a:fontRef>
-        </p:style>
-        <p:txBody>
-          <a:bodyPr rtlCol="0" anchor="ctr"/>
-          <a:lstStyle/>
-          <a:p>
-            <a:pPr algn="ctr"/>
-            <a:endParaRPr lang="en-US" sz="1600" dirty="0">
-              <a:solidFill>
-                <a:schemeClr val="accent1">
-                  <a:lumMod val="50000"/>
-                </a:schemeClr>
-              </a:solidFill>
-            </a:endParaRPr>
-          </a:p>
-        </p:txBody>
-      </p:sp>
-      <p:sp>
-        <p:nvSpPr>
-          <p:cNvPr id="22" name="Oval 21">
-            <a:extLst>
-              <a:ext uri="{FF2B5EF4-FFF2-40B4-BE49-F238E27FC236}">
-                <a16:creationId xmlns:a16="http://schemas.microsoft.com/office/drawing/2014/main" id="{4531E7E0-079E-0241-9CB5-BED10A6BE5A8}"/>
-              </a:ext>
-            </a:extLst>
-          </p:cNvPr>
-          <p:cNvSpPr>
-            <a:spLocks noChangeAspect="1"/>
-          </p:cNvSpPr>
-          <p:nvPr/>
-        </p:nvSpPr>
-        <p:spPr>
-          <a:xfrm>
-            <a:off x="6309360" y="108803"/>
-            <a:ext cx="274320" cy="274320"/>
-          </a:xfrm>
-          <a:prstGeom prst="ellipse">
-            <a:avLst/>
-          </a:prstGeom>
-          <a:solidFill>
-            <a:srgbClr val="00FF00"/>
-          </a:solidFill>
-          <a:ln w="19050">
-            <a:solidFill>
-              <a:schemeClr val="tx1"/>
-            </a:solidFill>
-          </a:ln>
-        </p:spPr>
-        <p:style>
-          <a:lnRef idx="2">
-            <a:schemeClr val="accent1">
-              <a:shade val="50000"/>
-            </a:schemeClr>
-          </a:lnRef>
-          <a:fillRef idx="1">
-            <a:schemeClr val="accent1"/>
-          </a:fillRef>
-          <a:effectRef idx="0">
-            <a:schemeClr val="accent1"/>
-          </a:effectRef>
-          <a:fontRef idx="minor">
-            <a:schemeClr val="lt1"/>
-          </a:fontRef>
-        </p:style>
-        <p:txBody>
-          <a:bodyPr rtlCol="0" anchor="ctr"/>
-          <a:lstStyle/>
-          <a:p>
-            <a:pPr algn="ctr"/>
-            <a:endParaRPr lang="en-US" sz="1600" dirty="0">
-              <a:solidFill>
-                <a:schemeClr val="accent1">
-                  <a:lumMod val="50000"/>
-                </a:schemeClr>
-              </a:solidFill>
-            </a:endParaRPr>
-          </a:p>
-        </p:txBody>
-      </p:sp>
-      <p:sp>
-        <p:nvSpPr>
-          <p:cNvPr id="23" name="Oval 22">
-            <a:extLst>
-              <a:ext uri="{FF2B5EF4-FFF2-40B4-BE49-F238E27FC236}">
-                <a16:creationId xmlns:a16="http://schemas.microsoft.com/office/drawing/2014/main" id="{C6324EDF-CBD5-CA4A-A538-7045EFF2C093}"/>
-              </a:ext>
-            </a:extLst>
-          </p:cNvPr>
-          <p:cNvSpPr>
-            <a:spLocks noChangeAspect="1"/>
-          </p:cNvSpPr>
-          <p:nvPr/>
-        </p:nvSpPr>
-        <p:spPr>
-          <a:xfrm>
-            <a:off x="6308726" y="2282563"/>
-            <a:ext cx="274320" cy="274320"/>
-          </a:xfrm>
-          <a:prstGeom prst="ellipse">
-            <a:avLst/>
-          </a:prstGeom>
-          <a:solidFill>
-            <a:srgbClr val="00FF00"/>
-          </a:solidFill>
-          <a:ln w="19050">
-            <a:solidFill>
-              <a:schemeClr val="tx1"/>
-            </a:solidFill>
-          </a:ln>
-        </p:spPr>
-        <p:style>
-          <a:lnRef idx="2">
-            <a:schemeClr val="accent1">
-              <a:shade val="50000"/>
-            </a:schemeClr>
-          </a:lnRef>
-          <a:fillRef idx="1">
-            <a:schemeClr val="accent1"/>
-          </a:fillRef>
-          <a:effectRef idx="0">
-            <a:schemeClr val="accent1"/>
-          </a:effectRef>
-          <a:fontRef idx="minor">
-            <a:schemeClr val="lt1"/>
-          </a:fontRef>
-        </p:style>
-        <p:txBody>
-          <a:bodyPr rtlCol="0" anchor="ctr"/>
-          <a:lstStyle/>
-          <a:p>
-            <a:pPr algn="ctr"/>
-            <a:r>
-              <a:rPr lang="en-US" sz="1600" dirty="0">
-                <a:solidFill>
-                  <a:schemeClr val="tx1"/>
-                </a:solidFill>
-              </a:rPr>
-              <a:t>6</a:t>
-            </a:r>
-          </a:p>
-        </p:txBody>
-      </p:sp>
-      <p:cxnSp>
-        <p:nvCxnSpPr>
-          <p:cNvPr id="24" name="Straight Connector 23">
-            <a:extLst>
-              <a:ext uri="{FF2B5EF4-FFF2-40B4-BE49-F238E27FC236}">
-                <a16:creationId xmlns:a16="http://schemas.microsoft.com/office/drawing/2014/main" id="{8EEACAE9-A007-3246-BA28-4B844B2E6821}"/>
-              </a:ext>
-            </a:extLst>
-          </p:cNvPr>
-          <p:cNvCxnSpPr>
-            <a:cxnSpLocks/>
-            <a:stCxn id="18" idx="2"/>
-          </p:cNvCxnSpPr>
-          <p:nvPr/>
-        </p:nvCxnSpPr>
-        <p:spPr>
-          <a:xfrm flipH="1">
-            <a:off x="1650375" y="1196446"/>
-            <a:ext cx="653913" cy="0"/>
-          </a:xfrm>
-          <a:prstGeom prst="line">
-            <a:avLst/>
-          </a:prstGeom>
-          <a:ln w="38100">
-            <a:solidFill>
-              <a:schemeClr val="tx1"/>
-            </a:solidFill>
-          </a:ln>
-        </p:spPr>
-        <p:style>
-          <a:lnRef idx="1">
-            <a:schemeClr val="accent1"/>
-          </a:lnRef>
-          <a:fillRef idx="0">
-            <a:schemeClr val="accent1"/>
-          </a:fillRef>
-          <a:effectRef idx="0">
-            <a:schemeClr val="accent1"/>
-          </a:effectRef>
-          <a:fontRef idx="minor">
-            <a:schemeClr val="tx1"/>
-          </a:fontRef>
-        </p:style>
-      </p:cxnSp>
-      <p:sp>
-        <p:nvSpPr>
-          <p:cNvPr id="25" name="Oval 24">
-            <a:extLst>
-              <a:ext uri="{FF2B5EF4-FFF2-40B4-BE49-F238E27FC236}">
-                <a16:creationId xmlns:a16="http://schemas.microsoft.com/office/drawing/2014/main" id="{C0708A74-5C3E-B54A-BAE6-7B87E6B81E76}"/>
-              </a:ext>
-            </a:extLst>
-          </p:cNvPr>
-          <p:cNvSpPr>
-            <a:spLocks noChangeAspect="1"/>
-          </p:cNvSpPr>
-          <p:nvPr/>
-        </p:nvSpPr>
-        <p:spPr>
-          <a:xfrm>
-            <a:off x="90701" y="2286000"/>
-            <a:ext cx="274320" cy="274320"/>
-          </a:xfrm>
-          <a:prstGeom prst="ellipse">
-            <a:avLst/>
-          </a:prstGeom>
-          <a:solidFill>
-            <a:srgbClr val="00FF00"/>
-          </a:solidFill>
-          <a:ln w="19050">
-            <a:solidFill>
-              <a:schemeClr val="tx1"/>
-            </a:solidFill>
-          </a:ln>
-        </p:spPr>
-        <p:style>
-          <a:lnRef idx="2">
-            <a:schemeClr val="accent1">
-              <a:shade val="50000"/>
-            </a:schemeClr>
-          </a:lnRef>
-          <a:fillRef idx="1">
-            <a:schemeClr val="accent1"/>
-          </a:fillRef>
-          <a:effectRef idx="0">
-            <a:schemeClr val="accent1"/>
-          </a:effectRef>
-          <a:fontRef idx="minor">
-            <a:schemeClr val="lt1"/>
-          </a:fontRef>
-        </p:style>
-        <p:txBody>
-          <a:bodyPr rtlCol="0" anchor="ctr"/>
-          <a:lstStyle/>
-          <a:p>
-            <a:pPr algn="ctr"/>
-            <a:r>
-              <a:rPr lang="en-US" sz="1600" dirty="0">
-                <a:solidFill>
-                  <a:schemeClr val="tx1"/>
-                </a:solidFill>
-              </a:rPr>
-              <a:t>1</a:t>
-            </a:r>
-          </a:p>
-        </p:txBody>
-      </p:sp>
-      <p:cxnSp>
-        <p:nvCxnSpPr>
-          <p:cNvPr id="26" name="Straight Connector 25">
-            <a:extLst>
-              <a:ext uri="{FF2B5EF4-FFF2-40B4-BE49-F238E27FC236}">
-                <a16:creationId xmlns:a16="http://schemas.microsoft.com/office/drawing/2014/main" id="{1C4EB3E4-82BC-8042-903C-595EE3E21B1E}"/>
-              </a:ext>
-            </a:extLst>
-          </p:cNvPr>
-          <p:cNvCxnSpPr>
-            <a:cxnSpLocks/>
-            <a:stCxn id="25" idx="6"/>
-          </p:cNvCxnSpPr>
-          <p:nvPr/>
-        </p:nvCxnSpPr>
-        <p:spPr>
-          <a:xfrm flipV="1">
-            <a:off x="365021" y="2419723"/>
-            <a:ext cx="869191" cy="3437"/>
-          </a:xfrm>
-          <a:prstGeom prst="line">
-            <a:avLst/>
-          </a:prstGeom>
-          <a:ln w="114300">
-            <a:solidFill>
-              <a:srgbClr val="0000FF"/>
-            </a:solidFill>
-          </a:ln>
-        </p:spPr>
-        <p:style>
-          <a:lnRef idx="1">
-            <a:schemeClr val="accent1"/>
-          </a:lnRef>
-          <a:fillRef idx="0">
-            <a:schemeClr val="accent1"/>
-          </a:fillRef>
-          <a:effectRef idx="0">
-            <a:schemeClr val="accent1"/>
-          </a:effectRef>
-          <a:fontRef idx="minor">
-            <a:schemeClr val="tx1"/>
-          </a:fontRef>
-        </p:style>
-      </p:cxnSp>
-      <p:sp>
-        <p:nvSpPr>
-          <p:cNvPr id="27" name="Rectangle 26">
-            <a:extLst>
-              <a:ext uri="{FF2B5EF4-FFF2-40B4-BE49-F238E27FC236}">
-                <a16:creationId xmlns:a16="http://schemas.microsoft.com/office/drawing/2014/main" id="{C4B2EEF4-E5A7-1545-B31D-8C7566BE972B}"/>
-              </a:ext>
-            </a:extLst>
-          </p:cNvPr>
-          <p:cNvSpPr>
-            <a:spLocks noChangeAspect="1"/>
-          </p:cNvSpPr>
-          <p:nvPr/>
-        </p:nvSpPr>
-        <p:spPr>
-          <a:xfrm>
-            <a:off x="1369578" y="1059286"/>
-            <a:ext cx="274320" cy="274320"/>
-          </a:xfrm>
-          <a:prstGeom prst="rect">
-            <a:avLst/>
-          </a:prstGeom>
-          <a:solidFill>
-            <a:srgbClr val="FFFF00"/>
-          </a:solidFill>
-          <a:ln w="19050">
-            <a:solidFill>
-              <a:schemeClr val="tx1"/>
-            </a:solidFill>
-          </a:ln>
-        </p:spPr>
-        <p:style>
-          <a:lnRef idx="2">
-            <a:schemeClr val="accent1">
-              <a:shade val="50000"/>
-            </a:schemeClr>
-          </a:lnRef>
-          <a:fillRef idx="1">
-            <a:schemeClr val="accent1"/>
-          </a:fillRef>
-          <a:effectRef idx="0">
-            <a:schemeClr val="accent1"/>
-          </a:effectRef>
-          <a:fontRef idx="minor">
-            <a:schemeClr val="lt1"/>
-          </a:fontRef>
-        </p:style>
-        <p:txBody>
-          <a:bodyPr rtlCol="0" anchor="ctr"/>
-          <a:lstStyle/>
-          <a:p>
-            <a:pPr algn="ctr"/>
-            <a:r>
-              <a:rPr lang="en-US" dirty="0">
-                <a:solidFill>
-                  <a:schemeClr val="tx1"/>
-                </a:solidFill>
-              </a:rPr>
-              <a:t>7</a:t>
-            </a:r>
-          </a:p>
-        </p:txBody>
-      </p:sp>
-      <p:sp>
-        <p:nvSpPr>
-          <p:cNvPr id="28" name="Rectangle 27">
-            <a:extLst>
-              <a:ext uri="{FF2B5EF4-FFF2-40B4-BE49-F238E27FC236}">
-                <a16:creationId xmlns:a16="http://schemas.microsoft.com/office/drawing/2014/main" id="{2BCBB218-A7C3-E047-B486-9F15D1D8C95B}"/>
-              </a:ext>
-            </a:extLst>
-          </p:cNvPr>
-          <p:cNvSpPr>
-            <a:spLocks noChangeAspect="1"/>
-          </p:cNvSpPr>
-          <p:nvPr/>
-        </p:nvSpPr>
-        <p:spPr>
-          <a:xfrm>
-            <a:off x="1237672" y="2282562"/>
-            <a:ext cx="274320" cy="274320"/>
-          </a:xfrm>
-          <a:prstGeom prst="rect">
-            <a:avLst/>
-          </a:prstGeom>
-          <a:solidFill>
-            <a:srgbClr val="FFFF00"/>
-          </a:solidFill>
-          <a:ln w="19050">
-            <a:solidFill>
-              <a:schemeClr val="tx1"/>
-            </a:solidFill>
-          </a:ln>
-        </p:spPr>
-        <p:style>
-          <a:lnRef idx="2">
-            <a:schemeClr val="accent1">
-              <a:shade val="50000"/>
-            </a:schemeClr>
-          </a:lnRef>
-          <a:fillRef idx="1">
-            <a:schemeClr val="accent1"/>
-          </a:fillRef>
-          <a:effectRef idx="0">
-            <a:schemeClr val="accent1"/>
-          </a:effectRef>
-          <a:fontRef idx="minor">
-            <a:schemeClr val="lt1"/>
-          </a:fontRef>
-        </p:style>
-        <p:txBody>
-          <a:bodyPr rtlCol="0" anchor="ctr"/>
-          <a:lstStyle/>
-          <a:p>
-            <a:pPr algn="ctr"/>
-            <a:r>
-              <a:rPr lang="en-US" dirty="0">
-                <a:solidFill>
-                  <a:schemeClr val="tx1"/>
-                </a:solidFill>
-              </a:rPr>
-              <a:t>2</a:t>
-            </a:r>
-          </a:p>
-        </p:txBody>
-      </p:sp>
-      <p:sp>
-        <p:nvSpPr>
-          <p:cNvPr id="29" name="Regular Pentagon 28">
-            <a:extLst>
-              <a:ext uri="{FF2B5EF4-FFF2-40B4-BE49-F238E27FC236}">
-                <a16:creationId xmlns:a16="http://schemas.microsoft.com/office/drawing/2014/main" id="{E150EECC-D85D-004C-82F3-338FC2DA498D}"/>
-              </a:ext>
-            </a:extLst>
-          </p:cNvPr>
-          <p:cNvSpPr>
-            <a:spLocks/>
-          </p:cNvSpPr>
-          <p:nvPr/>
-        </p:nvSpPr>
-        <p:spPr>
-          <a:xfrm>
-            <a:off x="2302732" y="2282562"/>
-            <a:ext cx="274320" cy="274320"/>
-          </a:xfrm>
-          <a:prstGeom prst="pentagon">
-            <a:avLst/>
-          </a:prstGeom>
-          <a:solidFill>
-            <a:srgbClr val="FF0000"/>
-          </a:solidFill>
-          <a:ln w="19050">
-            <a:solidFill>
-              <a:schemeClr val="tx1"/>
-            </a:solidFill>
-          </a:ln>
-        </p:spPr>
-        <p:style>
-          <a:lnRef idx="2">
-            <a:schemeClr val="accent1">
-              <a:shade val="50000"/>
-            </a:schemeClr>
-          </a:lnRef>
-          <a:fillRef idx="1">
-            <a:schemeClr val="accent1"/>
-          </a:fillRef>
-          <a:effectRef idx="0">
-            <a:schemeClr val="accent1"/>
-          </a:effectRef>
-          <a:fontRef idx="minor">
-            <a:schemeClr val="lt1"/>
-          </a:fontRef>
-        </p:style>
-        <p:txBody>
-          <a:bodyPr rtlCol="0" anchor="ctr"/>
-          <a:lstStyle/>
-          <a:p>
-            <a:pPr algn="ctr"/>
-            <a:r>
-              <a:rPr lang="en-US" dirty="0">
-                <a:solidFill>
-                  <a:schemeClr val="tx1"/>
-                </a:solidFill>
-              </a:rPr>
-              <a:t>3</a:t>
-            </a:r>
-          </a:p>
-        </p:txBody>
-      </p:sp>
-      <p:sp>
-        <p:nvSpPr>
-          <p:cNvPr id="30" name="Regular Pentagon 29">
-            <a:extLst>
-              <a:ext uri="{FF2B5EF4-FFF2-40B4-BE49-F238E27FC236}">
-                <a16:creationId xmlns:a16="http://schemas.microsoft.com/office/drawing/2014/main" id="{A25D98F5-D15B-0A4A-8DAC-C706C28FF406}"/>
-              </a:ext>
-            </a:extLst>
-          </p:cNvPr>
-          <p:cNvSpPr>
-            <a:spLocks/>
-          </p:cNvSpPr>
-          <p:nvPr/>
-        </p:nvSpPr>
-        <p:spPr>
-          <a:xfrm>
-            <a:off x="3784126" y="2278007"/>
-            <a:ext cx="274320" cy="274320"/>
-          </a:xfrm>
-          <a:prstGeom prst="pentagon">
-            <a:avLst/>
-          </a:prstGeom>
-          <a:solidFill>
-            <a:srgbClr val="FF0000"/>
-          </a:solidFill>
-          <a:ln w="19050">
-            <a:solidFill>
-              <a:schemeClr val="tx1"/>
-            </a:solidFill>
-          </a:ln>
-        </p:spPr>
-        <p:style>
-          <a:lnRef idx="2">
-            <a:schemeClr val="accent1">
-              <a:shade val="50000"/>
-            </a:schemeClr>
-          </a:lnRef>
-          <a:fillRef idx="1">
-            <a:schemeClr val="accent1"/>
-          </a:fillRef>
-          <a:effectRef idx="0">
-            <a:schemeClr val="accent1"/>
-          </a:effectRef>
-          <a:fontRef idx="minor">
-            <a:schemeClr val="lt1"/>
-          </a:fontRef>
-        </p:style>
-        <p:txBody>
-          <a:bodyPr rtlCol="0" anchor="ctr"/>
-          <a:lstStyle/>
-          <a:p>
-            <a:pPr algn="ctr"/>
-            <a:r>
-              <a:rPr lang="en-US" dirty="0">
-                <a:solidFill>
-                  <a:schemeClr val="tx1"/>
-                </a:solidFill>
-              </a:rPr>
-              <a:t>4</a:t>
-            </a:r>
-          </a:p>
-        </p:txBody>
-      </p:sp>
-      <p:sp>
-        <p:nvSpPr>
-          <p:cNvPr id="31" name="Regular Pentagon 30">
-            <a:extLst>
-              <a:ext uri="{FF2B5EF4-FFF2-40B4-BE49-F238E27FC236}">
-                <a16:creationId xmlns:a16="http://schemas.microsoft.com/office/drawing/2014/main" id="{80710026-CDC3-3A4E-9F87-E6779EA698B5}"/>
-              </a:ext>
-            </a:extLst>
-          </p:cNvPr>
-          <p:cNvSpPr>
-            <a:spLocks/>
-          </p:cNvSpPr>
-          <p:nvPr/>
-        </p:nvSpPr>
-        <p:spPr>
-          <a:xfrm>
-            <a:off x="5124026" y="2285019"/>
-            <a:ext cx="274320" cy="274320"/>
-          </a:xfrm>
-          <a:prstGeom prst="pentagon">
-            <a:avLst/>
-          </a:prstGeom>
-          <a:solidFill>
-            <a:srgbClr val="FF0000"/>
-          </a:solidFill>
-          <a:ln w="19050">
-            <a:solidFill>
-              <a:schemeClr val="tx1"/>
-            </a:solidFill>
-          </a:ln>
-        </p:spPr>
-        <p:style>
-          <a:lnRef idx="2">
-            <a:schemeClr val="accent1">
-              <a:shade val="50000"/>
-            </a:schemeClr>
-          </a:lnRef>
-          <a:fillRef idx="1">
-            <a:schemeClr val="accent1"/>
-          </a:fillRef>
-          <a:effectRef idx="0">
-            <a:schemeClr val="accent1"/>
-          </a:effectRef>
-          <a:fontRef idx="minor">
-            <a:schemeClr val="lt1"/>
-          </a:fontRef>
-        </p:style>
-        <p:txBody>
-          <a:bodyPr rtlCol="0" anchor="ctr"/>
-          <a:lstStyle/>
-          <a:p>
-            <a:pPr algn="ctr"/>
-            <a:r>
-              <a:rPr lang="en-US" dirty="0">
-                <a:solidFill>
-                  <a:schemeClr val="tx1"/>
-                </a:solidFill>
-              </a:rPr>
-              <a:t>5</a:t>
-            </a:r>
-          </a:p>
-        </p:txBody>
-      </p:sp>
-      <p:sp>
-        <p:nvSpPr>
-          <p:cNvPr id="32" name="TextBox 31">
-            <a:extLst>
-              <a:ext uri="{FF2B5EF4-FFF2-40B4-BE49-F238E27FC236}">
-                <a16:creationId xmlns:a16="http://schemas.microsoft.com/office/drawing/2014/main" id="{20A8F07E-5842-A243-B33F-7CEC7C0FC079}"/>
-              </a:ext>
-            </a:extLst>
-          </p:cNvPr>
-          <p:cNvSpPr txBox="1"/>
-          <p:nvPr/>
-        </p:nvSpPr>
-        <p:spPr>
-          <a:xfrm>
-            <a:off x="5058752" y="1027169"/>
-            <a:ext cx="393056" cy="338554"/>
-          </a:xfrm>
-          <a:prstGeom prst="rect">
-            <a:avLst/>
-          </a:prstGeom>
-          <a:noFill/>
-        </p:spPr>
-        <p:txBody>
-          <a:bodyPr wrap="none" rtlCol="0">
-            <a:spAutoFit/>
-          </a:bodyPr>
-          <a:lstStyle/>
-          <a:p>
-            <a:r>
-              <a:rPr lang="en-US" sz="1600" dirty="0"/>
-              <a:t>10</a:t>
-            </a:r>
-          </a:p>
-        </p:txBody>
-      </p:sp>
-      <p:sp>
-        <p:nvSpPr>
-          <p:cNvPr id="33" name="TextBox 32">
-            <a:extLst>
-              <a:ext uri="{FF2B5EF4-FFF2-40B4-BE49-F238E27FC236}">
-                <a16:creationId xmlns:a16="http://schemas.microsoft.com/office/drawing/2014/main" id="{296AAD93-2782-4B43-A18B-687E7A516F82}"/>
-              </a:ext>
-            </a:extLst>
-          </p:cNvPr>
-          <p:cNvSpPr txBox="1"/>
-          <p:nvPr/>
-        </p:nvSpPr>
-        <p:spPr>
-          <a:xfrm>
-            <a:off x="6249358" y="1027169"/>
-            <a:ext cx="393056" cy="338554"/>
-          </a:xfrm>
-          <a:prstGeom prst="rect">
-            <a:avLst/>
-          </a:prstGeom>
-          <a:noFill/>
-        </p:spPr>
-        <p:txBody>
-          <a:bodyPr wrap="none" rtlCol="0">
-            <a:spAutoFit/>
-          </a:bodyPr>
-          <a:lstStyle/>
-          <a:p>
-            <a:r>
-              <a:rPr lang="en-US" sz="1600" dirty="0"/>
-              <a:t>11</a:t>
-            </a:r>
-          </a:p>
-        </p:txBody>
-      </p:sp>
-      <p:sp>
-        <p:nvSpPr>
-          <p:cNvPr id="34" name="TextBox 33">
-            <a:extLst>
-              <a:ext uri="{FF2B5EF4-FFF2-40B4-BE49-F238E27FC236}">
-                <a16:creationId xmlns:a16="http://schemas.microsoft.com/office/drawing/2014/main" id="{9802C77B-1CAB-5A48-B9FF-D6FD419E2B93}"/>
-              </a:ext>
-            </a:extLst>
-          </p:cNvPr>
-          <p:cNvSpPr txBox="1"/>
-          <p:nvPr/>
-        </p:nvSpPr>
-        <p:spPr>
-          <a:xfrm>
-            <a:off x="6249358" y="76686"/>
-            <a:ext cx="393056" cy="338554"/>
-          </a:xfrm>
-          <a:prstGeom prst="rect">
-            <a:avLst/>
-          </a:prstGeom>
-          <a:noFill/>
-        </p:spPr>
-        <p:txBody>
-          <a:bodyPr wrap="none" rtlCol="0">
-            <a:spAutoFit/>
-          </a:bodyPr>
-          <a:lstStyle/>
-          <a:p>
-            <a:r>
-              <a:rPr lang="en-US" sz="1600" dirty="0"/>
-              <a:t>12</a:t>
-            </a:r>
-          </a:p>
-        </p:txBody>
-      </p:sp>
-      <p:grpSp>
-        <p:nvGrpSpPr>
-          <p:cNvPr id="44" name="Group 43">
-            <a:extLst>
-              <a:ext uri="{FF2B5EF4-FFF2-40B4-BE49-F238E27FC236}">
-                <a16:creationId xmlns:a16="http://schemas.microsoft.com/office/drawing/2014/main" id="{60C33FD1-7AE1-4148-A15A-BE4220983E5A}"/>
+                <a16:creationId xmlns:a16="http://schemas.microsoft.com/office/drawing/2014/main" id="{FD855C34-C21A-6F4F-B0A2-76C3A3A86D04}"/>
               </a:ext>
             </a:extLst>
           </p:cNvPr>
@@ -18359,18 +16862,571 @@
         </p:nvGrpSpPr>
         <p:grpSpPr>
           <a:xfrm>
-            <a:off x="4464725" y="874064"/>
-            <a:ext cx="241981" cy="237744"/>
-            <a:chOff x="4327372" y="765015"/>
-            <a:chExt cx="241981" cy="237744"/>
+            <a:off x="48876" y="76686"/>
+            <a:ext cx="6875724" cy="2849528"/>
+            <a:chOff x="48876" y="76686"/>
+            <a:chExt cx="6875724" cy="2849528"/>
           </a:xfrm>
         </p:grpSpPr>
         <p:sp>
           <p:nvSpPr>
-            <p:cNvPr id="45" name="Rectangle 44">
-              <a:extLst>
-                <a:ext uri="{FF2B5EF4-FFF2-40B4-BE49-F238E27FC236}">
-                  <a16:creationId xmlns:a16="http://schemas.microsoft.com/office/drawing/2014/main" id="{92331445-3A8C-E64B-BDCF-546B33D40ADF}"/>
+            <p:cNvPr id="3" name="TextBox 2">
+              <a:extLst>
+                <a:ext uri="{FF2B5EF4-FFF2-40B4-BE49-F238E27FC236}">
+                  <a16:creationId xmlns:a16="http://schemas.microsoft.com/office/drawing/2014/main" id="{2C94D679-543C-A340-A345-33F730C738E7}"/>
+                </a:ext>
+              </a:extLst>
+            </p:cNvPr>
+            <p:cNvSpPr txBox="1"/>
+            <p:nvPr/>
+          </p:nvSpPr>
+          <p:spPr>
+            <a:xfrm>
+              <a:off x="48876" y="2552327"/>
+              <a:ext cx="632289" cy="369332"/>
+            </a:xfrm>
+            <a:prstGeom prst="rect">
+              <a:avLst/>
+            </a:prstGeom>
+            <a:noFill/>
+          </p:spPr>
+          <p:txBody>
+            <a:bodyPr wrap="none" rtlCol="0">
+              <a:spAutoFit/>
+            </a:bodyPr>
+            <a:lstStyle/>
+            <a:p>
+              <a:r>
+                <a:rPr lang="en-US" dirty="0"/>
+                <a:t>Start</a:t>
+              </a:r>
+            </a:p>
+          </p:txBody>
+        </p:sp>
+        <p:sp>
+          <p:nvSpPr>
+            <p:cNvPr id="4" name="TextBox 3">
+              <a:extLst>
+                <a:ext uri="{FF2B5EF4-FFF2-40B4-BE49-F238E27FC236}">
+                  <a16:creationId xmlns:a16="http://schemas.microsoft.com/office/drawing/2014/main" id="{1C522E09-4F41-034B-B36B-9CBA742CC400}"/>
+                </a:ext>
+              </a:extLst>
+            </p:cNvPr>
+            <p:cNvSpPr txBox="1"/>
+            <p:nvPr/>
+          </p:nvSpPr>
+          <p:spPr>
+            <a:xfrm>
+              <a:off x="6308726" y="2556882"/>
+              <a:ext cx="615874" cy="369332"/>
+            </a:xfrm>
+            <a:prstGeom prst="rect">
+              <a:avLst/>
+            </a:prstGeom>
+            <a:noFill/>
+          </p:spPr>
+          <p:txBody>
+            <a:bodyPr wrap="none" rtlCol="0">
+              <a:spAutoFit/>
+            </a:bodyPr>
+            <a:lstStyle/>
+            <a:p>
+              <a:r>
+                <a:rPr lang="en-US" dirty="0"/>
+                <a:t>Goal</a:t>
+              </a:r>
+            </a:p>
+          </p:txBody>
+        </p:sp>
+        <p:cxnSp>
+          <p:nvCxnSpPr>
+            <p:cNvPr id="7" name="Straight Connector 6">
+              <a:extLst>
+                <a:ext uri="{FF2B5EF4-FFF2-40B4-BE49-F238E27FC236}">
+                  <a16:creationId xmlns:a16="http://schemas.microsoft.com/office/drawing/2014/main" id="{7E164774-1763-0740-BCF8-583DF131BB93}"/>
+                </a:ext>
+              </a:extLst>
+            </p:cNvPr>
+            <p:cNvCxnSpPr>
+              <a:cxnSpLocks/>
+            </p:cNvCxnSpPr>
+            <p:nvPr/>
+          </p:nvCxnSpPr>
+          <p:spPr>
+            <a:xfrm>
+              <a:off x="1508532" y="2419723"/>
+              <a:ext cx="799054" cy="0"/>
+            </a:xfrm>
+            <a:prstGeom prst="line">
+              <a:avLst/>
+            </a:prstGeom>
+            <a:ln w="114300">
+              <a:solidFill>
+                <a:srgbClr val="0000FF"/>
+              </a:solidFill>
+            </a:ln>
+          </p:spPr>
+          <p:style>
+            <a:lnRef idx="1">
+              <a:schemeClr val="accent1"/>
+            </a:lnRef>
+            <a:fillRef idx="0">
+              <a:schemeClr val="accent1"/>
+            </a:fillRef>
+            <a:effectRef idx="0">
+              <a:schemeClr val="accent1"/>
+            </a:effectRef>
+            <a:fontRef idx="minor">
+              <a:schemeClr val="tx1"/>
+            </a:fontRef>
+          </p:style>
+        </p:cxnSp>
+        <p:cxnSp>
+          <p:nvCxnSpPr>
+            <p:cNvPr id="8" name="Straight Connector 7">
+              <a:extLst>
+                <a:ext uri="{FF2B5EF4-FFF2-40B4-BE49-F238E27FC236}">
+                  <a16:creationId xmlns:a16="http://schemas.microsoft.com/office/drawing/2014/main" id="{3349C344-9F1D-864B-8468-1E3AB14F84C8}"/>
+                </a:ext>
+              </a:extLst>
+            </p:cNvPr>
+            <p:cNvCxnSpPr>
+              <a:cxnSpLocks/>
+            </p:cNvCxnSpPr>
+            <p:nvPr/>
+          </p:nvCxnSpPr>
+          <p:spPr>
+            <a:xfrm>
+              <a:off x="2581906" y="2419723"/>
+              <a:ext cx="1197886" cy="0"/>
+            </a:xfrm>
+            <a:prstGeom prst="line">
+              <a:avLst/>
+            </a:prstGeom>
+            <a:ln w="114300">
+              <a:solidFill>
+                <a:srgbClr val="0000FF"/>
+              </a:solidFill>
+            </a:ln>
+          </p:spPr>
+          <p:style>
+            <a:lnRef idx="1">
+              <a:schemeClr val="accent1"/>
+            </a:lnRef>
+            <a:fillRef idx="0">
+              <a:schemeClr val="accent1"/>
+            </a:fillRef>
+            <a:effectRef idx="0">
+              <a:schemeClr val="accent1"/>
+            </a:effectRef>
+            <a:fontRef idx="minor">
+              <a:schemeClr val="tx1"/>
+            </a:fontRef>
+          </p:style>
+        </p:cxnSp>
+        <p:cxnSp>
+          <p:nvCxnSpPr>
+            <p:cNvPr id="9" name="Straight Connector 8">
+              <a:extLst>
+                <a:ext uri="{FF2B5EF4-FFF2-40B4-BE49-F238E27FC236}">
+                  <a16:creationId xmlns:a16="http://schemas.microsoft.com/office/drawing/2014/main" id="{182AD316-59B5-E647-A99D-FE98C4F93D41}"/>
+                </a:ext>
+              </a:extLst>
+            </p:cNvPr>
+            <p:cNvCxnSpPr>
+              <a:cxnSpLocks/>
+            </p:cNvCxnSpPr>
+            <p:nvPr/>
+          </p:nvCxnSpPr>
+          <p:spPr>
+            <a:xfrm>
+              <a:off x="4054112" y="2419723"/>
+              <a:ext cx="1069914" cy="0"/>
+            </a:xfrm>
+            <a:prstGeom prst="line">
+              <a:avLst/>
+            </a:prstGeom>
+            <a:ln w="114300">
+              <a:solidFill>
+                <a:srgbClr val="0000FF"/>
+              </a:solidFill>
+            </a:ln>
+          </p:spPr>
+          <p:style>
+            <a:lnRef idx="1">
+              <a:schemeClr val="accent1"/>
+            </a:lnRef>
+            <a:fillRef idx="0">
+              <a:schemeClr val="accent1"/>
+            </a:fillRef>
+            <a:effectRef idx="0">
+              <a:schemeClr val="accent1"/>
+            </a:effectRef>
+            <a:fontRef idx="minor">
+              <a:schemeClr val="tx1"/>
+            </a:fontRef>
+          </p:style>
+        </p:cxnSp>
+        <p:cxnSp>
+          <p:nvCxnSpPr>
+            <p:cNvPr id="10" name="Straight Connector 9">
+              <a:extLst>
+                <a:ext uri="{FF2B5EF4-FFF2-40B4-BE49-F238E27FC236}">
+                  <a16:creationId xmlns:a16="http://schemas.microsoft.com/office/drawing/2014/main" id="{33C851E7-0364-1944-A0D2-A028FDFA40E0}"/>
+                </a:ext>
+              </a:extLst>
+            </p:cNvPr>
+            <p:cNvCxnSpPr>
+              <a:cxnSpLocks/>
+              <a:endCxn id="23" idx="2"/>
+            </p:cNvCxnSpPr>
+            <p:nvPr/>
+          </p:nvCxnSpPr>
+          <p:spPr>
+            <a:xfrm>
+              <a:off x="5398346" y="2419723"/>
+              <a:ext cx="910380" cy="0"/>
+            </a:xfrm>
+            <a:prstGeom prst="line">
+              <a:avLst/>
+            </a:prstGeom>
+            <a:ln w="114300">
+              <a:solidFill>
+                <a:srgbClr val="0000FF"/>
+              </a:solidFill>
+            </a:ln>
+          </p:spPr>
+          <p:style>
+            <a:lnRef idx="1">
+              <a:schemeClr val="accent1"/>
+            </a:lnRef>
+            <a:fillRef idx="0">
+              <a:schemeClr val="accent1"/>
+            </a:fillRef>
+            <a:effectRef idx="0">
+              <a:schemeClr val="accent1"/>
+            </a:effectRef>
+            <a:fontRef idx="minor">
+              <a:schemeClr val="tx1"/>
+            </a:fontRef>
+          </p:style>
+        </p:cxnSp>
+        <p:cxnSp>
+          <p:nvCxnSpPr>
+            <p:cNvPr id="11" name="Straight Connector 10">
+              <a:extLst>
+                <a:ext uri="{FF2B5EF4-FFF2-40B4-BE49-F238E27FC236}">
+                  <a16:creationId xmlns:a16="http://schemas.microsoft.com/office/drawing/2014/main" id="{CA73BAFD-63EF-7149-9677-DF9BAEDB80CD}"/>
+                </a:ext>
+              </a:extLst>
+            </p:cNvPr>
+            <p:cNvCxnSpPr>
+              <a:cxnSpLocks/>
+              <a:stCxn id="23" idx="0"/>
+            </p:cNvCxnSpPr>
+            <p:nvPr/>
+          </p:nvCxnSpPr>
+          <p:spPr>
+            <a:xfrm flipV="1">
+              <a:off x="6445886" y="1334941"/>
+              <a:ext cx="13844" cy="947622"/>
+            </a:xfrm>
+            <a:prstGeom prst="line">
+              <a:avLst/>
+            </a:prstGeom>
+            <a:ln w="38100">
+              <a:solidFill>
+                <a:schemeClr val="tx1"/>
+              </a:solidFill>
+            </a:ln>
+          </p:spPr>
+          <p:style>
+            <a:lnRef idx="1">
+              <a:schemeClr val="accent1"/>
+            </a:lnRef>
+            <a:fillRef idx="0">
+              <a:schemeClr val="accent1"/>
+            </a:fillRef>
+            <a:effectRef idx="0">
+              <a:schemeClr val="accent1"/>
+            </a:effectRef>
+            <a:fontRef idx="minor">
+              <a:schemeClr val="tx1"/>
+            </a:fontRef>
+          </p:style>
+        </p:cxnSp>
+        <p:cxnSp>
+          <p:nvCxnSpPr>
+            <p:cNvPr id="12" name="Straight Connector 11">
+              <a:extLst>
+                <a:ext uri="{FF2B5EF4-FFF2-40B4-BE49-F238E27FC236}">
+                  <a16:creationId xmlns:a16="http://schemas.microsoft.com/office/drawing/2014/main" id="{EE4014C9-3444-F640-9F0E-80E18F590AE2}"/>
+                </a:ext>
+              </a:extLst>
+            </p:cNvPr>
+            <p:cNvCxnSpPr>
+              <a:cxnSpLocks/>
+              <a:stCxn id="21" idx="0"/>
+              <a:endCxn id="22" idx="4"/>
+            </p:cNvCxnSpPr>
+            <p:nvPr/>
+          </p:nvCxnSpPr>
+          <p:spPr>
+            <a:xfrm flipH="1" flipV="1">
+              <a:off x="6446520" y="383123"/>
+              <a:ext cx="1886" cy="676163"/>
+            </a:xfrm>
+            <a:prstGeom prst="line">
+              <a:avLst/>
+            </a:prstGeom>
+            <a:ln w="38100">
+              <a:solidFill>
+                <a:schemeClr val="tx1"/>
+              </a:solidFill>
+            </a:ln>
+          </p:spPr>
+          <p:style>
+            <a:lnRef idx="1">
+              <a:schemeClr val="accent1"/>
+            </a:lnRef>
+            <a:fillRef idx="0">
+              <a:schemeClr val="accent1"/>
+            </a:fillRef>
+            <a:effectRef idx="0">
+              <a:schemeClr val="accent1"/>
+            </a:effectRef>
+            <a:fontRef idx="minor">
+              <a:schemeClr val="tx1"/>
+            </a:fontRef>
+          </p:style>
+        </p:cxnSp>
+        <p:cxnSp>
+          <p:nvCxnSpPr>
+            <p:cNvPr id="13" name="Straight Connector 12">
+              <a:extLst>
+                <a:ext uri="{FF2B5EF4-FFF2-40B4-BE49-F238E27FC236}">
+                  <a16:creationId xmlns:a16="http://schemas.microsoft.com/office/drawing/2014/main" id="{AD635A72-BE53-E24A-8EA4-D0567576B544}"/>
+                </a:ext>
+              </a:extLst>
+            </p:cNvPr>
+            <p:cNvCxnSpPr>
+              <a:cxnSpLocks/>
+              <a:stCxn id="21" idx="2"/>
+              <a:endCxn id="20" idx="6"/>
+            </p:cNvCxnSpPr>
+            <p:nvPr/>
+          </p:nvCxnSpPr>
+          <p:spPr>
+            <a:xfrm flipH="1">
+              <a:off x="5394960" y="1196446"/>
+              <a:ext cx="916286" cy="0"/>
+            </a:xfrm>
+            <a:prstGeom prst="line">
+              <a:avLst/>
+            </a:prstGeom>
+            <a:ln w="38100">
+              <a:solidFill>
+                <a:schemeClr val="tx1"/>
+              </a:solidFill>
+            </a:ln>
+          </p:spPr>
+          <p:style>
+            <a:lnRef idx="1">
+              <a:schemeClr val="accent1"/>
+            </a:lnRef>
+            <a:fillRef idx="0">
+              <a:schemeClr val="accent1"/>
+            </a:fillRef>
+            <a:effectRef idx="0">
+              <a:schemeClr val="accent1"/>
+            </a:effectRef>
+            <a:fontRef idx="minor">
+              <a:schemeClr val="tx1"/>
+            </a:fontRef>
+          </p:style>
+        </p:cxnSp>
+        <p:cxnSp>
+          <p:nvCxnSpPr>
+            <p:cNvPr id="14" name="Straight Connector 13">
+              <a:extLst>
+                <a:ext uri="{FF2B5EF4-FFF2-40B4-BE49-F238E27FC236}">
+                  <a16:creationId xmlns:a16="http://schemas.microsoft.com/office/drawing/2014/main" id="{5DB123DA-C920-6840-A0B9-FC89E51A04D7}"/>
+                </a:ext>
+              </a:extLst>
+            </p:cNvPr>
+            <p:cNvCxnSpPr>
+              <a:cxnSpLocks/>
+              <a:stCxn id="20" idx="2"/>
+              <a:endCxn id="19" idx="6"/>
+            </p:cNvCxnSpPr>
+            <p:nvPr/>
+          </p:nvCxnSpPr>
+          <p:spPr>
+            <a:xfrm flipH="1">
+              <a:off x="4050792" y="1196446"/>
+              <a:ext cx="1069848" cy="0"/>
+            </a:xfrm>
+            <a:prstGeom prst="line">
+              <a:avLst/>
+            </a:prstGeom>
+            <a:ln w="38100">
+              <a:solidFill>
+                <a:schemeClr val="tx1"/>
+              </a:solidFill>
+            </a:ln>
+          </p:spPr>
+          <p:style>
+            <a:lnRef idx="1">
+              <a:schemeClr val="accent1"/>
+            </a:lnRef>
+            <a:fillRef idx="0">
+              <a:schemeClr val="accent1"/>
+            </a:fillRef>
+            <a:effectRef idx="0">
+              <a:schemeClr val="accent1"/>
+            </a:effectRef>
+            <a:fontRef idx="minor">
+              <a:schemeClr val="tx1"/>
+            </a:fontRef>
+          </p:style>
+        </p:cxnSp>
+        <p:cxnSp>
+          <p:nvCxnSpPr>
+            <p:cNvPr id="15" name="Straight Connector 14">
+              <a:extLst>
+                <a:ext uri="{FF2B5EF4-FFF2-40B4-BE49-F238E27FC236}">
+                  <a16:creationId xmlns:a16="http://schemas.microsoft.com/office/drawing/2014/main" id="{2F26FDCA-C8E3-1349-87BA-3A7EB30606B7}"/>
+                </a:ext>
+              </a:extLst>
+            </p:cNvPr>
+            <p:cNvCxnSpPr>
+              <a:cxnSpLocks/>
+              <a:stCxn id="19" idx="2"/>
+              <a:endCxn id="18" idx="6"/>
+            </p:cNvCxnSpPr>
+            <p:nvPr/>
+          </p:nvCxnSpPr>
+          <p:spPr>
+            <a:xfrm flipH="1">
+              <a:off x="2578608" y="1196446"/>
+              <a:ext cx="1197864" cy="0"/>
+            </a:xfrm>
+            <a:prstGeom prst="line">
+              <a:avLst/>
+            </a:prstGeom>
+            <a:ln w="38100">
+              <a:solidFill>
+                <a:schemeClr val="tx1"/>
+              </a:solidFill>
+            </a:ln>
+          </p:spPr>
+          <p:style>
+            <a:lnRef idx="1">
+              <a:schemeClr val="accent1"/>
+            </a:lnRef>
+            <a:fillRef idx="0">
+              <a:schemeClr val="accent1"/>
+            </a:fillRef>
+            <a:effectRef idx="0">
+              <a:schemeClr val="accent1"/>
+            </a:effectRef>
+            <a:fontRef idx="minor">
+              <a:schemeClr val="tx1"/>
+            </a:fontRef>
+          </p:style>
+        </p:cxnSp>
+        <p:cxnSp>
+          <p:nvCxnSpPr>
+            <p:cNvPr id="16" name="Straight Connector 15">
+              <a:extLst>
+                <a:ext uri="{FF2B5EF4-FFF2-40B4-BE49-F238E27FC236}">
+                  <a16:creationId xmlns:a16="http://schemas.microsoft.com/office/drawing/2014/main" id="{E5454824-1BC6-F740-A27E-0CEAEB85FB4E}"/>
+                </a:ext>
+              </a:extLst>
+            </p:cNvPr>
+            <p:cNvCxnSpPr>
+              <a:cxnSpLocks/>
+            </p:cNvCxnSpPr>
+            <p:nvPr/>
+          </p:nvCxnSpPr>
+          <p:spPr>
+            <a:xfrm flipH="1">
+              <a:off x="2444746" y="1334940"/>
+              <a:ext cx="8890" cy="947623"/>
+            </a:xfrm>
+            <a:prstGeom prst="line">
+              <a:avLst/>
+            </a:prstGeom>
+            <a:ln w="38100">
+              <a:solidFill>
+                <a:schemeClr val="tx1"/>
+              </a:solidFill>
+            </a:ln>
+          </p:spPr>
+          <p:style>
+            <a:lnRef idx="1">
+              <a:schemeClr val="accent1"/>
+            </a:lnRef>
+            <a:fillRef idx="0">
+              <a:schemeClr val="accent1"/>
+            </a:fillRef>
+            <a:effectRef idx="0">
+              <a:schemeClr val="accent1"/>
+            </a:effectRef>
+            <a:fontRef idx="minor">
+              <a:schemeClr val="tx1"/>
+            </a:fontRef>
+          </p:style>
+        </p:cxnSp>
+        <p:cxnSp>
+          <p:nvCxnSpPr>
+            <p:cNvPr id="17" name="Straight Connector 16">
+              <a:extLst>
+                <a:ext uri="{FF2B5EF4-FFF2-40B4-BE49-F238E27FC236}">
+                  <a16:creationId xmlns:a16="http://schemas.microsoft.com/office/drawing/2014/main" id="{1E46AB9E-02B0-2B49-BEE4-A32F2768318A}"/>
+                </a:ext>
+              </a:extLst>
+            </p:cNvPr>
+            <p:cNvCxnSpPr>
+              <a:cxnSpLocks/>
+            </p:cNvCxnSpPr>
+            <p:nvPr/>
+          </p:nvCxnSpPr>
+          <p:spPr>
+            <a:xfrm>
+              <a:off x="5261186" y="1334940"/>
+              <a:ext cx="0" cy="938733"/>
+            </a:xfrm>
+            <a:prstGeom prst="line">
+              <a:avLst/>
+            </a:prstGeom>
+            <a:ln w="38100">
+              <a:solidFill>
+                <a:schemeClr val="tx1"/>
+              </a:solidFill>
+            </a:ln>
+          </p:spPr>
+          <p:style>
+            <a:lnRef idx="1">
+              <a:schemeClr val="accent1"/>
+            </a:lnRef>
+            <a:fillRef idx="0">
+              <a:schemeClr val="accent1"/>
+            </a:fillRef>
+            <a:effectRef idx="0">
+              <a:schemeClr val="accent1"/>
+            </a:effectRef>
+            <a:fontRef idx="minor">
+              <a:schemeClr val="tx1"/>
+            </a:fontRef>
+          </p:style>
+        </p:cxnSp>
+        <p:sp>
+          <p:nvSpPr>
+            <p:cNvPr id="18" name="Oval 17">
+              <a:extLst>
+                <a:ext uri="{FF2B5EF4-FFF2-40B4-BE49-F238E27FC236}">
+                  <a16:creationId xmlns:a16="http://schemas.microsoft.com/office/drawing/2014/main" id="{ACF6D42E-97A0-6440-9E31-4835DB55D85D}"/>
                 </a:ext>
               </a:extLst>
             </p:cNvPr>
@@ -18381,18 +17437,18 @@
           </p:nvSpPr>
           <p:spPr>
             <a:xfrm>
-              <a:off x="4327372" y="765015"/>
-              <a:ext cx="118872" cy="237744"/>
-            </a:xfrm>
-            <a:prstGeom prst="rect">
+              <a:off x="2304288" y="1059286"/>
+              <a:ext cx="274320" cy="274320"/>
+            </a:xfrm>
+            <a:prstGeom prst="ellipse">
               <a:avLst/>
             </a:prstGeom>
             <a:solidFill>
-              <a:srgbClr val="CD950C"/>
+              <a:srgbClr val="00FF00"/>
             </a:solidFill>
             <a:ln w="19050">
               <a:solidFill>
-                <a:schemeClr val="bg1"/>
+                <a:schemeClr val="tx1"/>
               </a:solidFill>
             </a:ln>
           </p:spPr>
@@ -18417,16 +17473,23 @@
             <a:lstStyle/>
             <a:p>
               <a:pPr algn="ctr"/>
-              <a:endParaRPr lang="en-US"/>
+              <a:r>
+                <a:rPr lang="en-US" sz="1600" dirty="0">
+                  <a:solidFill>
+                    <a:schemeClr val="tx1"/>
+                  </a:solidFill>
+                </a:rPr>
+                <a:t>8</a:t>
+              </a:r>
             </a:p>
           </p:txBody>
         </p:sp>
         <p:sp>
           <p:nvSpPr>
-            <p:cNvPr id="46" name="Rectangle 45">
-              <a:extLst>
-                <a:ext uri="{FF2B5EF4-FFF2-40B4-BE49-F238E27FC236}">
-                  <a16:creationId xmlns:a16="http://schemas.microsoft.com/office/drawing/2014/main" id="{DDBF12AD-4EBD-3549-83A3-F48783EF8884}"/>
+            <p:cNvPr id="19" name="Oval 18">
+              <a:extLst>
+                <a:ext uri="{FF2B5EF4-FFF2-40B4-BE49-F238E27FC236}">
+                  <a16:creationId xmlns:a16="http://schemas.microsoft.com/office/drawing/2014/main" id="{AE81604C-95FA-7440-9242-11FB4B5C8DF7}"/>
                 </a:ext>
               </a:extLst>
             </p:cNvPr>
@@ -18437,18 +17500,18 @@
           </p:nvSpPr>
           <p:spPr>
             <a:xfrm>
-              <a:off x="4450481" y="765015"/>
-              <a:ext cx="118872" cy="237744"/>
-            </a:xfrm>
-            <a:prstGeom prst="rect">
+              <a:off x="3776472" y="1059286"/>
+              <a:ext cx="274320" cy="274320"/>
+            </a:xfrm>
+            <a:prstGeom prst="ellipse">
               <a:avLst/>
             </a:prstGeom>
             <a:solidFill>
-              <a:srgbClr val="8B6508"/>
+              <a:srgbClr val="00FF00"/>
             </a:solidFill>
             <a:ln w="19050">
               <a:solidFill>
-                <a:schemeClr val="bg1"/>
+                <a:schemeClr val="tx1"/>
               </a:solidFill>
             </a:ln>
           </p:spPr>
@@ -18473,37 +17536,23 @@
             <a:lstStyle/>
             <a:p>
               <a:pPr algn="ctr"/>
-              <a:endParaRPr lang="en-US"/>
+              <a:r>
+                <a:rPr lang="en-US" sz="1600" dirty="0">
+                  <a:solidFill>
+                    <a:schemeClr val="tx1"/>
+                  </a:solidFill>
+                </a:rPr>
+                <a:t>9</a:t>
+              </a:r>
             </a:p>
           </p:txBody>
         </p:sp>
-      </p:grpSp>
-      <p:grpSp>
-        <p:nvGrpSpPr>
-          <p:cNvPr id="47" name="Group 46">
-            <a:extLst>
-              <a:ext uri="{FF2B5EF4-FFF2-40B4-BE49-F238E27FC236}">
-                <a16:creationId xmlns:a16="http://schemas.microsoft.com/office/drawing/2014/main" id="{A2ACD520-11F7-DD47-BD1A-D1640CCC5BA2}"/>
-              </a:ext>
-            </a:extLst>
-          </p:cNvPr>
-          <p:cNvGrpSpPr/>
-          <p:nvPr/>
-        </p:nvGrpSpPr>
-        <p:grpSpPr>
-          <a:xfrm>
-            <a:off x="2938868" y="2111121"/>
-            <a:ext cx="479725" cy="237744"/>
-            <a:chOff x="4405289" y="4438277"/>
-            <a:chExt cx="479725" cy="237744"/>
-          </a:xfrm>
-        </p:grpSpPr>
         <p:sp>
           <p:nvSpPr>
-            <p:cNvPr id="48" name="Rectangle 47">
-              <a:extLst>
-                <a:ext uri="{FF2B5EF4-FFF2-40B4-BE49-F238E27FC236}">
-                  <a16:creationId xmlns:a16="http://schemas.microsoft.com/office/drawing/2014/main" id="{42DE264A-1419-484A-99A4-342AB319FB5C}"/>
+            <p:cNvPr id="20" name="Oval 19">
+              <a:extLst>
+                <a:ext uri="{FF2B5EF4-FFF2-40B4-BE49-F238E27FC236}">
+                  <a16:creationId xmlns:a16="http://schemas.microsoft.com/office/drawing/2014/main" id="{0B877335-667F-0747-99D9-B05F9C40C785}"/>
                 </a:ext>
               </a:extLst>
             </p:cNvPr>
@@ -18514,18 +17563,18 @@
           </p:nvSpPr>
           <p:spPr>
             <a:xfrm>
-              <a:off x="4405289" y="4438277"/>
-              <a:ext cx="118872" cy="237744"/>
-            </a:xfrm>
-            <a:prstGeom prst="rect">
+              <a:off x="5120640" y="1059286"/>
+              <a:ext cx="274320" cy="274320"/>
+            </a:xfrm>
+            <a:prstGeom prst="ellipse">
               <a:avLst/>
             </a:prstGeom>
             <a:solidFill>
-              <a:srgbClr val="CD950C"/>
+              <a:srgbClr val="00FF00"/>
             </a:solidFill>
             <a:ln w="19050">
               <a:solidFill>
-                <a:schemeClr val="bg1"/>
+                <a:schemeClr val="tx1"/>
               </a:solidFill>
             </a:ln>
           </p:spPr>
@@ -18550,16 +17599,20 @@
             <a:lstStyle/>
             <a:p>
               <a:pPr algn="ctr"/>
-              <a:endParaRPr lang="en-US"/>
+              <a:endParaRPr lang="en-US" sz="1050" dirty="0">
+                <a:solidFill>
+                  <a:schemeClr val="tx1"/>
+                </a:solidFill>
+              </a:endParaRPr>
             </a:p>
           </p:txBody>
         </p:sp>
         <p:sp>
           <p:nvSpPr>
-            <p:cNvPr id="49" name="Rectangle 48">
-              <a:extLst>
-                <a:ext uri="{FF2B5EF4-FFF2-40B4-BE49-F238E27FC236}">
-                  <a16:creationId xmlns:a16="http://schemas.microsoft.com/office/drawing/2014/main" id="{F3B78E29-3C34-6048-9DA2-9875A1A43FA6}"/>
+            <p:cNvPr id="21" name="Oval 20">
+              <a:extLst>
+                <a:ext uri="{FF2B5EF4-FFF2-40B4-BE49-F238E27FC236}">
+                  <a16:creationId xmlns:a16="http://schemas.microsoft.com/office/drawing/2014/main" id="{089FC56E-F653-684C-B028-F479008635A1}"/>
                 </a:ext>
               </a:extLst>
             </p:cNvPr>
@@ -18570,18 +17623,18 @@
           </p:nvSpPr>
           <p:spPr>
             <a:xfrm>
-              <a:off x="4528398" y="4438277"/>
-              <a:ext cx="118872" cy="237744"/>
-            </a:xfrm>
-            <a:prstGeom prst="rect">
+              <a:off x="6311246" y="1059286"/>
+              <a:ext cx="274320" cy="274320"/>
+            </a:xfrm>
+            <a:prstGeom prst="ellipse">
               <a:avLst/>
             </a:prstGeom>
             <a:solidFill>
-              <a:srgbClr val="8B6508"/>
+              <a:srgbClr val="00FF00"/>
             </a:solidFill>
             <a:ln w="19050">
               <a:solidFill>
-                <a:schemeClr val="bg1"/>
+                <a:schemeClr val="tx1"/>
               </a:solidFill>
             </a:ln>
           </p:spPr>
@@ -18606,16 +17659,22 @@
             <a:lstStyle/>
             <a:p>
               <a:pPr algn="ctr"/>
-              <a:endParaRPr lang="en-US"/>
+              <a:endParaRPr lang="en-US" sz="1600" dirty="0">
+                <a:solidFill>
+                  <a:schemeClr val="accent1">
+                    <a:lumMod val="50000"/>
+                  </a:schemeClr>
+                </a:solidFill>
+              </a:endParaRPr>
             </a:p>
           </p:txBody>
         </p:sp>
         <p:sp>
           <p:nvSpPr>
-            <p:cNvPr id="50" name="Rectangle 49">
-              <a:extLst>
-                <a:ext uri="{FF2B5EF4-FFF2-40B4-BE49-F238E27FC236}">
-                  <a16:creationId xmlns:a16="http://schemas.microsoft.com/office/drawing/2014/main" id="{F84412E2-FBFA-6942-BBB4-5789073B96F1}"/>
+            <p:cNvPr id="22" name="Oval 21">
+              <a:extLst>
+                <a:ext uri="{FF2B5EF4-FFF2-40B4-BE49-F238E27FC236}">
+                  <a16:creationId xmlns:a16="http://schemas.microsoft.com/office/drawing/2014/main" id="{4531E7E0-079E-0241-9CB5-BED10A6BE5A8}"/>
                 </a:ext>
               </a:extLst>
             </p:cNvPr>
@@ -18626,18 +17685,18 @@
           </p:nvSpPr>
           <p:spPr>
             <a:xfrm>
-              <a:off x="4647270" y="4438277"/>
-              <a:ext cx="118872" cy="237744"/>
-            </a:xfrm>
-            <a:prstGeom prst="rect">
+              <a:off x="6309360" y="108803"/>
+              <a:ext cx="274320" cy="274320"/>
+            </a:xfrm>
+            <a:prstGeom prst="ellipse">
               <a:avLst/>
             </a:prstGeom>
             <a:solidFill>
-              <a:srgbClr val="CD950C"/>
+              <a:srgbClr val="00FF00"/>
             </a:solidFill>
             <a:ln w="19050">
               <a:solidFill>
-                <a:schemeClr val="bg1"/>
+                <a:schemeClr val="tx1"/>
               </a:solidFill>
             </a:ln>
           </p:spPr>
@@ -18662,16 +17721,22 @@
             <a:lstStyle/>
             <a:p>
               <a:pPr algn="ctr"/>
-              <a:endParaRPr lang="en-US"/>
+              <a:endParaRPr lang="en-US" sz="1600" dirty="0">
+                <a:solidFill>
+                  <a:schemeClr val="accent1">
+                    <a:lumMod val="50000"/>
+                  </a:schemeClr>
+                </a:solidFill>
+              </a:endParaRPr>
             </a:p>
           </p:txBody>
         </p:sp>
         <p:sp>
           <p:nvSpPr>
-            <p:cNvPr id="51" name="Rectangle 50">
-              <a:extLst>
-                <a:ext uri="{FF2B5EF4-FFF2-40B4-BE49-F238E27FC236}">
-                  <a16:creationId xmlns:a16="http://schemas.microsoft.com/office/drawing/2014/main" id="{052ADDF2-1E7E-8242-B46F-98B9CE6E3463}"/>
+            <p:cNvPr id="23" name="Oval 22">
+              <a:extLst>
+                <a:ext uri="{FF2B5EF4-FFF2-40B4-BE49-F238E27FC236}">
+                  <a16:creationId xmlns:a16="http://schemas.microsoft.com/office/drawing/2014/main" id="{C6324EDF-CBD5-CA4A-A538-7045EFF2C093}"/>
                 </a:ext>
               </a:extLst>
             </p:cNvPr>
@@ -18682,18 +17747,18 @@
           </p:nvSpPr>
           <p:spPr>
             <a:xfrm>
-              <a:off x="4766142" y="4438277"/>
-              <a:ext cx="118872" cy="237744"/>
-            </a:xfrm>
-            <a:prstGeom prst="rect">
+              <a:off x="6308726" y="2282563"/>
+              <a:ext cx="274320" cy="274320"/>
+            </a:xfrm>
+            <a:prstGeom prst="ellipse">
               <a:avLst/>
             </a:prstGeom>
             <a:solidFill>
-              <a:srgbClr val="8B6508"/>
+              <a:srgbClr val="00FF00"/>
             </a:solidFill>
             <a:ln w="19050">
               <a:solidFill>
-                <a:schemeClr val="bg1"/>
+                <a:schemeClr val="tx1"/>
               </a:solidFill>
             </a:ln>
           </p:spPr>
@@ -18718,10 +17783,966 @@
             <a:lstStyle/>
             <a:p>
               <a:pPr algn="ctr"/>
-              <a:endParaRPr lang="en-US"/>
+              <a:r>
+                <a:rPr lang="en-US" sz="1600" dirty="0">
+                  <a:solidFill>
+                    <a:schemeClr val="tx1"/>
+                  </a:solidFill>
+                </a:rPr>
+                <a:t>6</a:t>
+              </a:r>
             </a:p>
           </p:txBody>
         </p:sp>
+        <p:cxnSp>
+          <p:nvCxnSpPr>
+            <p:cNvPr id="24" name="Straight Connector 23">
+              <a:extLst>
+                <a:ext uri="{FF2B5EF4-FFF2-40B4-BE49-F238E27FC236}">
+                  <a16:creationId xmlns:a16="http://schemas.microsoft.com/office/drawing/2014/main" id="{8EEACAE9-A007-3246-BA28-4B844B2E6821}"/>
+                </a:ext>
+              </a:extLst>
+            </p:cNvPr>
+            <p:cNvCxnSpPr>
+              <a:cxnSpLocks/>
+              <a:stCxn id="18" idx="2"/>
+            </p:cNvCxnSpPr>
+            <p:nvPr/>
+          </p:nvCxnSpPr>
+          <p:spPr>
+            <a:xfrm flipH="1">
+              <a:off x="1650375" y="1196446"/>
+              <a:ext cx="653913" cy="0"/>
+            </a:xfrm>
+            <a:prstGeom prst="line">
+              <a:avLst/>
+            </a:prstGeom>
+            <a:ln w="38100">
+              <a:solidFill>
+                <a:schemeClr val="tx1"/>
+              </a:solidFill>
+            </a:ln>
+          </p:spPr>
+          <p:style>
+            <a:lnRef idx="1">
+              <a:schemeClr val="accent1"/>
+            </a:lnRef>
+            <a:fillRef idx="0">
+              <a:schemeClr val="accent1"/>
+            </a:fillRef>
+            <a:effectRef idx="0">
+              <a:schemeClr val="accent1"/>
+            </a:effectRef>
+            <a:fontRef idx="minor">
+              <a:schemeClr val="tx1"/>
+            </a:fontRef>
+          </p:style>
+        </p:cxnSp>
+        <p:sp>
+          <p:nvSpPr>
+            <p:cNvPr id="25" name="Oval 24">
+              <a:extLst>
+                <a:ext uri="{FF2B5EF4-FFF2-40B4-BE49-F238E27FC236}">
+                  <a16:creationId xmlns:a16="http://schemas.microsoft.com/office/drawing/2014/main" id="{C0708A74-5C3E-B54A-BAE6-7B87E6B81E76}"/>
+                </a:ext>
+              </a:extLst>
+            </p:cNvPr>
+            <p:cNvSpPr>
+              <a:spLocks noChangeAspect="1"/>
+            </p:cNvSpPr>
+            <p:nvPr/>
+          </p:nvSpPr>
+          <p:spPr>
+            <a:xfrm>
+              <a:off x="90701" y="2286000"/>
+              <a:ext cx="274320" cy="274320"/>
+            </a:xfrm>
+            <a:prstGeom prst="ellipse">
+              <a:avLst/>
+            </a:prstGeom>
+            <a:solidFill>
+              <a:srgbClr val="00FF00"/>
+            </a:solidFill>
+            <a:ln w="19050">
+              <a:solidFill>
+                <a:schemeClr val="tx1"/>
+              </a:solidFill>
+            </a:ln>
+          </p:spPr>
+          <p:style>
+            <a:lnRef idx="2">
+              <a:schemeClr val="accent1">
+                <a:shade val="50000"/>
+              </a:schemeClr>
+            </a:lnRef>
+            <a:fillRef idx="1">
+              <a:schemeClr val="accent1"/>
+            </a:fillRef>
+            <a:effectRef idx="0">
+              <a:schemeClr val="accent1"/>
+            </a:effectRef>
+            <a:fontRef idx="minor">
+              <a:schemeClr val="lt1"/>
+            </a:fontRef>
+          </p:style>
+          <p:txBody>
+            <a:bodyPr rtlCol="0" anchor="ctr"/>
+            <a:lstStyle/>
+            <a:p>
+              <a:pPr algn="ctr"/>
+              <a:r>
+                <a:rPr lang="en-US" sz="1600" dirty="0">
+                  <a:solidFill>
+                    <a:schemeClr val="tx1"/>
+                  </a:solidFill>
+                </a:rPr>
+                <a:t>1</a:t>
+              </a:r>
+            </a:p>
+          </p:txBody>
+        </p:sp>
+        <p:cxnSp>
+          <p:nvCxnSpPr>
+            <p:cNvPr id="26" name="Straight Connector 25">
+              <a:extLst>
+                <a:ext uri="{FF2B5EF4-FFF2-40B4-BE49-F238E27FC236}">
+                  <a16:creationId xmlns:a16="http://schemas.microsoft.com/office/drawing/2014/main" id="{1C4EB3E4-82BC-8042-903C-595EE3E21B1E}"/>
+                </a:ext>
+              </a:extLst>
+            </p:cNvPr>
+            <p:cNvCxnSpPr>
+              <a:cxnSpLocks/>
+              <a:stCxn id="25" idx="6"/>
+            </p:cNvCxnSpPr>
+            <p:nvPr/>
+          </p:nvCxnSpPr>
+          <p:spPr>
+            <a:xfrm flipV="1">
+              <a:off x="365021" y="2419723"/>
+              <a:ext cx="869191" cy="3437"/>
+            </a:xfrm>
+            <a:prstGeom prst="line">
+              <a:avLst/>
+            </a:prstGeom>
+            <a:ln w="114300">
+              <a:solidFill>
+                <a:srgbClr val="0000FF"/>
+              </a:solidFill>
+            </a:ln>
+          </p:spPr>
+          <p:style>
+            <a:lnRef idx="1">
+              <a:schemeClr val="accent1"/>
+            </a:lnRef>
+            <a:fillRef idx="0">
+              <a:schemeClr val="accent1"/>
+            </a:fillRef>
+            <a:effectRef idx="0">
+              <a:schemeClr val="accent1"/>
+            </a:effectRef>
+            <a:fontRef idx="minor">
+              <a:schemeClr val="tx1"/>
+            </a:fontRef>
+          </p:style>
+        </p:cxnSp>
+        <p:sp>
+          <p:nvSpPr>
+            <p:cNvPr id="27" name="Rectangle 26">
+              <a:extLst>
+                <a:ext uri="{FF2B5EF4-FFF2-40B4-BE49-F238E27FC236}">
+                  <a16:creationId xmlns:a16="http://schemas.microsoft.com/office/drawing/2014/main" id="{C4B2EEF4-E5A7-1545-B31D-8C7566BE972B}"/>
+                </a:ext>
+              </a:extLst>
+            </p:cNvPr>
+            <p:cNvSpPr>
+              <a:spLocks noChangeAspect="1"/>
+            </p:cNvSpPr>
+            <p:nvPr/>
+          </p:nvSpPr>
+          <p:spPr>
+            <a:xfrm>
+              <a:off x="1369578" y="1059286"/>
+              <a:ext cx="274320" cy="274320"/>
+            </a:xfrm>
+            <a:prstGeom prst="rect">
+              <a:avLst/>
+            </a:prstGeom>
+            <a:solidFill>
+              <a:srgbClr val="FFFF00"/>
+            </a:solidFill>
+            <a:ln w="19050">
+              <a:solidFill>
+                <a:schemeClr val="tx1"/>
+              </a:solidFill>
+            </a:ln>
+          </p:spPr>
+          <p:style>
+            <a:lnRef idx="2">
+              <a:schemeClr val="accent1">
+                <a:shade val="50000"/>
+              </a:schemeClr>
+            </a:lnRef>
+            <a:fillRef idx="1">
+              <a:schemeClr val="accent1"/>
+            </a:fillRef>
+            <a:effectRef idx="0">
+              <a:schemeClr val="accent1"/>
+            </a:effectRef>
+            <a:fontRef idx="minor">
+              <a:schemeClr val="lt1"/>
+            </a:fontRef>
+          </p:style>
+          <p:txBody>
+            <a:bodyPr rtlCol="0" anchor="ctr"/>
+            <a:lstStyle/>
+            <a:p>
+              <a:pPr algn="ctr"/>
+              <a:r>
+                <a:rPr lang="en-US" dirty="0">
+                  <a:solidFill>
+                    <a:schemeClr val="tx1"/>
+                  </a:solidFill>
+                </a:rPr>
+                <a:t>7</a:t>
+              </a:r>
+            </a:p>
+          </p:txBody>
+        </p:sp>
+        <p:sp>
+          <p:nvSpPr>
+            <p:cNvPr id="28" name="Rectangle 27">
+              <a:extLst>
+                <a:ext uri="{FF2B5EF4-FFF2-40B4-BE49-F238E27FC236}">
+                  <a16:creationId xmlns:a16="http://schemas.microsoft.com/office/drawing/2014/main" id="{2BCBB218-A7C3-E047-B486-9F15D1D8C95B}"/>
+                </a:ext>
+              </a:extLst>
+            </p:cNvPr>
+            <p:cNvSpPr>
+              <a:spLocks noChangeAspect="1"/>
+            </p:cNvSpPr>
+            <p:nvPr/>
+          </p:nvSpPr>
+          <p:spPr>
+            <a:xfrm>
+              <a:off x="1237672" y="2282562"/>
+              <a:ext cx="274320" cy="274320"/>
+            </a:xfrm>
+            <a:prstGeom prst="rect">
+              <a:avLst/>
+            </a:prstGeom>
+            <a:solidFill>
+              <a:srgbClr val="FFFF00"/>
+            </a:solidFill>
+            <a:ln w="19050">
+              <a:solidFill>
+                <a:schemeClr val="tx1"/>
+              </a:solidFill>
+            </a:ln>
+          </p:spPr>
+          <p:style>
+            <a:lnRef idx="2">
+              <a:schemeClr val="accent1">
+                <a:shade val="50000"/>
+              </a:schemeClr>
+            </a:lnRef>
+            <a:fillRef idx="1">
+              <a:schemeClr val="accent1"/>
+            </a:fillRef>
+            <a:effectRef idx="0">
+              <a:schemeClr val="accent1"/>
+            </a:effectRef>
+            <a:fontRef idx="minor">
+              <a:schemeClr val="lt1"/>
+            </a:fontRef>
+          </p:style>
+          <p:txBody>
+            <a:bodyPr rtlCol="0" anchor="ctr"/>
+            <a:lstStyle/>
+            <a:p>
+              <a:pPr algn="ctr"/>
+              <a:r>
+                <a:rPr lang="en-US" dirty="0">
+                  <a:solidFill>
+                    <a:schemeClr val="tx1"/>
+                  </a:solidFill>
+                </a:rPr>
+                <a:t>2</a:t>
+              </a:r>
+            </a:p>
+          </p:txBody>
+        </p:sp>
+        <p:sp>
+          <p:nvSpPr>
+            <p:cNvPr id="29" name="Regular Pentagon 28">
+              <a:extLst>
+                <a:ext uri="{FF2B5EF4-FFF2-40B4-BE49-F238E27FC236}">
+                  <a16:creationId xmlns:a16="http://schemas.microsoft.com/office/drawing/2014/main" id="{E150EECC-D85D-004C-82F3-338FC2DA498D}"/>
+                </a:ext>
+              </a:extLst>
+            </p:cNvPr>
+            <p:cNvSpPr>
+              <a:spLocks/>
+            </p:cNvSpPr>
+            <p:nvPr/>
+          </p:nvSpPr>
+          <p:spPr>
+            <a:xfrm>
+              <a:off x="2302732" y="2282562"/>
+              <a:ext cx="274320" cy="274320"/>
+            </a:xfrm>
+            <a:prstGeom prst="pentagon">
+              <a:avLst/>
+            </a:prstGeom>
+            <a:solidFill>
+              <a:srgbClr val="FF0000"/>
+            </a:solidFill>
+            <a:ln w="19050">
+              <a:solidFill>
+                <a:schemeClr val="tx1"/>
+              </a:solidFill>
+            </a:ln>
+          </p:spPr>
+          <p:style>
+            <a:lnRef idx="2">
+              <a:schemeClr val="accent1">
+                <a:shade val="50000"/>
+              </a:schemeClr>
+            </a:lnRef>
+            <a:fillRef idx="1">
+              <a:schemeClr val="accent1"/>
+            </a:fillRef>
+            <a:effectRef idx="0">
+              <a:schemeClr val="accent1"/>
+            </a:effectRef>
+            <a:fontRef idx="minor">
+              <a:schemeClr val="lt1"/>
+            </a:fontRef>
+          </p:style>
+          <p:txBody>
+            <a:bodyPr rtlCol="0" anchor="ctr"/>
+            <a:lstStyle/>
+            <a:p>
+              <a:pPr algn="ctr"/>
+              <a:r>
+                <a:rPr lang="en-US" dirty="0">
+                  <a:solidFill>
+                    <a:schemeClr val="tx1"/>
+                  </a:solidFill>
+                </a:rPr>
+                <a:t>3</a:t>
+              </a:r>
+            </a:p>
+          </p:txBody>
+        </p:sp>
+        <p:sp>
+          <p:nvSpPr>
+            <p:cNvPr id="30" name="Regular Pentagon 29">
+              <a:extLst>
+                <a:ext uri="{FF2B5EF4-FFF2-40B4-BE49-F238E27FC236}">
+                  <a16:creationId xmlns:a16="http://schemas.microsoft.com/office/drawing/2014/main" id="{A25D98F5-D15B-0A4A-8DAC-C706C28FF406}"/>
+                </a:ext>
+              </a:extLst>
+            </p:cNvPr>
+            <p:cNvSpPr>
+              <a:spLocks/>
+            </p:cNvSpPr>
+            <p:nvPr/>
+          </p:nvSpPr>
+          <p:spPr>
+            <a:xfrm>
+              <a:off x="3784126" y="2278007"/>
+              <a:ext cx="274320" cy="274320"/>
+            </a:xfrm>
+            <a:prstGeom prst="pentagon">
+              <a:avLst/>
+            </a:prstGeom>
+            <a:solidFill>
+              <a:srgbClr val="FF0000"/>
+            </a:solidFill>
+            <a:ln w="19050">
+              <a:solidFill>
+                <a:schemeClr val="tx1"/>
+              </a:solidFill>
+            </a:ln>
+          </p:spPr>
+          <p:style>
+            <a:lnRef idx="2">
+              <a:schemeClr val="accent1">
+                <a:shade val="50000"/>
+              </a:schemeClr>
+            </a:lnRef>
+            <a:fillRef idx="1">
+              <a:schemeClr val="accent1"/>
+            </a:fillRef>
+            <a:effectRef idx="0">
+              <a:schemeClr val="accent1"/>
+            </a:effectRef>
+            <a:fontRef idx="minor">
+              <a:schemeClr val="lt1"/>
+            </a:fontRef>
+          </p:style>
+          <p:txBody>
+            <a:bodyPr rtlCol="0" anchor="ctr"/>
+            <a:lstStyle/>
+            <a:p>
+              <a:pPr algn="ctr"/>
+              <a:r>
+                <a:rPr lang="en-US" dirty="0">
+                  <a:solidFill>
+                    <a:schemeClr val="tx1"/>
+                  </a:solidFill>
+                </a:rPr>
+                <a:t>4</a:t>
+              </a:r>
+            </a:p>
+          </p:txBody>
+        </p:sp>
+        <p:sp>
+          <p:nvSpPr>
+            <p:cNvPr id="31" name="Regular Pentagon 30">
+              <a:extLst>
+                <a:ext uri="{FF2B5EF4-FFF2-40B4-BE49-F238E27FC236}">
+                  <a16:creationId xmlns:a16="http://schemas.microsoft.com/office/drawing/2014/main" id="{80710026-CDC3-3A4E-9F87-E6779EA698B5}"/>
+                </a:ext>
+              </a:extLst>
+            </p:cNvPr>
+            <p:cNvSpPr>
+              <a:spLocks/>
+            </p:cNvSpPr>
+            <p:nvPr/>
+          </p:nvSpPr>
+          <p:spPr>
+            <a:xfrm>
+              <a:off x="5124026" y="2285019"/>
+              <a:ext cx="274320" cy="274320"/>
+            </a:xfrm>
+            <a:prstGeom prst="pentagon">
+              <a:avLst/>
+            </a:prstGeom>
+            <a:solidFill>
+              <a:srgbClr val="FF0000"/>
+            </a:solidFill>
+            <a:ln w="19050">
+              <a:solidFill>
+                <a:schemeClr val="tx1"/>
+              </a:solidFill>
+            </a:ln>
+          </p:spPr>
+          <p:style>
+            <a:lnRef idx="2">
+              <a:schemeClr val="accent1">
+                <a:shade val="50000"/>
+              </a:schemeClr>
+            </a:lnRef>
+            <a:fillRef idx="1">
+              <a:schemeClr val="accent1"/>
+            </a:fillRef>
+            <a:effectRef idx="0">
+              <a:schemeClr val="accent1"/>
+            </a:effectRef>
+            <a:fontRef idx="minor">
+              <a:schemeClr val="lt1"/>
+            </a:fontRef>
+          </p:style>
+          <p:txBody>
+            <a:bodyPr rtlCol="0" anchor="ctr"/>
+            <a:lstStyle/>
+            <a:p>
+              <a:pPr algn="ctr"/>
+              <a:r>
+                <a:rPr lang="en-US" dirty="0">
+                  <a:solidFill>
+                    <a:schemeClr val="tx1"/>
+                  </a:solidFill>
+                </a:rPr>
+                <a:t>5</a:t>
+              </a:r>
+            </a:p>
+          </p:txBody>
+        </p:sp>
+        <p:sp>
+          <p:nvSpPr>
+            <p:cNvPr id="32" name="TextBox 31">
+              <a:extLst>
+                <a:ext uri="{FF2B5EF4-FFF2-40B4-BE49-F238E27FC236}">
+                  <a16:creationId xmlns:a16="http://schemas.microsoft.com/office/drawing/2014/main" id="{20A8F07E-5842-A243-B33F-7CEC7C0FC079}"/>
+                </a:ext>
+              </a:extLst>
+            </p:cNvPr>
+            <p:cNvSpPr txBox="1"/>
+            <p:nvPr/>
+          </p:nvSpPr>
+          <p:spPr>
+            <a:xfrm>
+              <a:off x="5058752" y="1027169"/>
+              <a:ext cx="393056" cy="338554"/>
+            </a:xfrm>
+            <a:prstGeom prst="rect">
+              <a:avLst/>
+            </a:prstGeom>
+            <a:noFill/>
+          </p:spPr>
+          <p:txBody>
+            <a:bodyPr wrap="none" rtlCol="0">
+              <a:spAutoFit/>
+            </a:bodyPr>
+            <a:lstStyle/>
+            <a:p>
+              <a:r>
+                <a:rPr lang="en-US" sz="1600" dirty="0"/>
+                <a:t>10</a:t>
+              </a:r>
+            </a:p>
+          </p:txBody>
+        </p:sp>
+        <p:sp>
+          <p:nvSpPr>
+            <p:cNvPr id="33" name="TextBox 32">
+              <a:extLst>
+                <a:ext uri="{FF2B5EF4-FFF2-40B4-BE49-F238E27FC236}">
+                  <a16:creationId xmlns:a16="http://schemas.microsoft.com/office/drawing/2014/main" id="{296AAD93-2782-4B43-A18B-687E7A516F82}"/>
+                </a:ext>
+              </a:extLst>
+            </p:cNvPr>
+            <p:cNvSpPr txBox="1"/>
+            <p:nvPr/>
+          </p:nvSpPr>
+          <p:spPr>
+            <a:xfrm>
+              <a:off x="6249358" y="1027169"/>
+              <a:ext cx="393056" cy="338554"/>
+            </a:xfrm>
+            <a:prstGeom prst="rect">
+              <a:avLst/>
+            </a:prstGeom>
+            <a:noFill/>
+          </p:spPr>
+          <p:txBody>
+            <a:bodyPr wrap="none" rtlCol="0">
+              <a:spAutoFit/>
+            </a:bodyPr>
+            <a:lstStyle/>
+            <a:p>
+              <a:r>
+                <a:rPr lang="en-US" sz="1600" dirty="0"/>
+                <a:t>11</a:t>
+              </a:r>
+            </a:p>
+          </p:txBody>
+        </p:sp>
+        <p:sp>
+          <p:nvSpPr>
+            <p:cNvPr id="34" name="TextBox 33">
+              <a:extLst>
+                <a:ext uri="{FF2B5EF4-FFF2-40B4-BE49-F238E27FC236}">
+                  <a16:creationId xmlns:a16="http://schemas.microsoft.com/office/drawing/2014/main" id="{9802C77B-1CAB-5A48-B9FF-D6FD419E2B93}"/>
+                </a:ext>
+              </a:extLst>
+            </p:cNvPr>
+            <p:cNvSpPr txBox="1"/>
+            <p:nvPr/>
+          </p:nvSpPr>
+          <p:spPr>
+            <a:xfrm>
+              <a:off x="6249358" y="76686"/>
+              <a:ext cx="393056" cy="338554"/>
+            </a:xfrm>
+            <a:prstGeom prst="rect">
+              <a:avLst/>
+            </a:prstGeom>
+            <a:noFill/>
+          </p:spPr>
+          <p:txBody>
+            <a:bodyPr wrap="none" rtlCol="0">
+              <a:spAutoFit/>
+            </a:bodyPr>
+            <a:lstStyle/>
+            <a:p>
+              <a:r>
+                <a:rPr lang="en-US" sz="1600" dirty="0"/>
+                <a:t>12</a:t>
+              </a:r>
+            </a:p>
+          </p:txBody>
+        </p:sp>
+        <p:grpSp>
+          <p:nvGrpSpPr>
+            <p:cNvPr id="44" name="Group 43">
+              <a:extLst>
+                <a:ext uri="{FF2B5EF4-FFF2-40B4-BE49-F238E27FC236}">
+                  <a16:creationId xmlns:a16="http://schemas.microsoft.com/office/drawing/2014/main" id="{60C33FD1-7AE1-4148-A15A-BE4220983E5A}"/>
+                </a:ext>
+              </a:extLst>
+            </p:cNvPr>
+            <p:cNvGrpSpPr/>
+            <p:nvPr/>
+          </p:nvGrpSpPr>
+          <p:grpSpPr>
+            <a:xfrm>
+              <a:off x="4464725" y="874064"/>
+              <a:ext cx="241981" cy="237744"/>
+              <a:chOff x="4327372" y="765015"/>
+              <a:chExt cx="241981" cy="237744"/>
+            </a:xfrm>
+          </p:grpSpPr>
+          <p:sp>
+            <p:nvSpPr>
+              <p:cNvPr id="45" name="Rectangle 44">
+                <a:extLst>
+                  <a:ext uri="{FF2B5EF4-FFF2-40B4-BE49-F238E27FC236}">
+                    <a16:creationId xmlns:a16="http://schemas.microsoft.com/office/drawing/2014/main" id="{92331445-3A8C-E64B-BDCF-546B33D40ADF}"/>
+                  </a:ext>
+                </a:extLst>
+              </p:cNvPr>
+              <p:cNvSpPr>
+                <a:spLocks noChangeAspect="1"/>
+              </p:cNvSpPr>
+              <p:nvPr/>
+            </p:nvSpPr>
+            <p:spPr>
+              <a:xfrm>
+                <a:off x="4327372" y="765015"/>
+                <a:ext cx="118872" cy="237744"/>
+              </a:xfrm>
+              <a:prstGeom prst="rect">
+                <a:avLst/>
+              </a:prstGeom>
+              <a:solidFill>
+                <a:srgbClr val="CD950C"/>
+              </a:solidFill>
+              <a:ln w="19050">
+                <a:solidFill>
+                  <a:schemeClr val="bg1"/>
+                </a:solidFill>
+              </a:ln>
+            </p:spPr>
+            <p:style>
+              <a:lnRef idx="2">
+                <a:schemeClr val="accent1">
+                  <a:shade val="50000"/>
+                </a:schemeClr>
+              </a:lnRef>
+              <a:fillRef idx="1">
+                <a:schemeClr val="accent1"/>
+              </a:fillRef>
+              <a:effectRef idx="0">
+                <a:schemeClr val="accent1"/>
+              </a:effectRef>
+              <a:fontRef idx="minor">
+                <a:schemeClr val="lt1"/>
+              </a:fontRef>
+            </p:style>
+            <p:txBody>
+              <a:bodyPr rtlCol="0" anchor="ctr"/>
+              <a:lstStyle/>
+              <a:p>
+                <a:pPr algn="ctr"/>
+                <a:endParaRPr lang="en-US"/>
+              </a:p>
+            </p:txBody>
+          </p:sp>
+          <p:sp>
+            <p:nvSpPr>
+              <p:cNvPr id="46" name="Rectangle 45">
+                <a:extLst>
+                  <a:ext uri="{FF2B5EF4-FFF2-40B4-BE49-F238E27FC236}">
+                    <a16:creationId xmlns:a16="http://schemas.microsoft.com/office/drawing/2014/main" id="{DDBF12AD-4EBD-3549-83A3-F48783EF8884}"/>
+                  </a:ext>
+                </a:extLst>
+              </p:cNvPr>
+              <p:cNvSpPr>
+                <a:spLocks noChangeAspect="1"/>
+              </p:cNvSpPr>
+              <p:nvPr/>
+            </p:nvSpPr>
+            <p:spPr>
+              <a:xfrm>
+                <a:off x="4450481" y="765015"/>
+                <a:ext cx="118872" cy="237744"/>
+              </a:xfrm>
+              <a:prstGeom prst="rect">
+                <a:avLst/>
+              </a:prstGeom>
+              <a:solidFill>
+                <a:srgbClr val="8B6508"/>
+              </a:solidFill>
+              <a:ln w="19050">
+                <a:solidFill>
+                  <a:schemeClr val="bg1"/>
+                </a:solidFill>
+              </a:ln>
+            </p:spPr>
+            <p:style>
+              <a:lnRef idx="2">
+                <a:schemeClr val="accent1">
+                  <a:shade val="50000"/>
+                </a:schemeClr>
+              </a:lnRef>
+              <a:fillRef idx="1">
+                <a:schemeClr val="accent1"/>
+              </a:fillRef>
+              <a:effectRef idx="0">
+                <a:schemeClr val="accent1"/>
+              </a:effectRef>
+              <a:fontRef idx="minor">
+                <a:schemeClr val="lt1"/>
+              </a:fontRef>
+            </p:style>
+            <p:txBody>
+              <a:bodyPr rtlCol="0" anchor="ctr"/>
+              <a:lstStyle/>
+              <a:p>
+                <a:pPr algn="ctr"/>
+                <a:endParaRPr lang="en-US"/>
+              </a:p>
+            </p:txBody>
+          </p:sp>
+        </p:grpSp>
+        <p:grpSp>
+          <p:nvGrpSpPr>
+            <p:cNvPr id="47" name="Group 46">
+              <a:extLst>
+                <a:ext uri="{FF2B5EF4-FFF2-40B4-BE49-F238E27FC236}">
+                  <a16:creationId xmlns:a16="http://schemas.microsoft.com/office/drawing/2014/main" id="{A2ACD520-11F7-DD47-BD1A-D1640CCC5BA2}"/>
+                </a:ext>
+              </a:extLst>
+            </p:cNvPr>
+            <p:cNvGrpSpPr/>
+            <p:nvPr/>
+          </p:nvGrpSpPr>
+          <p:grpSpPr>
+            <a:xfrm>
+              <a:off x="2938868" y="2111121"/>
+              <a:ext cx="479725" cy="237744"/>
+              <a:chOff x="4405289" y="4438277"/>
+              <a:chExt cx="479725" cy="237744"/>
+            </a:xfrm>
+          </p:grpSpPr>
+          <p:sp>
+            <p:nvSpPr>
+              <p:cNvPr id="48" name="Rectangle 47">
+                <a:extLst>
+                  <a:ext uri="{FF2B5EF4-FFF2-40B4-BE49-F238E27FC236}">
+                    <a16:creationId xmlns:a16="http://schemas.microsoft.com/office/drawing/2014/main" id="{42DE264A-1419-484A-99A4-342AB319FB5C}"/>
+                  </a:ext>
+                </a:extLst>
+              </p:cNvPr>
+              <p:cNvSpPr>
+                <a:spLocks noChangeAspect="1"/>
+              </p:cNvSpPr>
+              <p:nvPr/>
+            </p:nvSpPr>
+            <p:spPr>
+              <a:xfrm>
+                <a:off x="4405289" y="4438277"/>
+                <a:ext cx="118872" cy="237744"/>
+              </a:xfrm>
+              <a:prstGeom prst="rect">
+                <a:avLst/>
+              </a:prstGeom>
+              <a:solidFill>
+                <a:srgbClr val="CD950C"/>
+              </a:solidFill>
+              <a:ln w="19050">
+                <a:solidFill>
+                  <a:schemeClr val="bg1"/>
+                </a:solidFill>
+              </a:ln>
+            </p:spPr>
+            <p:style>
+              <a:lnRef idx="2">
+                <a:schemeClr val="accent1">
+                  <a:shade val="50000"/>
+                </a:schemeClr>
+              </a:lnRef>
+              <a:fillRef idx="1">
+                <a:schemeClr val="accent1"/>
+              </a:fillRef>
+              <a:effectRef idx="0">
+                <a:schemeClr val="accent1"/>
+              </a:effectRef>
+              <a:fontRef idx="minor">
+                <a:schemeClr val="lt1"/>
+              </a:fontRef>
+            </p:style>
+            <p:txBody>
+              <a:bodyPr rtlCol="0" anchor="ctr"/>
+              <a:lstStyle/>
+              <a:p>
+                <a:pPr algn="ctr"/>
+                <a:endParaRPr lang="en-US"/>
+              </a:p>
+            </p:txBody>
+          </p:sp>
+          <p:sp>
+            <p:nvSpPr>
+              <p:cNvPr id="49" name="Rectangle 48">
+                <a:extLst>
+                  <a:ext uri="{FF2B5EF4-FFF2-40B4-BE49-F238E27FC236}">
+                    <a16:creationId xmlns:a16="http://schemas.microsoft.com/office/drawing/2014/main" id="{F3B78E29-3C34-6048-9DA2-9875A1A43FA6}"/>
+                  </a:ext>
+                </a:extLst>
+              </p:cNvPr>
+              <p:cNvSpPr>
+                <a:spLocks noChangeAspect="1"/>
+              </p:cNvSpPr>
+              <p:nvPr/>
+            </p:nvSpPr>
+            <p:spPr>
+              <a:xfrm>
+                <a:off x="4528398" y="4438277"/>
+                <a:ext cx="118872" cy="237744"/>
+              </a:xfrm>
+              <a:prstGeom prst="rect">
+                <a:avLst/>
+              </a:prstGeom>
+              <a:solidFill>
+                <a:srgbClr val="8B6508"/>
+              </a:solidFill>
+              <a:ln w="19050">
+                <a:solidFill>
+                  <a:schemeClr val="bg1"/>
+                </a:solidFill>
+              </a:ln>
+            </p:spPr>
+            <p:style>
+              <a:lnRef idx="2">
+                <a:schemeClr val="accent1">
+                  <a:shade val="50000"/>
+                </a:schemeClr>
+              </a:lnRef>
+              <a:fillRef idx="1">
+                <a:schemeClr val="accent1"/>
+              </a:fillRef>
+              <a:effectRef idx="0">
+                <a:schemeClr val="accent1"/>
+              </a:effectRef>
+              <a:fontRef idx="minor">
+                <a:schemeClr val="lt1"/>
+              </a:fontRef>
+            </p:style>
+            <p:txBody>
+              <a:bodyPr rtlCol="0" anchor="ctr"/>
+              <a:lstStyle/>
+              <a:p>
+                <a:pPr algn="ctr"/>
+                <a:endParaRPr lang="en-US"/>
+              </a:p>
+            </p:txBody>
+          </p:sp>
+          <p:sp>
+            <p:nvSpPr>
+              <p:cNvPr id="50" name="Rectangle 49">
+                <a:extLst>
+                  <a:ext uri="{FF2B5EF4-FFF2-40B4-BE49-F238E27FC236}">
+                    <a16:creationId xmlns:a16="http://schemas.microsoft.com/office/drawing/2014/main" id="{F84412E2-FBFA-6942-BBB4-5789073B96F1}"/>
+                  </a:ext>
+                </a:extLst>
+              </p:cNvPr>
+              <p:cNvSpPr>
+                <a:spLocks noChangeAspect="1"/>
+              </p:cNvSpPr>
+              <p:nvPr/>
+            </p:nvSpPr>
+            <p:spPr>
+              <a:xfrm>
+                <a:off x="4647270" y="4438277"/>
+                <a:ext cx="118872" cy="237744"/>
+              </a:xfrm>
+              <a:prstGeom prst="rect">
+                <a:avLst/>
+              </a:prstGeom>
+              <a:solidFill>
+                <a:srgbClr val="CD950C"/>
+              </a:solidFill>
+              <a:ln w="19050">
+                <a:solidFill>
+                  <a:schemeClr val="bg1"/>
+                </a:solidFill>
+              </a:ln>
+            </p:spPr>
+            <p:style>
+              <a:lnRef idx="2">
+                <a:schemeClr val="accent1">
+                  <a:shade val="50000"/>
+                </a:schemeClr>
+              </a:lnRef>
+              <a:fillRef idx="1">
+                <a:schemeClr val="accent1"/>
+              </a:fillRef>
+              <a:effectRef idx="0">
+                <a:schemeClr val="accent1"/>
+              </a:effectRef>
+              <a:fontRef idx="minor">
+                <a:schemeClr val="lt1"/>
+              </a:fontRef>
+            </p:style>
+            <p:txBody>
+              <a:bodyPr rtlCol="0" anchor="ctr"/>
+              <a:lstStyle/>
+              <a:p>
+                <a:pPr algn="ctr"/>
+                <a:endParaRPr lang="en-US"/>
+              </a:p>
+            </p:txBody>
+          </p:sp>
+          <p:sp>
+            <p:nvSpPr>
+              <p:cNvPr id="51" name="Rectangle 50">
+                <a:extLst>
+                  <a:ext uri="{FF2B5EF4-FFF2-40B4-BE49-F238E27FC236}">
+                    <a16:creationId xmlns:a16="http://schemas.microsoft.com/office/drawing/2014/main" id="{052ADDF2-1E7E-8242-B46F-98B9CE6E3463}"/>
+                  </a:ext>
+                </a:extLst>
+              </p:cNvPr>
+              <p:cNvSpPr>
+                <a:spLocks noChangeAspect="1"/>
+              </p:cNvSpPr>
+              <p:nvPr/>
+            </p:nvSpPr>
+            <p:spPr>
+              <a:xfrm>
+                <a:off x="4766142" y="4438277"/>
+                <a:ext cx="118872" cy="237744"/>
+              </a:xfrm>
+              <a:prstGeom prst="rect">
+                <a:avLst/>
+              </a:prstGeom>
+              <a:solidFill>
+                <a:srgbClr val="8B6508"/>
+              </a:solidFill>
+              <a:ln w="19050">
+                <a:solidFill>
+                  <a:schemeClr val="bg1"/>
+                </a:solidFill>
+              </a:ln>
+            </p:spPr>
+            <p:style>
+              <a:lnRef idx="2">
+                <a:schemeClr val="accent1">
+                  <a:shade val="50000"/>
+                </a:schemeClr>
+              </a:lnRef>
+              <a:fillRef idx="1">
+                <a:schemeClr val="accent1"/>
+              </a:fillRef>
+              <a:effectRef idx="0">
+                <a:schemeClr val="accent1"/>
+              </a:effectRef>
+              <a:fontRef idx="minor">
+                <a:schemeClr val="lt1"/>
+              </a:fontRef>
+            </p:style>
+            <p:txBody>
+              <a:bodyPr rtlCol="0" anchor="ctr"/>
+              <a:lstStyle/>
+              <a:p>
+                <a:pPr algn="ctr"/>
+                <a:endParaRPr lang="en-US"/>
+              </a:p>
+            </p:txBody>
+          </p:sp>
+        </p:grpSp>
       </p:grpSp>
     </p:spTree>
     <p:extLst>

</xml_diff>

<commit_message>
added obstacle labels to full map
</commit_message>
<xml_diff>
--- a/XPlanningEvaluation/data/instruction/instruction-color-blind-friendly.pptx
+++ b/XPlanningEvaluation/data/instruction/instruction-color-blind-friendly.pptx
@@ -5,7 +5,7 @@
     <p:sldMasterId id="2147483648" r:id="rId1"/>
   </p:sldMasterIdLst>
   <p:notesMasterIdLst>
-    <p:notesMasterId r:id="rId21"/>
+    <p:notesMasterId r:id="rId22"/>
   </p:notesMasterIdLst>
   <p:sldIdLst>
     <p:sldId id="258" r:id="rId2"/>
@@ -22,11 +22,12 @@
     <p:sldId id="284" r:id="rId13"/>
     <p:sldId id="291" r:id="rId14"/>
     <p:sldId id="296" r:id="rId15"/>
-    <p:sldId id="287" r:id="rId16"/>
-    <p:sldId id="297" r:id="rId17"/>
-    <p:sldId id="301" r:id="rId18"/>
-    <p:sldId id="299" r:id="rId19"/>
-    <p:sldId id="302" r:id="rId20"/>
+    <p:sldId id="303" r:id="rId16"/>
+    <p:sldId id="287" r:id="rId17"/>
+    <p:sldId id="297" r:id="rId18"/>
+    <p:sldId id="301" r:id="rId19"/>
+    <p:sldId id="299" r:id="rId20"/>
+    <p:sldId id="302" r:id="rId21"/>
   </p:sldIdLst>
   <p:sldSz cx="12192000" cy="6858000"/>
   <p:notesSz cx="6858000" cy="9144000"/>
@@ -215,7 +216,7 @@
           <a:p>
             <a:fld id="{EFB11D43-C1E7-274A-84D8-148414CF7825}" type="datetimeFigureOut">
               <a:rPr lang="en-US" smtClean="0"/>
-              <a:t>9/13/19</a:t>
+              <a:t>4/9/20</a:t>
             </a:fld>
             <a:endParaRPr lang="en-US"/>
           </a:p>
@@ -1113,6 +1114,10 @@
           <a:bodyPr/>
           <a:lstStyle/>
           <a:p>
+            <a:pPr marL="171450" indent="-171450">
+              <a:buFont typeface="Arial" panose="020B0604020202020204" pitchFamily="34" charset="0"/>
+              <a:buChar char="•"/>
+            </a:pPr>
             <a:endParaRPr lang="en-US" dirty="0"/>
           </a:p>
         </p:txBody>
@@ -1134,7 +1139,91 @@
           <a:p>
             <a:fld id="{EB44CB67-3B38-3142-A3A6-00A348D8C8B3}" type="slidenum">
               <a:rPr lang="en-US" smtClean="0"/>
-              <a:t>16</a:t>
+              <a:t>15</a:t>
+            </a:fld>
+            <a:endParaRPr lang="en-US"/>
+          </a:p>
+        </p:txBody>
+      </p:sp>
+    </p:spTree>
+    <p:extLst>
+      <p:ext uri="{BB962C8B-B14F-4D97-AF65-F5344CB8AC3E}">
+        <p14:creationId xmlns:p14="http://schemas.microsoft.com/office/powerpoint/2010/main" val="554554788"/>
+      </p:ext>
+    </p:extLst>
+  </p:cSld>
+  <p:clrMapOvr>
+    <a:masterClrMapping/>
+  </p:clrMapOvr>
+</p:notes>
+</file>
+
+<file path=ppt/notesSlides/notesSlide7.xml><?xml version="1.0" encoding="utf-8"?>
+<p:notes xmlns:a="http://schemas.openxmlformats.org/drawingml/2006/main" xmlns:r="http://schemas.openxmlformats.org/officeDocument/2006/relationships" xmlns:p="http://schemas.openxmlformats.org/presentationml/2006/main">
+  <p:cSld>
+    <p:spTree>
+      <p:nvGrpSpPr>
+        <p:cNvPr id="1" name=""/>
+        <p:cNvGrpSpPr/>
+        <p:nvPr/>
+      </p:nvGrpSpPr>
+      <p:grpSpPr>
+        <a:xfrm>
+          <a:off x="0" y="0"/>
+          <a:ext cx="0" cy="0"/>
+          <a:chOff x="0" y="0"/>
+          <a:chExt cx="0" cy="0"/>
+        </a:xfrm>
+      </p:grpSpPr>
+      <p:sp>
+        <p:nvSpPr>
+          <p:cNvPr id="2" name="Slide Image Placeholder 1"/>
+          <p:cNvSpPr>
+            <a:spLocks noGrp="1" noRot="1" noChangeAspect="1"/>
+          </p:cNvSpPr>
+          <p:nvPr>
+            <p:ph type="sldImg"/>
+          </p:nvPr>
+        </p:nvSpPr>
+        <p:spPr/>
+      </p:sp>
+      <p:sp>
+        <p:nvSpPr>
+          <p:cNvPr id="3" name="Notes Placeholder 2"/>
+          <p:cNvSpPr>
+            <a:spLocks noGrp="1"/>
+          </p:cNvSpPr>
+          <p:nvPr>
+            <p:ph type="body" idx="1"/>
+          </p:nvPr>
+        </p:nvSpPr>
+        <p:spPr/>
+        <p:txBody>
+          <a:bodyPr/>
+          <a:lstStyle/>
+          <a:p>
+            <a:endParaRPr lang="en-US" dirty="0"/>
+          </a:p>
+        </p:txBody>
+      </p:sp>
+      <p:sp>
+        <p:nvSpPr>
+          <p:cNvPr id="4" name="Slide Number Placeholder 3"/>
+          <p:cNvSpPr>
+            <a:spLocks noGrp="1"/>
+          </p:cNvSpPr>
+          <p:nvPr>
+            <p:ph type="sldNum" sz="quarter" idx="5"/>
+          </p:nvPr>
+        </p:nvSpPr>
+        <p:spPr/>
+        <p:txBody>
+          <a:bodyPr/>
+          <a:lstStyle/>
+          <a:p>
+            <a:fld id="{EB44CB67-3B38-3142-A3A6-00A348D8C8B3}" type="slidenum">
+              <a:rPr lang="en-US" smtClean="0"/>
+              <a:t>17</a:t>
             </a:fld>
             <a:endParaRPr lang="en-US"/>
           </a:p>
@@ -1300,7 +1389,7 @@
           <a:p>
             <a:fld id="{3D5FB918-36D9-FF42-B3AA-21D6BEE0D123}" type="datetimeFigureOut">
               <a:rPr lang="en-US" smtClean="0"/>
-              <a:t>9/13/19</a:t>
+              <a:t>4/9/20</a:t>
             </a:fld>
             <a:endParaRPr lang="en-US"/>
           </a:p>
@@ -1498,7 +1587,7 @@
           <a:p>
             <a:fld id="{3D5FB918-36D9-FF42-B3AA-21D6BEE0D123}" type="datetimeFigureOut">
               <a:rPr lang="en-US" smtClean="0"/>
-              <a:t>9/13/19</a:t>
+              <a:t>4/9/20</a:t>
             </a:fld>
             <a:endParaRPr lang="en-US"/>
           </a:p>
@@ -1706,7 +1795,7 @@
           <a:p>
             <a:fld id="{3D5FB918-36D9-FF42-B3AA-21D6BEE0D123}" type="datetimeFigureOut">
               <a:rPr lang="en-US" smtClean="0"/>
-              <a:t>9/13/19</a:t>
+              <a:t>4/9/20</a:t>
             </a:fld>
             <a:endParaRPr lang="en-US"/>
           </a:p>
@@ -1904,7 +1993,7 @@
           <a:p>
             <a:fld id="{3D5FB918-36D9-FF42-B3AA-21D6BEE0D123}" type="datetimeFigureOut">
               <a:rPr lang="en-US" smtClean="0"/>
-              <a:t>9/13/19</a:t>
+              <a:t>4/9/20</a:t>
             </a:fld>
             <a:endParaRPr lang="en-US"/>
           </a:p>
@@ -2179,7 +2268,7 @@
           <a:p>
             <a:fld id="{3D5FB918-36D9-FF42-B3AA-21D6BEE0D123}" type="datetimeFigureOut">
               <a:rPr lang="en-US" smtClean="0"/>
-              <a:t>9/13/19</a:t>
+              <a:t>4/9/20</a:t>
             </a:fld>
             <a:endParaRPr lang="en-US"/>
           </a:p>
@@ -2444,7 +2533,7 @@
           <a:p>
             <a:fld id="{3D5FB918-36D9-FF42-B3AA-21D6BEE0D123}" type="datetimeFigureOut">
               <a:rPr lang="en-US" smtClean="0"/>
-              <a:t>9/13/19</a:t>
+              <a:t>4/9/20</a:t>
             </a:fld>
             <a:endParaRPr lang="en-US"/>
           </a:p>
@@ -2856,7 +2945,7 @@
           <a:p>
             <a:fld id="{3D5FB918-36D9-FF42-B3AA-21D6BEE0D123}" type="datetimeFigureOut">
               <a:rPr lang="en-US" smtClean="0"/>
-              <a:t>9/13/19</a:t>
+              <a:t>4/9/20</a:t>
             </a:fld>
             <a:endParaRPr lang="en-US"/>
           </a:p>
@@ -2997,7 +3086,7 @@
           <a:p>
             <a:fld id="{3D5FB918-36D9-FF42-B3AA-21D6BEE0D123}" type="datetimeFigureOut">
               <a:rPr lang="en-US" smtClean="0"/>
-              <a:t>9/13/19</a:t>
+              <a:t>4/9/20</a:t>
             </a:fld>
             <a:endParaRPr lang="en-US"/>
           </a:p>
@@ -3110,7 +3199,7 @@
           <a:p>
             <a:fld id="{3D5FB918-36D9-FF42-B3AA-21D6BEE0D123}" type="datetimeFigureOut">
               <a:rPr lang="en-US" smtClean="0"/>
-              <a:t>9/13/19</a:t>
+              <a:t>4/9/20</a:t>
             </a:fld>
             <a:endParaRPr lang="en-US"/>
           </a:p>
@@ -3421,7 +3510,7 @@
           <a:p>
             <a:fld id="{3D5FB918-36D9-FF42-B3AA-21D6BEE0D123}" type="datetimeFigureOut">
               <a:rPr lang="en-US" smtClean="0"/>
-              <a:t>9/13/19</a:t>
+              <a:t>4/9/20</a:t>
             </a:fld>
             <a:endParaRPr lang="en-US"/>
           </a:p>
@@ -3709,7 +3798,7 @@
           <a:p>
             <a:fld id="{3D5FB918-36D9-FF42-B3AA-21D6BEE0D123}" type="datetimeFigureOut">
               <a:rPr lang="en-US" smtClean="0"/>
-              <a:t>9/13/19</a:t>
+              <a:t>4/9/20</a:t>
             </a:fld>
             <a:endParaRPr lang="en-US"/>
           </a:p>
@@ -3950,7 +4039,7 @@
           <a:p>
             <a:fld id="{3D5FB918-36D9-FF42-B3AA-21D6BEE0D123}" type="datetimeFigureOut">
               <a:rPr lang="en-US" smtClean="0"/>
-              <a:t>9/13/19</a:t>
+              <a:t>4/9/20</a:t>
             </a:fld>
             <a:endParaRPr lang="en-US"/>
           </a:p>
@@ -14628,6 +14717,2568 @@
           <a:chExt cx="0" cy="0"/>
         </a:xfrm>
       </p:grpSpPr>
+      <p:pic>
+        <p:nvPicPr>
+          <p:cNvPr id="2" name="Picture 1">
+            <a:extLst>
+              <a:ext uri="{FF2B5EF4-FFF2-40B4-BE49-F238E27FC236}">
+                <a16:creationId xmlns:a16="http://schemas.microsoft.com/office/drawing/2014/main" id="{1F29CBBD-0258-F442-8CFE-F09FFE818D11}"/>
+              </a:ext>
+            </a:extLst>
+          </p:cNvPr>
+          <p:cNvPicPr>
+            <a:picLocks noChangeAspect="1"/>
+          </p:cNvPicPr>
+          <p:nvPr/>
+        </p:nvPicPr>
+        <p:blipFill rotWithShape="1">
+          <a:blip r:embed="rId3"/>
+          <a:srcRect t="8798" r="51455" b="56701"/>
+          <a:stretch/>
+        </p:blipFill>
+        <p:spPr>
+          <a:xfrm>
+            <a:off x="0" y="0"/>
+            <a:ext cx="6645135" cy="3657600"/>
+          </a:xfrm>
+          <a:prstGeom prst="rect">
+            <a:avLst/>
+          </a:prstGeom>
+        </p:spPr>
+      </p:pic>
+      <p:sp>
+        <p:nvSpPr>
+          <p:cNvPr id="5" name="5-Point Star 4">
+            <a:extLst>
+              <a:ext uri="{FF2B5EF4-FFF2-40B4-BE49-F238E27FC236}">
+                <a16:creationId xmlns:a16="http://schemas.microsoft.com/office/drawing/2014/main" id="{8DB8F06C-CAE0-2E42-8AF0-1EE4A7F4EB3C}"/>
+              </a:ext>
+            </a:extLst>
+          </p:cNvPr>
+          <p:cNvSpPr>
+            <a:spLocks noChangeAspect="1"/>
+          </p:cNvSpPr>
+          <p:nvPr/>
+        </p:nvSpPr>
+        <p:spPr>
+          <a:xfrm>
+            <a:off x="6179004" y="2145402"/>
+            <a:ext cx="365760" cy="365760"/>
+          </a:xfrm>
+          <a:prstGeom prst="star5">
+            <a:avLst/>
+          </a:prstGeom>
+          <a:solidFill>
+            <a:srgbClr val="CC79A7"/>
+          </a:solidFill>
+          <a:ln>
+            <a:solidFill>
+              <a:schemeClr val="accent1">
+                <a:lumMod val="50000"/>
+              </a:schemeClr>
+            </a:solidFill>
+          </a:ln>
+        </p:spPr>
+        <p:style>
+          <a:lnRef idx="2">
+            <a:schemeClr val="accent1">
+              <a:shade val="50000"/>
+            </a:schemeClr>
+          </a:lnRef>
+          <a:fillRef idx="1">
+            <a:schemeClr val="accent1"/>
+          </a:fillRef>
+          <a:effectRef idx="0">
+            <a:schemeClr val="accent1"/>
+          </a:effectRef>
+          <a:fontRef idx="minor">
+            <a:schemeClr val="lt1"/>
+          </a:fontRef>
+        </p:style>
+        <p:txBody>
+          <a:bodyPr rtlCol="0" anchor="ctr"/>
+          <a:lstStyle/>
+          <a:p>
+            <a:pPr algn="ctr"/>
+            <a:endParaRPr lang="en-US"/>
+          </a:p>
+        </p:txBody>
+      </p:sp>
+      <p:sp>
+        <p:nvSpPr>
+          <p:cNvPr id="9" name="TextBox 8">
+            <a:extLst>
+              <a:ext uri="{FF2B5EF4-FFF2-40B4-BE49-F238E27FC236}">
+                <a16:creationId xmlns:a16="http://schemas.microsoft.com/office/drawing/2014/main" id="{F3BE6089-08BE-A544-A310-02A323F0D7C6}"/>
+              </a:ext>
+            </a:extLst>
+          </p:cNvPr>
+          <p:cNvSpPr txBox="1"/>
+          <p:nvPr/>
+        </p:nvSpPr>
+        <p:spPr>
+          <a:xfrm>
+            <a:off x="6645135" y="2191122"/>
+            <a:ext cx="615874" cy="369332"/>
+          </a:xfrm>
+          <a:prstGeom prst="rect">
+            <a:avLst/>
+          </a:prstGeom>
+          <a:noFill/>
+        </p:spPr>
+        <p:txBody>
+          <a:bodyPr wrap="none" rtlCol="0">
+            <a:spAutoFit/>
+          </a:bodyPr>
+          <a:lstStyle/>
+          <a:p>
+            <a:r>
+              <a:rPr lang="en-US" dirty="0"/>
+              <a:t>Goal</a:t>
+            </a:r>
+          </a:p>
+        </p:txBody>
+      </p:sp>
+      <p:sp>
+        <p:nvSpPr>
+          <p:cNvPr id="12" name="TextBox 11">
+            <a:extLst>
+              <a:ext uri="{FF2B5EF4-FFF2-40B4-BE49-F238E27FC236}">
+                <a16:creationId xmlns:a16="http://schemas.microsoft.com/office/drawing/2014/main" id="{40BC0126-A564-9640-BA29-43CE3B906A09}"/>
+              </a:ext>
+            </a:extLst>
+          </p:cNvPr>
+          <p:cNvSpPr txBox="1"/>
+          <p:nvPr/>
+        </p:nvSpPr>
+        <p:spPr>
+          <a:xfrm>
+            <a:off x="3721516" y="2191122"/>
+            <a:ext cx="1987147" cy="461665"/>
+          </a:xfrm>
+          <a:prstGeom prst="rect">
+            <a:avLst/>
+          </a:prstGeom>
+          <a:noFill/>
+        </p:spPr>
+        <p:txBody>
+          <a:bodyPr wrap="none" rtlCol="0">
+            <a:spAutoFit/>
+          </a:bodyPr>
+          <a:lstStyle/>
+          <a:p>
+            <a:r>
+              <a:rPr lang="en-US" sz="2400" dirty="0">
+                <a:solidFill>
+                  <a:srgbClr val="C00000"/>
+                </a:solidFill>
+              </a:rPr>
+              <a:t>Private Offices</a:t>
+            </a:r>
+          </a:p>
+        </p:txBody>
+      </p:sp>
+      <p:grpSp>
+        <p:nvGrpSpPr>
+          <p:cNvPr id="7" name="Group 6">
+            <a:extLst>
+              <a:ext uri="{FF2B5EF4-FFF2-40B4-BE49-F238E27FC236}">
+                <a16:creationId xmlns:a16="http://schemas.microsoft.com/office/drawing/2014/main" id="{5682E90D-E132-2B45-A11C-59353BCEB32E}"/>
+              </a:ext>
+            </a:extLst>
+          </p:cNvPr>
+          <p:cNvGrpSpPr/>
+          <p:nvPr/>
+        </p:nvGrpSpPr>
+        <p:grpSpPr>
+          <a:xfrm>
+            <a:off x="2451495" y="1827350"/>
+            <a:ext cx="3336640" cy="1830249"/>
+            <a:chOff x="2451495" y="1827350"/>
+            <a:chExt cx="3336640" cy="1830249"/>
+          </a:xfrm>
+          <a:solidFill>
+            <a:srgbClr val="FF0000"/>
+          </a:solidFill>
+        </p:grpSpPr>
+        <p:sp>
+          <p:nvSpPr>
+            <p:cNvPr id="4" name="Rectangle 3">
+              <a:extLst>
+                <a:ext uri="{FF2B5EF4-FFF2-40B4-BE49-F238E27FC236}">
+                  <a16:creationId xmlns:a16="http://schemas.microsoft.com/office/drawing/2014/main" id="{60BDB631-105C-EB40-8EBF-A20C497F9FFC}"/>
+                </a:ext>
+              </a:extLst>
+            </p:cNvPr>
+            <p:cNvSpPr/>
+            <p:nvPr/>
+          </p:nvSpPr>
+          <p:spPr>
+            <a:xfrm>
+              <a:off x="2583286" y="1827350"/>
+              <a:ext cx="228600" cy="411480"/>
+            </a:xfrm>
+            <a:prstGeom prst="rect">
+              <a:avLst/>
+            </a:prstGeom>
+            <a:grpFill/>
+            <a:ln>
+              <a:noFill/>
+            </a:ln>
+          </p:spPr>
+          <p:style>
+            <a:lnRef idx="2">
+              <a:schemeClr val="accent1">
+                <a:shade val="50000"/>
+              </a:schemeClr>
+            </a:lnRef>
+            <a:fillRef idx="1">
+              <a:schemeClr val="accent1"/>
+            </a:fillRef>
+            <a:effectRef idx="0">
+              <a:schemeClr val="accent1"/>
+            </a:effectRef>
+            <a:fontRef idx="minor">
+              <a:schemeClr val="lt1"/>
+            </a:fontRef>
+          </p:style>
+          <p:txBody>
+            <a:bodyPr rtlCol="0" anchor="ctr"/>
+            <a:lstStyle/>
+            <a:p>
+              <a:pPr algn="ctr"/>
+              <a:endParaRPr lang="en-US"/>
+            </a:p>
+          </p:txBody>
+        </p:sp>
+        <p:sp>
+          <p:nvSpPr>
+            <p:cNvPr id="19" name="Rectangle 18">
+              <a:extLst>
+                <a:ext uri="{FF2B5EF4-FFF2-40B4-BE49-F238E27FC236}">
+                  <a16:creationId xmlns:a16="http://schemas.microsoft.com/office/drawing/2014/main" id="{1CDB0BD3-E905-5946-AC15-4D764AAF07B2}"/>
+                </a:ext>
+              </a:extLst>
+            </p:cNvPr>
+            <p:cNvSpPr/>
+            <p:nvPr/>
+          </p:nvSpPr>
+          <p:spPr>
+            <a:xfrm>
+              <a:off x="2901703" y="1827350"/>
+              <a:ext cx="228600" cy="411480"/>
+            </a:xfrm>
+            <a:prstGeom prst="rect">
+              <a:avLst/>
+            </a:prstGeom>
+            <a:grpFill/>
+            <a:ln>
+              <a:noFill/>
+            </a:ln>
+          </p:spPr>
+          <p:style>
+            <a:lnRef idx="2">
+              <a:schemeClr val="accent1">
+                <a:shade val="50000"/>
+              </a:schemeClr>
+            </a:lnRef>
+            <a:fillRef idx="1">
+              <a:schemeClr val="accent1"/>
+            </a:fillRef>
+            <a:effectRef idx="0">
+              <a:schemeClr val="accent1"/>
+            </a:effectRef>
+            <a:fontRef idx="minor">
+              <a:schemeClr val="lt1"/>
+            </a:fontRef>
+          </p:style>
+          <p:txBody>
+            <a:bodyPr rtlCol="0" anchor="ctr"/>
+            <a:lstStyle/>
+            <a:p>
+              <a:pPr algn="ctr"/>
+              <a:endParaRPr lang="en-US"/>
+            </a:p>
+          </p:txBody>
+        </p:sp>
+        <p:sp>
+          <p:nvSpPr>
+            <p:cNvPr id="20" name="Rectangle 19">
+              <a:extLst>
+                <a:ext uri="{FF2B5EF4-FFF2-40B4-BE49-F238E27FC236}">
+                  <a16:creationId xmlns:a16="http://schemas.microsoft.com/office/drawing/2014/main" id="{DAB96A59-984F-8348-86FC-B8C4B57C1E51}"/>
+                </a:ext>
+              </a:extLst>
+            </p:cNvPr>
+            <p:cNvSpPr/>
+            <p:nvPr/>
+          </p:nvSpPr>
+          <p:spPr>
+            <a:xfrm>
+              <a:off x="3220120" y="1827350"/>
+              <a:ext cx="228600" cy="411480"/>
+            </a:xfrm>
+            <a:prstGeom prst="rect">
+              <a:avLst/>
+            </a:prstGeom>
+            <a:grpFill/>
+            <a:ln>
+              <a:noFill/>
+            </a:ln>
+          </p:spPr>
+          <p:style>
+            <a:lnRef idx="2">
+              <a:schemeClr val="accent1">
+                <a:shade val="50000"/>
+              </a:schemeClr>
+            </a:lnRef>
+            <a:fillRef idx="1">
+              <a:schemeClr val="accent1"/>
+            </a:fillRef>
+            <a:effectRef idx="0">
+              <a:schemeClr val="accent1"/>
+            </a:effectRef>
+            <a:fontRef idx="minor">
+              <a:schemeClr val="lt1"/>
+            </a:fontRef>
+          </p:style>
+          <p:txBody>
+            <a:bodyPr rtlCol="0" anchor="ctr"/>
+            <a:lstStyle/>
+            <a:p>
+              <a:pPr algn="ctr"/>
+              <a:endParaRPr lang="en-US"/>
+            </a:p>
+          </p:txBody>
+        </p:sp>
+        <p:sp>
+          <p:nvSpPr>
+            <p:cNvPr id="21" name="Rectangle 20">
+              <a:extLst>
+                <a:ext uri="{FF2B5EF4-FFF2-40B4-BE49-F238E27FC236}">
+                  <a16:creationId xmlns:a16="http://schemas.microsoft.com/office/drawing/2014/main" id="{2B873526-8C85-E74C-8EC8-D778E59D29BA}"/>
+                </a:ext>
+              </a:extLst>
+            </p:cNvPr>
+            <p:cNvSpPr/>
+            <p:nvPr/>
+          </p:nvSpPr>
+          <p:spPr>
+            <a:xfrm>
+              <a:off x="3538537" y="1827350"/>
+              <a:ext cx="228600" cy="411480"/>
+            </a:xfrm>
+            <a:prstGeom prst="rect">
+              <a:avLst/>
+            </a:prstGeom>
+            <a:grpFill/>
+            <a:ln>
+              <a:noFill/>
+            </a:ln>
+          </p:spPr>
+          <p:style>
+            <a:lnRef idx="2">
+              <a:schemeClr val="accent1">
+                <a:shade val="50000"/>
+              </a:schemeClr>
+            </a:lnRef>
+            <a:fillRef idx="1">
+              <a:schemeClr val="accent1"/>
+            </a:fillRef>
+            <a:effectRef idx="0">
+              <a:schemeClr val="accent1"/>
+            </a:effectRef>
+            <a:fontRef idx="minor">
+              <a:schemeClr val="lt1"/>
+            </a:fontRef>
+          </p:style>
+          <p:txBody>
+            <a:bodyPr rtlCol="0" anchor="ctr"/>
+            <a:lstStyle/>
+            <a:p>
+              <a:pPr algn="ctr"/>
+              <a:endParaRPr lang="en-US"/>
+            </a:p>
+          </p:txBody>
+        </p:sp>
+        <p:sp>
+          <p:nvSpPr>
+            <p:cNvPr id="22" name="Rectangle 21">
+              <a:extLst>
+                <a:ext uri="{FF2B5EF4-FFF2-40B4-BE49-F238E27FC236}">
+                  <a16:creationId xmlns:a16="http://schemas.microsoft.com/office/drawing/2014/main" id="{568CB06F-EEE6-7240-82D5-DD634EF9511C}"/>
+                </a:ext>
+              </a:extLst>
+            </p:cNvPr>
+            <p:cNvSpPr/>
+            <p:nvPr/>
+          </p:nvSpPr>
+          <p:spPr>
+            <a:xfrm>
+              <a:off x="3856954" y="1827350"/>
+              <a:ext cx="228600" cy="411480"/>
+            </a:xfrm>
+            <a:prstGeom prst="rect">
+              <a:avLst/>
+            </a:prstGeom>
+            <a:grpFill/>
+            <a:ln>
+              <a:noFill/>
+            </a:ln>
+          </p:spPr>
+          <p:style>
+            <a:lnRef idx="2">
+              <a:schemeClr val="accent1">
+                <a:shade val="50000"/>
+              </a:schemeClr>
+            </a:lnRef>
+            <a:fillRef idx="1">
+              <a:schemeClr val="accent1"/>
+            </a:fillRef>
+            <a:effectRef idx="0">
+              <a:schemeClr val="accent1"/>
+            </a:effectRef>
+            <a:fontRef idx="minor">
+              <a:schemeClr val="lt1"/>
+            </a:fontRef>
+          </p:style>
+          <p:txBody>
+            <a:bodyPr rtlCol="0" anchor="ctr"/>
+            <a:lstStyle/>
+            <a:p>
+              <a:pPr algn="ctr"/>
+              <a:endParaRPr lang="en-US"/>
+            </a:p>
+          </p:txBody>
+        </p:sp>
+        <p:sp>
+          <p:nvSpPr>
+            <p:cNvPr id="23" name="Rectangle 22">
+              <a:extLst>
+                <a:ext uri="{FF2B5EF4-FFF2-40B4-BE49-F238E27FC236}">
+                  <a16:creationId xmlns:a16="http://schemas.microsoft.com/office/drawing/2014/main" id="{48A8790F-7865-C440-9D2A-6FAE477EA528}"/>
+                </a:ext>
+              </a:extLst>
+            </p:cNvPr>
+            <p:cNvSpPr/>
+            <p:nvPr/>
+          </p:nvSpPr>
+          <p:spPr>
+            <a:xfrm>
+              <a:off x="4175371" y="1827350"/>
+              <a:ext cx="228600" cy="411480"/>
+            </a:xfrm>
+            <a:prstGeom prst="rect">
+              <a:avLst/>
+            </a:prstGeom>
+            <a:grpFill/>
+            <a:ln>
+              <a:noFill/>
+            </a:ln>
+          </p:spPr>
+          <p:style>
+            <a:lnRef idx="2">
+              <a:schemeClr val="accent1">
+                <a:shade val="50000"/>
+              </a:schemeClr>
+            </a:lnRef>
+            <a:fillRef idx="1">
+              <a:schemeClr val="accent1"/>
+            </a:fillRef>
+            <a:effectRef idx="0">
+              <a:schemeClr val="accent1"/>
+            </a:effectRef>
+            <a:fontRef idx="minor">
+              <a:schemeClr val="lt1"/>
+            </a:fontRef>
+          </p:style>
+          <p:txBody>
+            <a:bodyPr rtlCol="0" anchor="ctr"/>
+            <a:lstStyle/>
+            <a:p>
+              <a:pPr algn="ctr"/>
+              <a:endParaRPr lang="en-US"/>
+            </a:p>
+          </p:txBody>
+        </p:sp>
+        <p:sp>
+          <p:nvSpPr>
+            <p:cNvPr id="24" name="Rectangle 23">
+              <a:extLst>
+                <a:ext uri="{FF2B5EF4-FFF2-40B4-BE49-F238E27FC236}">
+                  <a16:creationId xmlns:a16="http://schemas.microsoft.com/office/drawing/2014/main" id="{A0BBB900-D7C4-DB4B-A6EB-4EC96A1F03AA}"/>
+                </a:ext>
+              </a:extLst>
+            </p:cNvPr>
+            <p:cNvSpPr/>
+            <p:nvPr/>
+          </p:nvSpPr>
+          <p:spPr>
+            <a:xfrm>
+              <a:off x="4493788" y="1827350"/>
+              <a:ext cx="228600" cy="411480"/>
+            </a:xfrm>
+            <a:prstGeom prst="rect">
+              <a:avLst/>
+            </a:prstGeom>
+            <a:grpFill/>
+            <a:ln>
+              <a:noFill/>
+            </a:ln>
+          </p:spPr>
+          <p:style>
+            <a:lnRef idx="2">
+              <a:schemeClr val="accent1">
+                <a:shade val="50000"/>
+              </a:schemeClr>
+            </a:lnRef>
+            <a:fillRef idx="1">
+              <a:schemeClr val="accent1"/>
+            </a:fillRef>
+            <a:effectRef idx="0">
+              <a:schemeClr val="accent1"/>
+            </a:effectRef>
+            <a:fontRef idx="minor">
+              <a:schemeClr val="lt1"/>
+            </a:fontRef>
+          </p:style>
+          <p:txBody>
+            <a:bodyPr rtlCol="0" anchor="ctr"/>
+            <a:lstStyle/>
+            <a:p>
+              <a:pPr algn="ctr"/>
+              <a:endParaRPr lang="en-US"/>
+            </a:p>
+          </p:txBody>
+        </p:sp>
+        <p:sp>
+          <p:nvSpPr>
+            <p:cNvPr id="25" name="Rectangle 24">
+              <a:extLst>
+                <a:ext uri="{FF2B5EF4-FFF2-40B4-BE49-F238E27FC236}">
+                  <a16:creationId xmlns:a16="http://schemas.microsoft.com/office/drawing/2014/main" id="{2AC1DDFD-456B-854E-82AA-CA413839BD53}"/>
+                </a:ext>
+              </a:extLst>
+            </p:cNvPr>
+            <p:cNvSpPr/>
+            <p:nvPr/>
+          </p:nvSpPr>
+          <p:spPr>
+            <a:xfrm>
+              <a:off x="4812205" y="1827350"/>
+              <a:ext cx="228600" cy="411480"/>
+            </a:xfrm>
+            <a:prstGeom prst="rect">
+              <a:avLst/>
+            </a:prstGeom>
+            <a:grpFill/>
+            <a:ln>
+              <a:noFill/>
+            </a:ln>
+          </p:spPr>
+          <p:style>
+            <a:lnRef idx="2">
+              <a:schemeClr val="accent1">
+                <a:shade val="50000"/>
+              </a:schemeClr>
+            </a:lnRef>
+            <a:fillRef idx="1">
+              <a:schemeClr val="accent1"/>
+            </a:fillRef>
+            <a:effectRef idx="0">
+              <a:schemeClr val="accent1"/>
+            </a:effectRef>
+            <a:fontRef idx="minor">
+              <a:schemeClr val="lt1"/>
+            </a:fontRef>
+          </p:style>
+          <p:txBody>
+            <a:bodyPr rtlCol="0" anchor="ctr"/>
+            <a:lstStyle/>
+            <a:p>
+              <a:pPr algn="ctr"/>
+              <a:endParaRPr lang="en-US"/>
+            </a:p>
+          </p:txBody>
+        </p:sp>
+        <p:sp>
+          <p:nvSpPr>
+            <p:cNvPr id="26" name="Rectangle 25">
+              <a:extLst>
+                <a:ext uri="{FF2B5EF4-FFF2-40B4-BE49-F238E27FC236}">
+                  <a16:creationId xmlns:a16="http://schemas.microsoft.com/office/drawing/2014/main" id="{9C9559D3-34FB-894E-B9B2-70BA316390C3}"/>
+                </a:ext>
+              </a:extLst>
+            </p:cNvPr>
+            <p:cNvSpPr/>
+            <p:nvPr/>
+          </p:nvSpPr>
+          <p:spPr>
+            <a:xfrm>
+              <a:off x="2451495" y="2616629"/>
+              <a:ext cx="228600" cy="411480"/>
+            </a:xfrm>
+            <a:prstGeom prst="rect">
+              <a:avLst/>
+            </a:prstGeom>
+            <a:grpFill/>
+            <a:ln>
+              <a:noFill/>
+            </a:ln>
+          </p:spPr>
+          <p:style>
+            <a:lnRef idx="2">
+              <a:schemeClr val="accent1">
+                <a:shade val="50000"/>
+              </a:schemeClr>
+            </a:lnRef>
+            <a:fillRef idx="1">
+              <a:schemeClr val="accent1"/>
+            </a:fillRef>
+            <a:effectRef idx="0">
+              <a:schemeClr val="accent1"/>
+            </a:effectRef>
+            <a:fontRef idx="minor">
+              <a:schemeClr val="lt1"/>
+            </a:fontRef>
+          </p:style>
+          <p:txBody>
+            <a:bodyPr rtlCol="0" anchor="ctr"/>
+            <a:lstStyle/>
+            <a:p>
+              <a:pPr algn="ctr"/>
+              <a:endParaRPr lang="en-US"/>
+            </a:p>
+          </p:txBody>
+        </p:sp>
+        <p:sp>
+          <p:nvSpPr>
+            <p:cNvPr id="27" name="Rectangle 26">
+              <a:extLst>
+                <a:ext uri="{FF2B5EF4-FFF2-40B4-BE49-F238E27FC236}">
+                  <a16:creationId xmlns:a16="http://schemas.microsoft.com/office/drawing/2014/main" id="{4E1D71ED-573F-E24A-92D6-E2711EC87308}"/>
+                </a:ext>
+              </a:extLst>
+            </p:cNvPr>
+            <p:cNvSpPr/>
+            <p:nvPr/>
+          </p:nvSpPr>
+          <p:spPr>
+            <a:xfrm>
+              <a:off x="2787797" y="2616629"/>
+              <a:ext cx="342506" cy="411480"/>
+            </a:xfrm>
+            <a:prstGeom prst="rect">
+              <a:avLst/>
+            </a:prstGeom>
+            <a:grpFill/>
+            <a:ln>
+              <a:noFill/>
+            </a:ln>
+          </p:spPr>
+          <p:style>
+            <a:lnRef idx="2">
+              <a:schemeClr val="accent1">
+                <a:shade val="50000"/>
+              </a:schemeClr>
+            </a:lnRef>
+            <a:fillRef idx="1">
+              <a:schemeClr val="accent1"/>
+            </a:fillRef>
+            <a:effectRef idx="0">
+              <a:schemeClr val="accent1"/>
+            </a:effectRef>
+            <a:fontRef idx="minor">
+              <a:schemeClr val="lt1"/>
+            </a:fontRef>
+          </p:style>
+          <p:txBody>
+            <a:bodyPr rtlCol="0" anchor="ctr"/>
+            <a:lstStyle/>
+            <a:p>
+              <a:pPr algn="ctr"/>
+              <a:endParaRPr lang="en-US"/>
+            </a:p>
+          </p:txBody>
+        </p:sp>
+        <p:sp>
+          <p:nvSpPr>
+            <p:cNvPr id="28" name="Rectangle 27">
+              <a:extLst>
+                <a:ext uri="{FF2B5EF4-FFF2-40B4-BE49-F238E27FC236}">
+                  <a16:creationId xmlns:a16="http://schemas.microsoft.com/office/drawing/2014/main" id="{EA277CB1-D025-B149-9FE2-148DD0A4D7D8}"/>
+                </a:ext>
+              </a:extLst>
+            </p:cNvPr>
+            <p:cNvSpPr/>
+            <p:nvPr/>
+          </p:nvSpPr>
+          <p:spPr>
+            <a:xfrm>
+              <a:off x="3238005" y="2616629"/>
+              <a:ext cx="228600" cy="411480"/>
+            </a:xfrm>
+            <a:prstGeom prst="rect">
+              <a:avLst/>
+            </a:prstGeom>
+            <a:grpFill/>
+            <a:ln>
+              <a:noFill/>
+            </a:ln>
+          </p:spPr>
+          <p:style>
+            <a:lnRef idx="2">
+              <a:schemeClr val="accent1">
+                <a:shade val="50000"/>
+              </a:schemeClr>
+            </a:lnRef>
+            <a:fillRef idx="1">
+              <a:schemeClr val="accent1"/>
+            </a:fillRef>
+            <a:effectRef idx="0">
+              <a:schemeClr val="accent1"/>
+            </a:effectRef>
+            <a:fontRef idx="minor">
+              <a:schemeClr val="lt1"/>
+            </a:fontRef>
+          </p:style>
+          <p:txBody>
+            <a:bodyPr rtlCol="0" anchor="ctr"/>
+            <a:lstStyle/>
+            <a:p>
+              <a:pPr algn="ctr"/>
+              <a:endParaRPr lang="en-US"/>
+            </a:p>
+          </p:txBody>
+        </p:sp>
+        <p:sp>
+          <p:nvSpPr>
+            <p:cNvPr id="29" name="Rectangle 28">
+              <a:extLst>
+                <a:ext uri="{FF2B5EF4-FFF2-40B4-BE49-F238E27FC236}">
+                  <a16:creationId xmlns:a16="http://schemas.microsoft.com/office/drawing/2014/main" id="{268F5D8E-7CCB-F847-B2A8-AE63A19B5F27}"/>
+                </a:ext>
+              </a:extLst>
+            </p:cNvPr>
+            <p:cNvSpPr/>
+            <p:nvPr/>
+          </p:nvSpPr>
+          <p:spPr>
+            <a:xfrm>
+              <a:off x="3555514" y="2616629"/>
+              <a:ext cx="228600" cy="411480"/>
+            </a:xfrm>
+            <a:prstGeom prst="rect">
+              <a:avLst/>
+            </a:prstGeom>
+            <a:grpFill/>
+            <a:ln>
+              <a:noFill/>
+            </a:ln>
+          </p:spPr>
+          <p:style>
+            <a:lnRef idx="2">
+              <a:schemeClr val="accent1">
+                <a:shade val="50000"/>
+              </a:schemeClr>
+            </a:lnRef>
+            <a:fillRef idx="1">
+              <a:schemeClr val="accent1"/>
+            </a:fillRef>
+            <a:effectRef idx="0">
+              <a:schemeClr val="accent1"/>
+            </a:effectRef>
+            <a:fontRef idx="minor">
+              <a:schemeClr val="lt1"/>
+            </a:fontRef>
+          </p:style>
+          <p:txBody>
+            <a:bodyPr rtlCol="0" anchor="ctr"/>
+            <a:lstStyle/>
+            <a:p>
+              <a:pPr algn="ctr"/>
+              <a:endParaRPr lang="en-US"/>
+            </a:p>
+          </p:txBody>
+        </p:sp>
+        <p:sp>
+          <p:nvSpPr>
+            <p:cNvPr id="30" name="Rectangle 29">
+              <a:extLst>
+                <a:ext uri="{FF2B5EF4-FFF2-40B4-BE49-F238E27FC236}">
+                  <a16:creationId xmlns:a16="http://schemas.microsoft.com/office/drawing/2014/main" id="{ED00D9A8-B8D7-5E45-BF44-CB89298B8B76}"/>
+                </a:ext>
+              </a:extLst>
+            </p:cNvPr>
+            <p:cNvSpPr/>
+            <p:nvPr/>
+          </p:nvSpPr>
+          <p:spPr>
+            <a:xfrm>
+              <a:off x="3865590" y="2616629"/>
+              <a:ext cx="228600" cy="411480"/>
+            </a:xfrm>
+            <a:prstGeom prst="rect">
+              <a:avLst/>
+            </a:prstGeom>
+            <a:grpFill/>
+            <a:ln>
+              <a:noFill/>
+            </a:ln>
+          </p:spPr>
+          <p:style>
+            <a:lnRef idx="2">
+              <a:schemeClr val="accent1">
+                <a:shade val="50000"/>
+              </a:schemeClr>
+            </a:lnRef>
+            <a:fillRef idx="1">
+              <a:schemeClr val="accent1"/>
+            </a:fillRef>
+            <a:effectRef idx="0">
+              <a:schemeClr val="accent1"/>
+            </a:effectRef>
+            <a:fontRef idx="minor">
+              <a:schemeClr val="lt1"/>
+            </a:fontRef>
+          </p:style>
+          <p:txBody>
+            <a:bodyPr rtlCol="0" anchor="ctr"/>
+            <a:lstStyle/>
+            <a:p>
+              <a:pPr algn="ctr"/>
+              <a:endParaRPr lang="en-US"/>
+            </a:p>
+          </p:txBody>
+        </p:sp>
+        <p:sp>
+          <p:nvSpPr>
+            <p:cNvPr id="31" name="Rectangle 30">
+              <a:extLst>
+                <a:ext uri="{FF2B5EF4-FFF2-40B4-BE49-F238E27FC236}">
+                  <a16:creationId xmlns:a16="http://schemas.microsoft.com/office/drawing/2014/main" id="{98504C9C-5FD8-9646-A5D0-CF5951AE7535}"/>
+                </a:ext>
+              </a:extLst>
+            </p:cNvPr>
+            <p:cNvSpPr/>
+            <p:nvPr/>
+          </p:nvSpPr>
+          <p:spPr>
+            <a:xfrm>
+              <a:off x="4184816" y="2616629"/>
+              <a:ext cx="525469" cy="411480"/>
+            </a:xfrm>
+            <a:prstGeom prst="rect">
+              <a:avLst/>
+            </a:prstGeom>
+            <a:grpFill/>
+            <a:ln>
+              <a:noFill/>
+            </a:ln>
+          </p:spPr>
+          <p:style>
+            <a:lnRef idx="2">
+              <a:schemeClr val="accent1">
+                <a:shade val="50000"/>
+              </a:schemeClr>
+            </a:lnRef>
+            <a:fillRef idx="1">
+              <a:schemeClr val="accent1"/>
+            </a:fillRef>
+            <a:effectRef idx="0">
+              <a:schemeClr val="accent1"/>
+            </a:effectRef>
+            <a:fontRef idx="minor">
+              <a:schemeClr val="lt1"/>
+            </a:fontRef>
+          </p:style>
+          <p:txBody>
+            <a:bodyPr rtlCol="0" anchor="ctr"/>
+            <a:lstStyle/>
+            <a:p>
+              <a:pPr algn="ctr"/>
+              <a:endParaRPr lang="en-US"/>
+            </a:p>
+          </p:txBody>
+        </p:sp>
+        <p:sp>
+          <p:nvSpPr>
+            <p:cNvPr id="32" name="Rectangle 31">
+              <a:extLst>
+                <a:ext uri="{FF2B5EF4-FFF2-40B4-BE49-F238E27FC236}">
+                  <a16:creationId xmlns:a16="http://schemas.microsoft.com/office/drawing/2014/main" id="{32E2DDAC-7018-4B47-B9EF-DB00BD03D69B}"/>
+                </a:ext>
+              </a:extLst>
+            </p:cNvPr>
+            <p:cNvSpPr/>
+            <p:nvPr/>
+          </p:nvSpPr>
+          <p:spPr>
+            <a:xfrm>
+              <a:off x="4815976" y="2616629"/>
+              <a:ext cx="228600" cy="411480"/>
+            </a:xfrm>
+            <a:prstGeom prst="rect">
+              <a:avLst/>
+            </a:prstGeom>
+            <a:grpFill/>
+            <a:ln>
+              <a:noFill/>
+            </a:ln>
+          </p:spPr>
+          <p:style>
+            <a:lnRef idx="2">
+              <a:schemeClr val="accent1">
+                <a:shade val="50000"/>
+              </a:schemeClr>
+            </a:lnRef>
+            <a:fillRef idx="1">
+              <a:schemeClr val="accent1"/>
+            </a:fillRef>
+            <a:effectRef idx="0">
+              <a:schemeClr val="accent1"/>
+            </a:effectRef>
+            <a:fontRef idx="minor">
+              <a:schemeClr val="lt1"/>
+            </a:fontRef>
+          </p:style>
+          <p:txBody>
+            <a:bodyPr rtlCol="0" anchor="ctr"/>
+            <a:lstStyle/>
+            <a:p>
+              <a:pPr algn="ctr"/>
+              <a:endParaRPr lang="en-US"/>
+            </a:p>
+          </p:txBody>
+        </p:sp>
+        <p:sp>
+          <p:nvSpPr>
+            <p:cNvPr id="38" name="Rectangle 37">
+              <a:extLst>
+                <a:ext uri="{FF2B5EF4-FFF2-40B4-BE49-F238E27FC236}">
+                  <a16:creationId xmlns:a16="http://schemas.microsoft.com/office/drawing/2014/main" id="{1D8CD442-6D3A-0344-9777-287DBA1FB312}"/>
+                </a:ext>
+              </a:extLst>
+            </p:cNvPr>
+            <p:cNvSpPr/>
+            <p:nvPr/>
+          </p:nvSpPr>
+          <p:spPr>
+            <a:xfrm>
+              <a:off x="5212063" y="2616628"/>
+              <a:ext cx="576072" cy="1040971"/>
+            </a:xfrm>
+            <a:prstGeom prst="rect">
+              <a:avLst/>
+            </a:prstGeom>
+            <a:grpFill/>
+            <a:ln>
+              <a:noFill/>
+            </a:ln>
+          </p:spPr>
+          <p:style>
+            <a:lnRef idx="2">
+              <a:schemeClr val="accent1">
+                <a:shade val="50000"/>
+              </a:schemeClr>
+            </a:lnRef>
+            <a:fillRef idx="1">
+              <a:schemeClr val="accent1"/>
+            </a:fillRef>
+            <a:effectRef idx="0">
+              <a:schemeClr val="accent1"/>
+            </a:effectRef>
+            <a:fontRef idx="minor">
+              <a:schemeClr val="lt1"/>
+            </a:fontRef>
+          </p:style>
+          <p:txBody>
+            <a:bodyPr rtlCol="0" anchor="ctr"/>
+            <a:lstStyle/>
+            <a:p>
+              <a:pPr algn="ctr"/>
+              <a:endParaRPr lang="en-US"/>
+            </a:p>
+          </p:txBody>
+        </p:sp>
+      </p:grpSp>
+      <p:sp>
+        <p:nvSpPr>
+          <p:cNvPr id="72" name="TextBox 71">
+            <a:extLst>
+              <a:ext uri="{FF2B5EF4-FFF2-40B4-BE49-F238E27FC236}">
+                <a16:creationId xmlns:a16="http://schemas.microsoft.com/office/drawing/2014/main" id="{6BA6EE71-44E0-F342-BA93-B8F3CB3D5B37}"/>
+              </a:ext>
+            </a:extLst>
+          </p:cNvPr>
+          <p:cNvSpPr txBox="1"/>
+          <p:nvPr/>
+        </p:nvSpPr>
+        <p:spPr>
+          <a:xfrm>
+            <a:off x="1325669" y="2191122"/>
+            <a:ext cx="1034386" cy="461665"/>
+          </a:xfrm>
+          <a:prstGeom prst="rect">
+            <a:avLst/>
+          </a:prstGeom>
+          <a:noFill/>
+        </p:spPr>
+        <p:txBody>
+          <a:bodyPr wrap="none" rtlCol="0">
+            <a:spAutoFit/>
+          </a:bodyPr>
+          <a:lstStyle/>
+          <a:p>
+            <a:r>
+              <a:rPr lang="en-US" sz="2400" dirty="0">
+                <a:solidFill>
+                  <a:schemeClr val="accent4">
+                    <a:lumMod val="75000"/>
+                  </a:schemeClr>
+                </a:solidFill>
+              </a:rPr>
+              <a:t>Rooms</a:t>
+            </a:r>
+          </a:p>
+        </p:txBody>
+      </p:sp>
+      <p:grpSp>
+        <p:nvGrpSpPr>
+          <p:cNvPr id="74" name="Group 73">
+            <a:extLst>
+              <a:ext uri="{FF2B5EF4-FFF2-40B4-BE49-F238E27FC236}">
+                <a16:creationId xmlns:a16="http://schemas.microsoft.com/office/drawing/2014/main" id="{BDC3E5EC-FB9F-0A4F-8146-7D20479ADF4C}"/>
+              </a:ext>
+            </a:extLst>
+          </p:cNvPr>
+          <p:cNvGrpSpPr/>
+          <p:nvPr/>
+        </p:nvGrpSpPr>
+        <p:grpSpPr>
+          <a:xfrm>
+            <a:off x="133213" y="1871082"/>
+            <a:ext cx="1059394" cy="721839"/>
+            <a:chOff x="133213" y="1871082"/>
+            <a:chExt cx="1059394" cy="721839"/>
+          </a:xfrm>
+        </p:grpSpPr>
+        <p:pic>
+          <p:nvPicPr>
+            <p:cNvPr id="75" name="Picture 74">
+              <a:extLst>
+                <a:ext uri="{FF2B5EF4-FFF2-40B4-BE49-F238E27FC236}">
+                  <a16:creationId xmlns:a16="http://schemas.microsoft.com/office/drawing/2014/main" id="{47C12018-89A8-F14C-9D56-69DC26469AA0}"/>
+                </a:ext>
+              </a:extLst>
+            </p:cNvPr>
+            <p:cNvPicPr>
+              <a:picLocks noChangeAspect="1"/>
+            </p:cNvPicPr>
+            <p:nvPr/>
+          </p:nvPicPr>
+          <p:blipFill rotWithShape="1">
+            <a:blip r:embed="rId4"/>
+            <a:srcRect l="26302" t="1905" r="24095"/>
+            <a:stretch/>
+          </p:blipFill>
+          <p:spPr>
+            <a:xfrm>
+              <a:off x="133213" y="1871082"/>
+              <a:ext cx="431549" cy="640080"/>
+            </a:xfrm>
+            <a:prstGeom prst="rect">
+              <a:avLst/>
+            </a:prstGeom>
+          </p:spPr>
+        </p:pic>
+        <p:sp>
+          <p:nvSpPr>
+            <p:cNvPr id="76" name="TextBox 75">
+              <a:extLst>
+                <a:ext uri="{FF2B5EF4-FFF2-40B4-BE49-F238E27FC236}">
+                  <a16:creationId xmlns:a16="http://schemas.microsoft.com/office/drawing/2014/main" id="{32A95E6C-66FE-5343-A6E1-16FF2005F4E8}"/>
+                </a:ext>
+              </a:extLst>
+            </p:cNvPr>
+            <p:cNvSpPr txBox="1"/>
+            <p:nvPr/>
+          </p:nvSpPr>
+          <p:spPr>
+            <a:xfrm>
+              <a:off x="560318" y="2223589"/>
+              <a:ext cx="632289" cy="369332"/>
+            </a:xfrm>
+            <a:prstGeom prst="rect">
+              <a:avLst/>
+            </a:prstGeom>
+            <a:noFill/>
+          </p:spPr>
+          <p:txBody>
+            <a:bodyPr wrap="none" rtlCol="0">
+              <a:spAutoFit/>
+            </a:bodyPr>
+            <a:lstStyle/>
+            <a:p>
+              <a:r>
+                <a:rPr lang="en-US" dirty="0"/>
+                <a:t>Start</a:t>
+              </a:r>
+            </a:p>
+          </p:txBody>
+        </p:sp>
+      </p:grpSp>
+      <p:grpSp>
+        <p:nvGrpSpPr>
+          <p:cNvPr id="10" name="Group 9">
+            <a:extLst>
+              <a:ext uri="{FF2B5EF4-FFF2-40B4-BE49-F238E27FC236}">
+                <a16:creationId xmlns:a16="http://schemas.microsoft.com/office/drawing/2014/main" id="{FF0CC5F2-1DD0-844D-A19D-1FE823622158}"/>
+              </a:ext>
+            </a:extLst>
+          </p:cNvPr>
+          <p:cNvGrpSpPr/>
+          <p:nvPr/>
+        </p:nvGrpSpPr>
+        <p:grpSpPr>
+          <a:xfrm>
+            <a:off x="1220831" y="540920"/>
+            <a:ext cx="1139224" cy="2487189"/>
+            <a:chOff x="1220831" y="540920"/>
+            <a:chExt cx="1139224" cy="2487189"/>
+          </a:xfrm>
+        </p:grpSpPr>
+        <p:sp>
+          <p:nvSpPr>
+            <p:cNvPr id="34" name="Rectangle 33">
+              <a:extLst>
+                <a:ext uri="{FF2B5EF4-FFF2-40B4-BE49-F238E27FC236}">
+                  <a16:creationId xmlns:a16="http://schemas.microsoft.com/office/drawing/2014/main" id="{469395CA-2F46-704E-ADED-A8AFA90C31FE}"/>
+                </a:ext>
+              </a:extLst>
+            </p:cNvPr>
+            <p:cNvSpPr/>
+            <p:nvPr/>
+          </p:nvSpPr>
+          <p:spPr>
+            <a:xfrm>
+              <a:off x="1362906" y="540920"/>
+              <a:ext cx="370078" cy="745829"/>
+            </a:xfrm>
+            <a:prstGeom prst="rect">
+              <a:avLst/>
+            </a:prstGeom>
+            <a:solidFill>
+              <a:srgbClr val="FFFF00"/>
+            </a:solidFill>
+            <a:ln>
+              <a:noFill/>
+            </a:ln>
+          </p:spPr>
+          <p:style>
+            <a:lnRef idx="2">
+              <a:schemeClr val="accent1">
+                <a:shade val="50000"/>
+              </a:schemeClr>
+            </a:lnRef>
+            <a:fillRef idx="1">
+              <a:schemeClr val="accent1"/>
+            </a:fillRef>
+            <a:effectRef idx="0">
+              <a:schemeClr val="accent1"/>
+            </a:effectRef>
+            <a:fontRef idx="minor">
+              <a:schemeClr val="lt1"/>
+            </a:fontRef>
+          </p:style>
+          <p:txBody>
+            <a:bodyPr rtlCol="0" anchor="ctr"/>
+            <a:lstStyle/>
+            <a:p>
+              <a:pPr algn="ctr"/>
+              <a:endParaRPr lang="en-US" dirty="0"/>
+            </a:p>
+          </p:txBody>
+        </p:sp>
+        <p:sp>
+          <p:nvSpPr>
+            <p:cNvPr id="35" name="Rectangle 34">
+              <a:extLst>
+                <a:ext uri="{FF2B5EF4-FFF2-40B4-BE49-F238E27FC236}">
+                  <a16:creationId xmlns:a16="http://schemas.microsoft.com/office/drawing/2014/main" id="{862FA1C8-6173-DC42-A75A-8FBC922B0FFE}"/>
+                </a:ext>
+              </a:extLst>
+            </p:cNvPr>
+            <p:cNvSpPr/>
+            <p:nvPr/>
+          </p:nvSpPr>
+          <p:spPr>
+            <a:xfrm>
+              <a:off x="1838707" y="540920"/>
+              <a:ext cx="262213" cy="471941"/>
+            </a:xfrm>
+            <a:prstGeom prst="rect">
+              <a:avLst/>
+            </a:prstGeom>
+            <a:solidFill>
+              <a:srgbClr val="FFFF00"/>
+            </a:solidFill>
+            <a:ln>
+              <a:noFill/>
+            </a:ln>
+          </p:spPr>
+          <p:style>
+            <a:lnRef idx="2">
+              <a:schemeClr val="accent1">
+                <a:shade val="50000"/>
+              </a:schemeClr>
+            </a:lnRef>
+            <a:fillRef idx="1">
+              <a:schemeClr val="accent1"/>
+            </a:fillRef>
+            <a:effectRef idx="0">
+              <a:schemeClr val="accent1"/>
+            </a:effectRef>
+            <a:fontRef idx="minor">
+              <a:schemeClr val="lt1"/>
+            </a:fontRef>
+          </p:style>
+          <p:txBody>
+            <a:bodyPr rtlCol="0" anchor="ctr"/>
+            <a:lstStyle/>
+            <a:p>
+              <a:pPr algn="ctr"/>
+              <a:endParaRPr lang="en-US"/>
+            </a:p>
+          </p:txBody>
+        </p:sp>
+        <p:sp>
+          <p:nvSpPr>
+            <p:cNvPr id="40" name="Rectangle 39">
+              <a:extLst>
+                <a:ext uri="{FF2B5EF4-FFF2-40B4-BE49-F238E27FC236}">
+                  <a16:creationId xmlns:a16="http://schemas.microsoft.com/office/drawing/2014/main" id="{BB00ECA9-1A76-7040-8814-290A5D9953BA}"/>
+                </a:ext>
+              </a:extLst>
+            </p:cNvPr>
+            <p:cNvSpPr/>
+            <p:nvPr/>
+          </p:nvSpPr>
+          <p:spPr>
+            <a:xfrm>
+              <a:off x="1349679" y="2616629"/>
+              <a:ext cx="274320" cy="411480"/>
+            </a:xfrm>
+            <a:prstGeom prst="rect">
+              <a:avLst/>
+            </a:prstGeom>
+            <a:solidFill>
+              <a:srgbClr val="FFFF00"/>
+            </a:solidFill>
+            <a:ln>
+              <a:noFill/>
+            </a:ln>
+          </p:spPr>
+          <p:style>
+            <a:lnRef idx="2">
+              <a:schemeClr val="accent1">
+                <a:shade val="50000"/>
+              </a:schemeClr>
+            </a:lnRef>
+            <a:fillRef idx="1">
+              <a:schemeClr val="accent1"/>
+            </a:fillRef>
+            <a:effectRef idx="0">
+              <a:schemeClr val="accent1"/>
+            </a:effectRef>
+            <a:fontRef idx="minor">
+              <a:schemeClr val="lt1"/>
+            </a:fontRef>
+          </p:style>
+          <p:txBody>
+            <a:bodyPr rtlCol="0" anchor="ctr"/>
+            <a:lstStyle/>
+            <a:p>
+              <a:pPr algn="ctr"/>
+              <a:endParaRPr lang="en-US"/>
+            </a:p>
+          </p:txBody>
+        </p:sp>
+        <p:sp>
+          <p:nvSpPr>
+            <p:cNvPr id="41" name="Rectangle 40">
+              <a:extLst>
+                <a:ext uri="{FF2B5EF4-FFF2-40B4-BE49-F238E27FC236}">
+                  <a16:creationId xmlns:a16="http://schemas.microsoft.com/office/drawing/2014/main" id="{8C1B92E1-845F-0546-A990-63E214FF03D3}"/>
+                </a:ext>
+              </a:extLst>
+            </p:cNvPr>
+            <p:cNvSpPr/>
+            <p:nvPr/>
+          </p:nvSpPr>
+          <p:spPr>
+            <a:xfrm>
+              <a:off x="1646039" y="2616629"/>
+              <a:ext cx="274320" cy="411480"/>
+            </a:xfrm>
+            <a:prstGeom prst="rect">
+              <a:avLst/>
+            </a:prstGeom>
+            <a:solidFill>
+              <a:srgbClr val="FFFF00"/>
+            </a:solidFill>
+            <a:ln>
+              <a:noFill/>
+            </a:ln>
+          </p:spPr>
+          <p:style>
+            <a:lnRef idx="2">
+              <a:schemeClr val="accent1">
+                <a:shade val="50000"/>
+              </a:schemeClr>
+            </a:lnRef>
+            <a:fillRef idx="1">
+              <a:schemeClr val="accent1"/>
+            </a:fillRef>
+            <a:effectRef idx="0">
+              <a:schemeClr val="accent1"/>
+            </a:effectRef>
+            <a:fontRef idx="minor">
+              <a:schemeClr val="lt1"/>
+            </a:fontRef>
+          </p:style>
+          <p:txBody>
+            <a:bodyPr rtlCol="0" anchor="ctr"/>
+            <a:lstStyle/>
+            <a:p>
+              <a:pPr algn="ctr"/>
+              <a:endParaRPr lang="en-US"/>
+            </a:p>
+          </p:txBody>
+        </p:sp>
+        <p:sp>
+          <p:nvSpPr>
+            <p:cNvPr id="42" name="Rectangle 41">
+              <a:extLst>
+                <a:ext uri="{FF2B5EF4-FFF2-40B4-BE49-F238E27FC236}">
+                  <a16:creationId xmlns:a16="http://schemas.microsoft.com/office/drawing/2014/main" id="{14F4E382-854C-7B42-930E-3B943EE92EDA}"/>
+                </a:ext>
+              </a:extLst>
+            </p:cNvPr>
+            <p:cNvSpPr/>
+            <p:nvPr/>
+          </p:nvSpPr>
+          <p:spPr>
+            <a:xfrm>
+              <a:off x="1980340" y="2616629"/>
+              <a:ext cx="379715" cy="411480"/>
+            </a:xfrm>
+            <a:prstGeom prst="rect">
+              <a:avLst/>
+            </a:prstGeom>
+            <a:solidFill>
+              <a:srgbClr val="FFFF00"/>
+            </a:solidFill>
+            <a:ln>
+              <a:noFill/>
+            </a:ln>
+          </p:spPr>
+          <p:style>
+            <a:lnRef idx="2">
+              <a:schemeClr val="accent1">
+                <a:shade val="50000"/>
+              </a:schemeClr>
+            </a:lnRef>
+            <a:fillRef idx="1">
+              <a:schemeClr val="accent1"/>
+            </a:fillRef>
+            <a:effectRef idx="0">
+              <a:schemeClr val="accent1"/>
+            </a:effectRef>
+            <a:fontRef idx="minor">
+              <a:schemeClr val="lt1"/>
+            </a:fontRef>
+          </p:style>
+          <p:txBody>
+            <a:bodyPr rtlCol="0" anchor="ctr"/>
+            <a:lstStyle/>
+            <a:p>
+              <a:pPr algn="ctr"/>
+              <a:endParaRPr lang="en-US"/>
+            </a:p>
+          </p:txBody>
+        </p:sp>
+        <p:sp>
+          <p:nvSpPr>
+            <p:cNvPr id="8" name="Rectangle 7">
+              <a:extLst>
+                <a:ext uri="{FF2B5EF4-FFF2-40B4-BE49-F238E27FC236}">
+                  <a16:creationId xmlns:a16="http://schemas.microsoft.com/office/drawing/2014/main" id="{53879360-8F14-0B47-9F96-B8E029B41AE5}"/>
+                </a:ext>
+              </a:extLst>
+            </p:cNvPr>
+            <p:cNvSpPr/>
+            <p:nvPr/>
+          </p:nvSpPr>
+          <p:spPr>
+            <a:xfrm>
+              <a:off x="1519790" y="1348230"/>
+              <a:ext cx="740197" cy="368002"/>
+            </a:xfrm>
+            <a:prstGeom prst="rect">
+              <a:avLst/>
+            </a:prstGeom>
+            <a:solidFill>
+              <a:srgbClr val="FFFF00"/>
+            </a:solidFill>
+            <a:ln>
+              <a:noFill/>
+            </a:ln>
+          </p:spPr>
+          <p:style>
+            <a:lnRef idx="2">
+              <a:schemeClr val="accent1">
+                <a:shade val="50000"/>
+              </a:schemeClr>
+            </a:lnRef>
+            <a:fillRef idx="1">
+              <a:schemeClr val="accent1"/>
+            </a:fillRef>
+            <a:effectRef idx="0">
+              <a:schemeClr val="accent1"/>
+            </a:effectRef>
+            <a:fontRef idx="minor">
+              <a:schemeClr val="lt1"/>
+            </a:fontRef>
+          </p:style>
+          <p:txBody>
+            <a:bodyPr rtlCol="0" anchor="ctr"/>
+            <a:lstStyle/>
+            <a:p>
+              <a:pPr algn="ctr"/>
+              <a:endParaRPr lang="en-US"/>
+            </a:p>
+          </p:txBody>
+        </p:sp>
+        <p:sp>
+          <p:nvSpPr>
+            <p:cNvPr id="57" name="Rectangle 56">
+              <a:extLst>
+                <a:ext uri="{FF2B5EF4-FFF2-40B4-BE49-F238E27FC236}">
+                  <a16:creationId xmlns:a16="http://schemas.microsoft.com/office/drawing/2014/main" id="{FCB9FD27-6914-0E47-A681-CCB6A24112CA}"/>
+                </a:ext>
+              </a:extLst>
+            </p:cNvPr>
+            <p:cNvSpPr/>
+            <p:nvPr/>
+          </p:nvSpPr>
+          <p:spPr>
+            <a:xfrm>
+              <a:off x="1220831" y="1819144"/>
+              <a:ext cx="1039156" cy="368002"/>
+            </a:xfrm>
+            <a:prstGeom prst="rect">
+              <a:avLst/>
+            </a:prstGeom>
+            <a:solidFill>
+              <a:srgbClr val="FFFF00"/>
+            </a:solidFill>
+            <a:ln>
+              <a:noFill/>
+            </a:ln>
+          </p:spPr>
+          <p:style>
+            <a:lnRef idx="2">
+              <a:schemeClr val="accent1">
+                <a:shade val="50000"/>
+              </a:schemeClr>
+            </a:lnRef>
+            <a:fillRef idx="1">
+              <a:schemeClr val="accent1"/>
+            </a:fillRef>
+            <a:effectRef idx="0">
+              <a:schemeClr val="accent1"/>
+            </a:effectRef>
+            <a:fontRef idx="minor">
+              <a:schemeClr val="lt1"/>
+            </a:fontRef>
+          </p:style>
+          <p:txBody>
+            <a:bodyPr rtlCol="0" anchor="ctr"/>
+            <a:lstStyle/>
+            <a:p>
+              <a:pPr algn="ctr"/>
+              <a:endParaRPr lang="en-US"/>
+            </a:p>
+          </p:txBody>
+        </p:sp>
+      </p:grpSp>
+      <p:sp>
+        <p:nvSpPr>
+          <p:cNvPr id="11" name="TextBox 10">
+            <a:extLst>
+              <a:ext uri="{FF2B5EF4-FFF2-40B4-BE49-F238E27FC236}">
+                <a16:creationId xmlns:a16="http://schemas.microsoft.com/office/drawing/2014/main" id="{810DCE5D-F69B-BB40-B676-3E25093E32A6}"/>
+              </a:ext>
+            </a:extLst>
+          </p:cNvPr>
+          <p:cNvSpPr txBox="1"/>
+          <p:nvPr/>
+        </p:nvSpPr>
+        <p:spPr>
+          <a:xfrm>
+            <a:off x="1470068" y="1305903"/>
+            <a:ext cx="889987" cy="461665"/>
+          </a:xfrm>
+          <a:prstGeom prst="rect">
+            <a:avLst/>
+          </a:prstGeom>
+          <a:noFill/>
+        </p:spPr>
+        <p:txBody>
+          <a:bodyPr wrap="none" rtlCol="0">
+            <a:spAutoFit/>
+          </a:bodyPr>
+          <a:lstStyle/>
+          <a:p>
+            <a:r>
+              <a:rPr lang="en-US" sz="2400" dirty="0">
+                <a:solidFill>
+                  <a:schemeClr val="accent4">
+                    <a:lumMod val="75000"/>
+                  </a:schemeClr>
+                </a:solidFill>
+              </a:rPr>
+              <a:t>Semi-</a:t>
+            </a:r>
+          </a:p>
+        </p:txBody>
+      </p:sp>
+      <p:sp>
+        <p:nvSpPr>
+          <p:cNvPr id="71" name="TextBox 70">
+            <a:extLst>
+              <a:ext uri="{FF2B5EF4-FFF2-40B4-BE49-F238E27FC236}">
+                <a16:creationId xmlns:a16="http://schemas.microsoft.com/office/drawing/2014/main" id="{DCD38A44-3E14-154F-89D8-8E16157F82F1}"/>
+              </a:ext>
+            </a:extLst>
+          </p:cNvPr>
+          <p:cNvSpPr txBox="1"/>
+          <p:nvPr/>
+        </p:nvSpPr>
+        <p:spPr>
+          <a:xfrm>
+            <a:off x="1306049" y="1796304"/>
+            <a:ext cx="1054006" cy="461665"/>
+          </a:xfrm>
+          <a:prstGeom prst="rect">
+            <a:avLst/>
+          </a:prstGeom>
+          <a:noFill/>
+        </p:spPr>
+        <p:txBody>
+          <a:bodyPr wrap="none" rtlCol="0">
+            <a:spAutoFit/>
+          </a:bodyPr>
+          <a:lstStyle/>
+          <a:p>
+            <a:r>
+              <a:rPr lang="en-US" sz="2400" dirty="0">
+                <a:solidFill>
+                  <a:schemeClr val="accent4">
+                    <a:lumMod val="75000"/>
+                  </a:schemeClr>
+                </a:solidFill>
+              </a:rPr>
+              <a:t>Private</a:t>
+            </a:r>
+          </a:p>
+        </p:txBody>
+      </p:sp>
+      <p:grpSp>
+        <p:nvGrpSpPr>
+          <p:cNvPr id="6" name="Group 5">
+            <a:extLst>
+              <a:ext uri="{FF2B5EF4-FFF2-40B4-BE49-F238E27FC236}">
+                <a16:creationId xmlns:a16="http://schemas.microsoft.com/office/drawing/2014/main" id="{E2B11991-59D1-144F-998D-2F11433B9701}"/>
+              </a:ext>
+            </a:extLst>
+          </p:cNvPr>
+          <p:cNvGrpSpPr/>
+          <p:nvPr/>
+        </p:nvGrpSpPr>
+        <p:grpSpPr>
+          <a:xfrm>
+            <a:off x="3359575" y="0"/>
+            <a:ext cx="1757917" cy="1127866"/>
+            <a:chOff x="3359575" y="0"/>
+            <a:chExt cx="1757917" cy="1127866"/>
+          </a:xfrm>
+        </p:grpSpPr>
+        <p:grpSp>
+          <p:nvGrpSpPr>
+            <p:cNvPr id="43" name="Group 42">
+              <a:extLst>
+                <a:ext uri="{FF2B5EF4-FFF2-40B4-BE49-F238E27FC236}">
+                  <a16:creationId xmlns:a16="http://schemas.microsoft.com/office/drawing/2014/main" id="{DEA436B5-5E07-364A-A051-CF0B90BCDC13}"/>
+                </a:ext>
+              </a:extLst>
+            </p:cNvPr>
+            <p:cNvGrpSpPr/>
+            <p:nvPr/>
+          </p:nvGrpSpPr>
+          <p:grpSpPr>
+            <a:xfrm>
+              <a:off x="4404041" y="832825"/>
+              <a:ext cx="365760" cy="295041"/>
+              <a:chOff x="7803055" y="2574583"/>
+              <a:chExt cx="365760" cy="295041"/>
+            </a:xfrm>
+          </p:grpSpPr>
+          <p:sp>
+            <p:nvSpPr>
+              <p:cNvPr id="44" name="Cube 43">
+                <a:extLst>
+                  <a:ext uri="{FF2B5EF4-FFF2-40B4-BE49-F238E27FC236}">
+                    <a16:creationId xmlns:a16="http://schemas.microsoft.com/office/drawing/2014/main" id="{D4F7C08F-5707-4D49-99FC-BA152B7707FB}"/>
+                  </a:ext>
+                </a:extLst>
+              </p:cNvPr>
+              <p:cNvSpPr>
+                <a:spLocks noChangeAspect="1"/>
+              </p:cNvSpPr>
+              <p:nvPr/>
+            </p:nvSpPr>
+            <p:spPr>
+              <a:xfrm>
+                <a:off x="7803055" y="2686744"/>
+                <a:ext cx="182880" cy="182880"/>
+              </a:xfrm>
+              <a:prstGeom prst="cube">
+                <a:avLst/>
+              </a:prstGeom>
+              <a:solidFill>
+                <a:schemeClr val="accent4">
+                  <a:lumMod val="75000"/>
+                </a:schemeClr>
+              </a:solidFill>
+              <a:ln>
+                <a:solidFill>
+                  <a:schemeClr val="tx1"/>
+                </a:solidFill>
+              </a:ln>
+            </p:spPr>
+            <p:style>
+              <a:lnRef idx="2">
+                <a:schemeClr val="accent1">
+                  <a:shade val="50000"/>
+                </a:schemeClr>
+              </a:lnRef>
+              <a:fillRef idx="1">
+                <a:schemeClr val="accent1"/>
+              </a:fillRef>
+              <a:effectRef idx="0">
+                <a:schemeClr val="accent1"/>
+              </a:effectRef>
+              <a:fontRef idx="minor">
+                <a:schemeClr val="lt1"/>
+              </a:fontRef>
+            </p:style>
+            <p:txBody>
+              <a:bodyPr rtlCol="0" anchor="ctr"/>
+              <a:lstStyle/>
+              <a:p>
+                <a:pPr algn="ctr"/>
+                <a:endParaRPr lang="en-US"/>
+              </a:p>
+            </p:txBody>
+          </p:sp>
+          <p:sp>
+            <p:nvSpPr>
+              <p:cNvPr id="45" name="Cube 44">
+                <a:extLst>
+                  <a:ext uri="{FF2B5EF4-FFF2-40B4-BE49-F238E27FC236}">
+                    <a16:creationId xmlns:a16="http://schemas.microsoft.com/office/drawing/2014/main" id="{AC526403-8B3F-4B4A-845A-E8E4CCC53956}"/>
+                  </a:ext>
+                </a:extLst>
+              </p:cNvPr>
+              <p:cNvSpPr>
+                <a:spLocks noChangeAspect="1"/>
+              </p:cNvSpPr>
+              <p:nvPr/>
+            </p:nvSpPr>
+            <p:spPr>
+              <a:xfrm>
+                <a:off x="7985935" y="2686744"/>
+                <a:ext cx="182880" cy="182880"/>
+              </a:xfrm>
+              <a:prstGeom prst="cube">
+                <a:avLst/>
+              </a:prstGeom>
+              <a:solidFill>
+                <a:schemeClr val="accent4">
+                  <a:lumMod val="75000"/>
+                </a:schemeClr>
+              </a:solidFill>
+              <a:ln>
+                <a:solidFill>
+                  <a:schemeClr val="tx1"/>
+                </a:solidFill>
+              </a:ln>
+            </p:spPr>
+            <p:style>
+              <a:lnRef idx="2">
+                <a:schemeClr val="accent1">
+                  <a:shade val="50000"/>
+                </a:schemeClr>
+              </a:lnRef>
+              <a:fillRef idx="1">
+                <a:schemeClr val="accent1"/>
+              </a:fillRef>
+              <a:effectRef idx="0">
+                <a:schemeClr val="accent1"/>
+              </a:effectRef>
+              <a:fontRef idx="minor">
+                <a:schemeClr val="lt1"/>
+              </a:fontRef>
+            </p:style>
+            <p:txBody>
+              <a:bodyPr rtlCol="0" anchor="ctr"/>
+              <a:lstStyle/>
+              <a:p>
+                <a:pPr algn="ctr"/>
+                <a:endParaRPr lang="en-US"/>
+              </a:p>
+            </p:txBody>
+          </p:sp>
+          <p:sp>
+            <p:nvSpPr>
+              <p:cNvPr id="46" name="Cube 45">
+                <a:extLst>
+                  <a:ext uri="{FF2B5EF4-FFF2-40B4-BE49-F238E27FC236}">
+                    <a16:creationId xmlns:a16="http://schemas.microsoft.com/office/drawing/2014/main" id="{EFF278F7-ECD6-9C4C-B41D-7F58BDE86C47}"/>
+                  </a:ext>
+                </a:extLst>
+              </p:cNvPr>
+              <p:cNvSpPr>
+                <a:spLocks noChangeAspect="1"/>
+              </p:cNvSpPr>
+              <p:nvPr/>
+            </p:nvSpPr>
+            <p:spPr>
+              <a:xfrm>
+                <a:off x="7803055" y="2574583"/>
+                <a:ext cx="182880" cy="182880"/>
+              </a:xfrm>
+              <a:prstGeom prst="cube">
+                <a:avLst/>
+              </a:prstGeom>
+              <a:solidFill>
+                <a:schemeClr val="accent4">
+                  <a:lumMod val="75000"/>
+                </a:schemeClr>
+              </a:solidFill>
+              <a:ln>
+                <a:solidFill>
+                  <a:schemeClr val="tx1"/>
+                </a:solidFill>
+              </a:ln>
+            </p:spPr>
+            <p:style>
+              <a:lnRef idx="2">
+                <a:schemeClr val="accent1">
+                  <a:shade val="50000"/>
+                </a:schemeClr>
+              </a:lnRef>
+              <a:fillRef idx="1">
+                <a:schemeClr val="accent1"/>
+              </a:fillRef>
+              <a:effectRef idx="0">
+                <a:schemeClr val="accent1"/>
+              </a:effectRef>
+              <a:fontRef idx="minor">
+                <a:schemeClr val="lt1"/>
+              </a:fontRef>
+            </p:style>
+            <p:txBody>
+              <a:bodyPr rtlCol="0" anchor="ctr"/>
+              <a:lstStyle/>
+              <a:p>
+                <a:pPr algn="ctr"/>
+                <a:endParaRPr lang="en-US"/>
+              </a:p>
+            </p:txBody>
+          </p:sp>
+          <p:sp>
+            <p:nvSpPr>
+              <p:cNvPr id="47" name="Cube 46">
+                <a:extLst>
+                  <a:ext uri="{FF2B5EF4-FFF2-40B4-BE49-F238E27FC236}">
+                    <a16:creationId xmlns:a16="http://schemas.microsoft.com/office/drawing/2014/main" id="{9746346B-3169-7146-AB22-19CB6E3319D6}"/>
+                  </a:ext>
+                </a:extLst>
+              </p:cNvPr>
+              <p:cNvSpPr>
+                <a:spLocks noChangeAspect="1"/>
+              </p:cNvSpPr>
+              <p:nvPr/>
+            </p:nvSpPr>
+            <p:spPr>
+              <a:xfrm>
+                <a:off x="7985935" y="2574583"/>
+                <a:ext cx="182880" cy="182880"/>
+              </a:xfrm>
+              <a:prstGeom prst="cube">
+                <a:avLst/>
+              </a:prstGeom>
+              <a:solidFill>
+                <a:schemeClr val="accent4">
+                  <a:lumMod val="75000"/>
+                </a:schemeClr>
+              </a:solidFill>
+              <a:ln>
+                <a:solidFill>
+                  <a:schemeClr val="tx1"/>
+                </a:solidFill>
+              </a:ln>
+            </p:spPr>
+            <p:style>
+              <a:lnRef idx="2">
+                <a:schemeClr val="accent1">
+                  <a:shade val="50000"/>
+                </a:schemeClr>
+              </a:lnRef>
+              <a:fillRef idx="1">
+                <a:schemeClr val="accent1"/>
+              </a:fillRef>
+              <a:effectRef idx="0">
+                <a:schemeClr val="accent1"/>
+              </a:effectRef>
+              <a:fontRef idx="minor">
+                <a:schemeClr val="lt1"/>
+              </a:fontRef>
+            </p:style>
+            <p:txBody>
+              <a:bodyPr rtlCol="0" anchor="ctr"/>
+              <a:lstStyle/>
+              <a:p>
+                <a:pPr algn="ctr"/>
+                <a:endParaRPr lang="en-US"/>
+              </a:p>
+            </p:txBody>
+          </p:sp>
+        </p:grpSp>
+        <p:sp>
+          <p:nvSpPr>
+            <p:cNvPr id="63" name="TextBox 62">
+              <a:extLst>
+                <a:ext uri="{FF2B5EF4-FFF2-40B4-BE49-F238E27FC236}">
+                  <a16:creationId xmlns:a16="http://schemas.microsoft.com/office/drawing/2014/main" id="{4917D807-C5A1-7541-A487-B0B392AEF9DA}"/>
+                </a:ext>
+              </a:extLst>
+            </p:cNvPr>
+            <p:cNvSpPr txBox="1"/>
+            <p:nvPr/>
+          </p:nvSpPr>
+          <p:spPr>
+            <a:xfrm>
+              <a:off x="3359575" y="0"/>
+              <a:ext cx="1757917" cy="369332"/>
+            </a:xfrm>
+            <a:prstGeom prst="rect">
+              <a:avLst/>
+            </a:prstGeom>
+            <a:noFill/>
+          </p:spPr>
+          <p:txBody>
+            <a:bodyPr wrap="none" rtlCol="0">
+              <a:spAutoFit/>
+            </a:bodyPr>
+            <a:lstStyle/>
+            <a:p>
+              <a:r>
+                <a:rPr lang="en-US" dirty="0">
+                  <a:solidFill>
+                    <a:schemeClr val="accent1">
+                      <a:lumMod val="75000"/>
+                    </a:schemeClr>
+                  </a:solidFill>
+                </a:rPr>
+                <a:t>Sparse Obstacles</a:t>
+              </a:r>
+            </a:p>
+          </p:txBody>
+        </p:sp>
+        <p:cxnSp>
+          <p:nvCxnSpPr>
+            <p:cNvPr id="64" name="Curved Connector 63">
+              <a:extLst>
+                <a:ext uri="{FF2B5EF4-FFF2-40B4-BE49-F238E27FC236}">
+                  <a16:creationId xmlns:a16="http://schemas.microsoft.com/office/drawing/2014/main" id="{EE694F8E-C811-B547-AB62-D300F7FA6D2C}"/>
+                </a:ext>
+              </a:extLst>
+            </p:cNvPr>
+            <p:cNvCxnSpPr>
+              <a:cxnSpLocks/>
+              <a:stCxn id="63" idx="2"/>
+            </p:cNvCxnSpPr>
+            <p:nvPr/>
+          </p:nvCxnSpPr>
+          <p:spPr>
+            <a:xfrm rot="16200000" flipH="1">
+              <a:off x="4201254" y="406611"/>
+              <a:ext cx="463494" cy="388935"/>
+            </a:xfrm>
+            <a:prstGeom prst="curvedConnector3">
+              <a:avLst>
+                <a:gd name="adj1" fmla="val 50000"/>
+              </a:avLst>
+            </a:prstGeom>
+            <a:ln w="38100">
+              <a:solidFill>
+                <a:schemeClr val="accent1"/>
+              </a:solidFill>
+              <a:tailEnd type="triangle"/>
+            </a:ln>
+          </p:spPr>
+          <p:style>
+            <a:lnRef idx="1">
+              <a:schemeClr val="accent1"/>
+            </a:lnRef>
+            <a:fillRef idx="0">
+              <a:schemeClr val="accent1"/>
+            </a:fillRef>
+            <a:effectRef idx="0">
+              <a:schemeClr val="accent1"/>
+            </a:effectRef>
+            <a:fontRef idx="minor">
+              <a:schemeClr val="tx1"/>
+            </a:fontRef>
+          </p:style>
+        </p:cxnSp>
+      </p:grpSp>
+      <p:grpSp>
+        <p:nvGrpSpPr>
+          <p:cNvPr id="13" name="Group 12">
+            <a:extLst>
+              <a:ext uri="{FF2B5EF4-FFF2-40B4-BE49-F238E27FC236}">
+                <a16:creationId xmlns:a16="http://schemas.microsoft.com/office/drawing/2014/main" id="{EE309C1E-4B4B-8D4A-881C-B9B1D88D69E7}"/>
+              </a:ext>
+            </a:extLst>
+          </p:cNvPr>
+          <p:cNvGrpSpPr/>
+          <p:nvPr/>
+        </p:nvGrpSpPr>
+        <p:grpSpPr>
+          <a:xfrm>
+            <a:off x="2810935" y="2111215"/>
+            <a:ext cx="1906301" cy="1543966"/>
+            <a:chOff x="2810935" y="2111215"/>
+            <a:chExt cx="1906301" cy="1543966"/>
+          </a:xfrm>
+        </p:grpSpPr>
+        <p:grpSp>
+          <p:nvGrpSpPr>
+            <p:cNvPr id="48" name="Group 47">
+              <a:extLst>
+                <a:ext uri="{FF2B5EF4-FFF2-40B4-BE49-F238E27FC236}">
+                  <a16:creationId xmlns:a16="http://schemas.microsoft.com/office/drawing/2014/main" id="{0D1BB188-F0D8-9C42-8A6F-BB0E02FBABDA}"/>
+                </a:ext>
+              </a:extLst>
+            </p:cNvPr>
+            <p:cNvGrpSpPr/>
+            <p:nvPr/>
+          </p:nvGrpSpPr>
+          <p:grpSpPr>
+            <a:xfrm>
+              <a:off x="2810935" y="2111215"/>
+              <a:ext cx="731520" cy="295041"/>
+              <a:chOff x="9699621" y="3380438"/>
+              <a:chExt cx="731520" cy="295041"/>
+            </a:xfrm>
+          </p:grpSpPr>
+          <p:sp>
+            <p:nvSpPr>
+              <p:cNvPr id="49" name="Cube 48">
+                <a:extLst>
+                  <a:ext uri="{FF2B5EF4-FFF2-40B4-BE49-F238E27FC236}">
+                    <a16:creationId xmlns:a16="http://schemas.microsoft.com/office/drawing/2014/main" id="{D63C733B-479C-0E4F-8D69-44A8AD582F93}"/>
+                  </a:ext>
+                </a:extLst>
+              </p:cNvPr>
+              <p:cNvSpPr>
+                <a:spLocks noChangeAspect="1"/>
+              </p:cNvSpPr>
+              <p:nvPr/>
+            </p:nvSpPr>
+            <p:spPr>
+              <a:xfrm>
+                <a:off x="9882501" y="3492599"/>
+                <a:ext cx="182880" cy="182880"/>
+              </a:xfrm>
+              <a:prstGeom prst="cube">
+                <a:avLst/>
+              </a:prstGeom>
+              <a:solidFill>
+                <a:schemeClr val="accent4">
+                  <a:lumMod val="75000"/>
+                </a:schemeClr>
+              </a:solidFill>
+              <a:ln>
+                <a:solidFill>
+                  <a:schemeClr val="tx1"/>
+                </a:solidFill>
+              </a:ln>
+            </p:spPr>
+            <p:style>
+              <a:lnRef idx="2">
+                <a:schemeClr val="accent1">
+                  <a:shade val="50000"/>
+                </a:schemeClr>
+              </a:lnRef>
+              <a:fillRef idx="1">
+                <a:schemeClr val="accent1"/>
+              </a:fillRef>
+              <a:effectRef idx="0">
+                <a:schemeClr val="accent1"/>
+              </a:effectRef>
+              <a:fontRef idx="minor">
+                <a:schemeClr val="lt1"/>
+              </a:fontRef>
+            </p:style>
+            <p:txBody>
+              <a:bodyPr rtlCol="0" anchor="ctr"/>
+              <a:lstStyle/>
+              <a:p>
+                <a:pPr algn="ctr"/>
+                <a:endParaRPr lang="en-US"/>
+              </a:p>
+            </p:txBody>
+          </p:sp>
+          <p:sp>
+            <p:nvSpPr>
+              <p:cNvPr id="50" name="Cube 49">
+                <a:extLst>
+                  <a:ext uri="{FF2B5EF4-FFF2-40B4-BE49-F238E27FC236}">
+                    <a16:creationId xmlns:a16="http://schemas.microsoft.com/office/drawing/2014/main" id="{A1C36A0A-7391-4547-95B4-9A704D4EA7FF}"/>
+                  </a:ext>
+                </a:extLst>
+              </p:cNvPr>
+              <p:cNvSpPr>
+                <a:spLocks noChangeAspect="1"/>
+              </p:cNvSpPr>
+              <p:nvPr/>
+            </p:nvSpPr>
+            <p:spPr>
+              <a:xfrm>
+                <a:off x="10065381" y="3492599"/>
+                <a:ext cx="182880" cy="182880"/>
+              </a:xfrm>
+              <a:prstGeom prst="cube">
+                <a:avLst/>
+              </a:prstGeom>
+              <a:solidFill>
+                <a:schemeClr val="accent4">
+                  <a:lumMod val="75000"/>
+                </a:schemeClr>
+              </a:solidFill>
+              <a:ln>
+                <a:solidFill>
+                  <a:schemeClr val="tx1"/>
+                </a:solidFill>
+              </a:ln>
+            </p:spPr>
+            <p:style>
+              <a:lnRef idx="2">
+                <a:schemeClr val="accent1">
+                  <a:shade val="50000"/>
+                </a:schemeClr>
+              </a:lnRef>
+              <a:fillRef idx="1">
+                <a:schemeClr val="accent1"/>
+              </a:fillRef>
+              <a:effectRef idx="0">
+                <a:schemeClr val="accent1"/>
+              </a:effectRef>
+              <a:fontRef idx="minor">
+                <a:schemeClr val="lt1"/>
+              </a:fontRef>
+            </p:style>
+            <p:txBody>
+              <a:bodyPr rtlCol="0" anchor="ctr"/>
+              <a:lstStyle/>
+              <a:p>
+                <a:pPr algn="ctr"/>
+                <a:endParaRPr lang="en-US"/>
+              </a:p>
+            </p:txBody>
+          </p:sp>
+          <p:sp>
+            <p:nvSpPr>
+              <p:cNvPr id="51" name="Cube 50">
+                <a:extLst>
+                  <a:ext uri="{FF2B5EF4-FFF2-40B4-BE49-F238E27FC236}">
+                    <a16:creationId xmlns:a16="http://schemas.microsoft.com/office/drawing/2014/main" id="{7694E954-63B8-234D-A64E-A0D757903E80}"/>
+                  </a:ext>
+                </a:extLst>
+              </p:cNvPr>
+              <p:cNvSpPr>
+                <a:spLocks noChangeAspect="1"/>
+              </p:cNvSpPr>
+              <p:nvPr/>
+            </p:nvSpPr>
+            <p:spPr>
+              <a:xfrm>
+                <a:off x="9882501" y="3380438"/>
+                <a:ext cx="182880" cy="182880"/>
+              </a:xfrm>
+              <a:prstGeom prst="cube">
+                <a:avLst/>
+              </a:prstGeom>
+              <a:solidFill>
+                <a:schemeClr val="accent4">
+                  <a:lumMod val="75000"/>
+                </a:schemeClr>
+              </a:solidFill>
+              <a:ln>
+                <a:solidFill>
+                  <a:schemeClr val="tx1"/>
+                </a:solidFill>
+              </a:ln>
+            </p:spPr>
+            <p:style>
+              <a:lnRef idx="2">
+                <a:schemeClr val="accent1">
+                  <a:shade val="50000"/>
+                </a:schemeClr>
+              </a:lnRef>
+              <a:fillRef idx="1">
+                <a:schemeClr val="accent1"/>
+              </a:fillRef>
+              <a:effectRef idx="0">
+                <a:schemeClr val="accent1"/>
+              </a:effectRef>
+              <a:fontRef idx="minor">
+                <a:schemeClr val="lt1"/>
+              </a:fontRef>
+            </p:style>
+            <p:txBody>
+              <a:bodyPr rtlCol="0" anchor="ctr"/>
+              <a:lstStyle/>
+              <a:p>
+                <a:pPr algn="ctr"/>
+                <a:endParaRPr lang="en-US"/>
+              </a:p>
+            </p:txBody>
+          </p:sp>
+          <p:sp>
+            <p:nvSpPr>
+              <p:cNvPr id="52" name="Cube 51">
+                <a:extLst>
+                  <a:ext uri="{FF2B5EF4-FFF2-40B4-BE49-F238E27FC236}">
+                    <a16:creationId xmlns:a16="http://schemas.microsoft.com/office/drawing/2014/main" id="{BC387846-E84D-1B4A-94FA-05E991AC4710}"/>
+                  </a:ext>
+                </a:extLst>
+              </p:cNvPr>
+              <p:cNvSpPr>
+                <a:spLocks noChangeAspect="1"/>
+              </p:cNvSpPr>
+              <p:nvPr/>
+            </p:nvSpPr>
+            <p:spPr>
+              <a:xfrm>
+                <a:off x="10065381" y="3380438"/>
+                <a:ext cx="182880" cy="182880"/>
+              </a:xfrm>
+              <a:prstGeom prst="cube">
+                <a:avLst/>
+              </a:prstGeom>
+              <a:solidFill>
+                <a:schemeClr val="accent4">
+                  <a:lumMod val="75000"/>
+                </a:schemeClr>
+              </a:solidFill>
+              <a:ln>
+                <a:solidFill>
+                  <a:schemeClr val="tx1"/>
+                </a:solidFill>
+              </a:ln>
+            </p:spPr>
+            <p:style>
+              <a:lnRef idx="2">
+                <a:schemeClr val="accent1">
+                  <a:shade val="50000"/>
+                </a:schemeClr>
+              </a:lnRef>
+              <a:fillRef idx="1">
+                <a:schemeClr val="accent1"/>
+              </a:fillRef>
+              <a:effectRef idx="0">
+                <a:schemeClr val="accent1"/>
+              </a:effectRef>
+              <a:fontRef idx="minor">
+                <a:schemeClr val="lt1"/>
+              </a:fontRef>
+            </p:style>
+            <p:txBody>
+              <a:bodyPr rtlCol="0" anchor="ctr"/>
+              <a:lstStyle/>
+              <a:p>
+                <a:pPr algn="ctr"/>
+                <a:endParaRPr lang="en-US"/>
+              </a:p>
+            </p:txBody>
+          </p:sp>
+          <p:sp>
+            <p:nvSpPr>
+              <p:cNvPr id="53" name="Cube 52">
+                <a:extLst>
+                  <a:ext uri="{FF2B5EF4-FFF2-40B4-BE49-F238E27FC236}">
+                    <a16:creationId xmlns:a16="http://schemas.microsoft.com/office/drawing/2014/main" id="{07DFB99B-C604-DB47-9F48-95849850B197}"/>
+                  </a:ext>
+                </a:extLst>
+              </p:cNvPr>
+              <p:cNvSpPr>
+                <a:spLocks noChangeAspect="1"/>
+              </p:cNvSpPr>
+              <p:nvPr/>
+            </p:nvSpPr>
+            <p:spPr>
+              <a:xfrm>
+                <a:off x="10248261" y="3492599"/>
+                <a:ext cx="182880" cy="182880"/>
+              </a:xfrm>
+              <a:prstGeom prst="cube">
+                <a:avLst/>
+              </a:prstGeom>
+              <a:solidFill>
+                <a:schemeClr val="accent4">
+                  <a:lumMod val="75000"/>
+                </a:schemeClr>
+              </a:solidFill>
+              <a:ln>
+                <a:solidFill>
+                  <a:schemeClr val="tx1"/>
+                </a:solidFill>
+              </a:ln>
+            </p:spPr>
+            <p:style>
+              <a:lnRef idx="2">
+                <a:schemeClr val="accent1">
+                  <a:shade val="50000"/>
+                </a:schemeClr>
+              </a:lnRef>
+              <a:fillRef idx="1">
+                <a:schemeClr val="accent1"/>
+              </a:fillRef>
+              <a:effectRef idx="0">
+                <a:schemeClr val="accent1"/>
+              </a:effectRef>
+              <a:fontRef idx="minor">
+                <a:schemeClr val="lt1"/>
+              </a:fontRef>
+            </p:style>
+            <p:txBody>
+              <a:bodyPr rtlCol="0" anchor="ctr"/>
+              <a:lstStyle/>
+              <a:p>
+                <a:pPr algn="ctr"/>
+                <a:endParaRPr lang="en-US"/>
+              </a:p>
+            </p:txBody>
+          </p:sp>
+          <p:sp>
+            <p:nvSpPr>
+              <p:cNvPr id="54" name="Cube 53">
+                <a:extLst>
+                  <a:ext uri="{FF2B5EF4-FFF2-40B4-BE49-F238E27FC236}">
+                    <a16:creationId xmlns:a16="http://schemas.microsoft.com/office/drawing/2014/main" id="{D01BB3D6-2E95-A24C-B55F-2AD88B0B431D}"/>
+                  </a:ext>
+                </a:extLst>
+              </p:cNvPr>
+              <p:cNvSpPr>
+                <a:spLocks noChangeAspect="1"/>
+              </p:cNvSpPr>
+              <p:nvPr/>
+            </p:nvSpPr>
+            <p:spPr>
+              <a:xfrm>
+                <a:off x="10248261" y="3380438"/>
+                <a:ext cx="182880" cy="182880"/>
+              </a:xfrm>
+              <a:prstGeom prst="cube">
+                <a:avLst/>
+              </a:prstGeom>
+              <a:solidFill>
+                <a:schemeClr val="accent4">
+                  <a:lumMod val="75000"/>
+                </a:schemeClr>
+              </a:solidFill>
+              <a:ln>
+                <a:solidFill>
+                  <a:schemeClr val="tx1"/>
+                </a:solidFill>
+              </a:ln>
+            </p:spPr>
+            <p:style>
+              <a:lnRef idx="2">
+                <a:schemeClr val="accent1">
+                  <a:shade val="50000"/>
+                </a:schemeClr>
+              </a:lnRef>
+              <a:fillRef idx="1">
+                <a:schemeClr val="accent1"/>
+              </a:fillRef>
+              <a:effectRef idx="0">
+                <a:schemeClr val="accent1"/>
+              </a:effectRef>
+              <a:fontRef idx="minor">
+                <a:schemeClr val="lt1"/>
+              </a:fontRef>
+            </p:style>
+            <p:txBody>
+              <a:bodyPr rtlCol="0" anchor="ctr"/>
+              <a:lstStyle/>
+              <a:p>
+                <a:pPr algn="ctr"/>
+                <a:endParaRPr lang="en-US"/>
+              </a:p>
+            </p:txBody>
+          </p:sp>
+          <p:sp>
+            <p:nvSpPr>
+              <p:cNvPr id="55" name="Cube 54">
+                <a:extLst>
+                  <a:ext uri="{FF2B5EF4-FFF2-40B4-BE49-F238E27FC236}">
+                    <a16:creationId xmlns:a16="http://schemas.microsoft.com/office/drawing/2014/main" id="{AA5864EE-D0B7-434D-9581-3882DC12C406}"/>
+                  </a:ext>
+                </a:extLst>
+              </p:cNvPr>
+              <p:cNvSpPr>
+                <a:spLocks noChangeAspect="1"/>
+              </p:cNvSpPr>
+              <p:nvPr/>
+            </p:nvSpPr>
+            <p:spPr>
+              <a:xfrm>
+                <a:off x="9699621" y="3492599"/>
+                <a:ext cx="182880" cy="182880"/>
+              </a:xfrm>
+              <a:prstGeom prst="cube">
+                <a:avLst/>
+              </a:prstGeom>
+              <a:solidFill>
+                <a:schemeClr val="accent4">
+                  <a:lumMod val="75000"/>
+                </a:schemeClr>
+              </a:solidFill>
+              <a:ln>
+                <a:solidFill>
+                  <a:schemeClr val="tx1"/>
+                </a:solidFill>
+              </a:ln>
+            </p:spPr>
+            <p:style>
+              <a:lnRef idx="2">
+                <a:schemeClr val="accent1">
+                  <a:shade val="50000"/>
+                </a:schemeClr>
+              </a:lnRef>
+              <a:fillRef idx="1">
+                <a:schemeClr val="accent1"/>
+              </a:fillRef>
+              <a:effectRef idx="0">
+                <a:schemeClr val="accent1"/>
+              </a:effectRef>
+              <a:fontRef idx="minor">
+                <a:schemeClr val="lt1"/>
+              </a:fontRef>
+            </p:style>
+            <p:txBody>
+              <a:bodyPr rtlCol="0" anchor="ctr"/>
+              <a:lstStyle/>
+              <a:p>
+                <a:pPr algn="ctr"/>
+                <a:endParaRPr lang="en-US"/>
+              </a:p>
+            </p:txBody>
+          </p:sp>
+          <p:sp>
+            <p:nvSpPr>
+              <p:cNvPr id="56" name="Cube 55">
+                <a:extLst>
+                  <a:ext uri="{FF2B5EF4-FFF2-40B4-BE49-F238E27FC236}">
+                    <a16:creationId xmlns:a16="http://schemas.microsoft.com/office/drawing/2014/main" id="{628613B1-B6C0-7B42-B616-32E3359EF3B2}"/>
+                  </a:ext>
+                </a:extLst>
+              </p:cNvPr>
+              <p:cNvSpPr>
+                <a:spLocks noChangeAspect="1"/>
+              </p:cNvSpPr>
+              <p:nvPr/>
+            </p:nvSpPr>
+            <p:spPr>
+              <a:xfrm>
+                <a:off x="9699621" y="3380438"/>
+                <a:ext cx="182880" cy="182880"/>
+              </a:xfrm>
+              <a:prstGeom prst="cube">
+                <a:avLst/>
+              </a:prstGeom>
+              <a:solidFill>
+                <a:schemeClr val="accent4">
+                  <a:lumMod val="75000"/>
+                </a:schemeClr>
+              </a:solidFill>
+              <a:ln>
+                <a:solidFill>
+                  <a:schemeClr val="tx1"/>
+                </a:solidFill>
+              </a:ln>
+            </p:spPr>
+            <p:style>
+              <a:lnRef idx="2">
+                <a:schemeClr val="accent1">
+                  <a:shade val="50000"/>
+                </a:schemeClr>
+              </a:lnRef>
+              <a:fillRef idx="1">
+                <a:schemeClr val="accent1"/>
+              </a:fillRef>
+              <a:effectRef idx="0">
+                <a:schemeClr val="accent1"/>
+              </a:effectRef>
+              <a:fontRef idx="minor">
+                <a:schemeClr val="lt1"/>
+              </a:fontRef>
+            </p:style>
+            <p:txBody>
+              <a:bodyPr rtlCol="0" anchor="ctr"/>
+              <a:lstStyle/>
+              <a:p>
+                <a:pPr algn="ctr"/>
+                <a:endParaRPr lang="en-US"/>
+              </a:p>
+            </p:txBody>
+          </p:sp>
+        </p:grpSp>
+        <p:sp>
+          <p:nvSpPr>
+            <p:cNvPr id="79" name="TextBox 78">
+              <a:extLst>
+                <a:ext uri="{FF2B5EF4-FFF2-40B4-BE49-F238E27FC236}">
+                  <a16:creationId xmlns:a16="http://schemas.microsoft.com/office/drawing/2014/main" id="{34349BBD-7F74-0E48-8895-12A6D3DCB13C}"/>
+                </a:ext>
+              </a:extLst>
+            </p:cNvPr>
+            <p:cNvSpPr txBox="1"/>
+            <p:nvPr/>
+          </p:nvSpPr>
+          <p:spPr>
+            <a:xfrm>
+              <a:off x="2993815" y="3285849"/>
+              <a:ext cx="1723421" cy="369332"/>
+            </a:xfrm>
+            <a:prstGeom prst="rect">
+              <a:avLst/>
+            </a:prstGeom>
+            <a:noFill/>
+          </p:spPr>
+          <p:txBody>
+            <a:bodyPr wrap="none" rtlCol="0">
+              <a:spAutoFit/>
+            </a:bodyPr>
+            <a:lstStyle/>
+            <a:p>
+              <a:r>
+                <a:rPr lang="en-US" dirty="0">
+                  <a:solidFill>
+                    <a:schemeClr val="accent1">
+                      <a:lumMod val="75000"/>
+                    </a:schemeClr>
+                  </a:solidFill>
+                </a:rPr>
+                <a:t>Dense Obstacles</a:t>
+              </a:r>
+            </a:p>
+          </p:txBody>
+        </p:sp>
+        <p:cxnSp>
+          <p:nvCxnSpPr>
+            <p:cNvPr id="80" name="Curved Connector 79">
+              <a:extLst>
+                <a:ext uri="{FF2B5EF4-FFF2-40B4-BE49-F238E27FC236}">
+                  <a16:creationId xmlns:a16="http://schemas.microsoft.com/office/drawing/2014/main" id="{2F899582-1278-AF49-A9FF-7CECC66357FC}"/>
+                </a:ext>
+              </a:extLst>
+            </p:cNvPr>
+            <p:cNvCxnSpPr>
+              <a:cxnSpLocks/>
+              <a:stCxn id="79" idx="0"/>
+            </p:cNvCxnSpPr>
+            <p:nvPr/>
+          </p:nvCxnSpPr>
+          <p:spPr>
+            <a:xfrm rot="16200000" flipV="1">
+              <a:off x="3104977" y="2535300"/>
+              <a:ext cx="832824" cy="668274"/>
+            </a:xfrm>
+            <a:prstGeom prst="curvedConnector3">
+              <a:avLst/>
+            </a:prstGeom>
+            <a:ln w="38100">
+              <a:solidFill>
+                <a:schemeClr val="accent1"/>
+              </a:solidFill>
+              <a:tailEnd type="triangle"/>
+            </a:ln>
+          </p:spPr>
+          <p:style>
+            <a:lnRef idx="1">
+              <a:schemeClr val="accent1"/>
+            </a:lnRef>
+            <a:fillRef idx="0">
+              <a:schemeClr val="accent1"/>
+            </a:fillRef>
+            <a:effectRef idx="0">
+              <a:schemeClr val="accent1"/>
+            </a:effectRef>
+            <a:fontRef idx="minor">
+              <a:schemeClr val="tx1"/>
+            </a:fontRef>
+          </p:style>
+        </p:cxnSp>
+      </p:grpSp>
+    </p:spTree>
+    <p:extLst>
+      <p:ext uri="{BB962C8B-B14F-4D97-AF65-F5344CB8AC3E}">
+        <p14:creationId xmlns:p14="http://schemas.microsoft.com/office/powerpoint/2010/main" val="4051071724"/>
+      </p:ext>
+    </p:extLst>
+  </p:cSld>
+  <p:clrMapOvr>
+    <a:masterClrMapping/>
+  </p:clrMapOvr>
+</p:sld>
+</file>
+
+<file path=ppt/slides/slide16.xml><?xml version="1.0" encoding="utf-8"?>
+<p:sld xmlns:a="http://schemas.openxmlformats.org/drawingml/2006/main" xmlns:r="http://schemas.openxmlformats.org/officeDocument/2006/relationships" xmlns:p="http://schemas.openxmlformats.org/presentationml/2006/main">
+  <p:cSld>
+    <p:spTree>
+      <p:nvGrpSpPr>
+        <p:cNvPr id="1" name=""/>
+        <p:cNvGrpSpPr/>
+        <p:nvPr/>
+      </p:nvGrpSpPr>
+      <p:grpSpPr>
+        <a:xfrm>
+          <a:off x="0" y="0"/>
+          <a:ext cx="0" cy="0"/>
+          <a:chOff x="0" y="0"/>
+          <a:chExt cx="0" cy="0"/>
+        </a:xfrm>
+      </p:grpSpPr>
       <p:sp>
         <p:nvSpPr>
           <p:cNvPr id="2" name="Title 1">
@@ -14694,7 +17345,7 @@
 </p:sld>
 </file>
 
-<file path=ppt/slides/slide16.xml><?xml version="1.0" encoding="utf-8"?>
+<file path=ppt/slides/slide17.xml><?xml version="1.0" encoding="utf-8"?>
 <p:sld xmlns:a="http://schemas.openxmlformats.org/drawingml/2006/main" xmlns:r="http://schemas.openxmlformats.org/officeDocument/2006/relationships" xmlns:p="http://schemas.openxmlformats.org/presentationml/2006/main">
   <p:cSld>
     <p:spTree>
@@ -16831,7 +19482,7 @@
 </p:sld>
 </file>
 
-<file path=ppt/slides/slide17.xml><?xml version="1.0" encoding="utf-8"?>
+<file path=ppt/slides/slide18.xml><?xml version="1.0" encoding="utf-8"?>
 <p:sld xmlns:a="http://schemas.openxmlformats.org/drawingml/2006/main" xmlns:r="http://schemas.openxmlformats.org/officeDocument/2006/relationships" xmlns:p="http://schemas.openxmlformats.org/presentationml/2006/main">
   <p:cSld>
     <p:spTree>
@@ -18757,7 +21408,7 @@
 </p:sld>
 </file>
 
-<file path=ppt/slides/slide18.xml><?xml version="1.0" encoding="utf-8"?>
+<file path=ppt/slides/slide19.xml><?xml version="1.0" encoding="utf-8"?>
 <p:sld xmlns:a="http://schemas.openxmlformats.org/drawingml/2006/main" xmlns:r="http://schemas.openxmlformats.org/officeDocument/2006/relationships" xmlns:p="http://schemas.openxmlformats.org/presentationml/2006/main">
   <p:cSld>
     <p:spTree>
@@ -20984,7 +23635,66 @@
 </p:sld>
 </file>
 
-<file path=ppt/slides/slide19.xml><?xml version="1.0" encoding="utf-8"?>
+<file path=ppt/slides/slide2.xml><?xml version="1.0" encoding="utf-8"?>
+<p:sld xmlns:a="http://schemas.openxmlformats.org/drawingml/2006/main" xmlns:r="http://schemas.openxmlformats.org/officeDocument/2006/relationships" xmlns:p="http://schemas.openxmlformats.org/presentationml/2006/main">
+  <p:cSld>
+    <p:spTree>
+      <p:nvGrpSpPr>
+        <p:cNvPr id="1" name=""/>
+        <p:cNvGrpSpPr/>
+        <p:nvPr/>
+      </p:nvGrpSpPr>
+      <p:grpSpPr>
+        <a:xfrm>
+          <a:off x="0" y="0"/>
+          <a:ext cx="0" cy="0"/>
+          <a:chOff x="0" y="0"/>
+          <a:chExt cx="0" cy="0"/>
+        </a:xfrm>
+      </p:grpSpPr>
+      <p:pic>
+        <p:nvPicPr>
+          <p:cNvPr id="41" name="Picture 40">
+            <a:extLst>
+              <a:ext uri="{FF2B5EF4-FFF2-40B4-BE49-F238E27FC236}">
+                <a16:creationId xmlns:a16="http://schemas.microsoft.com/office/drawing/2014/main" id="{609624A9-CCAE-924C-80B0-6648109B1D42}"/>
+              </a:ext>
+            </a:extLst>
+          </p:cNvPr>
+          <p:cNvPicPr>
+            <a:picLocks noChangeAspect="1"/>
+          </p:cNvPicPr>
+          <p:nvPr/>
+        </p:nvPicPr>
+        <p:blipFill rotWithShape="1">
+          <a:blip r:embed="rId2"/>
+          <a:srcRect t="8798" r="51455" b="56701"/>
+          <a:stretch/>
+        </p:blipFill>
+        <p:spPr>
+          <a:xfrm>
+            <a:off x="0" y="0"/>
+            <a:ext cx="6645135" cy="3657600"/>
+          </a:xfrm>
+          <a:prstGeom prst="rect">
+            <a:avLst/>
+          </a:prstGeom>
+        </p:spPr>
+      </p:pic>
+    </p:spTree>
+    <p:extLst>
+      <p:ext uri="{BB962C8B-B14F-4D97-AF65-F5344CB8AC3E}">
+        <p14:creationId xmlns:p14="http://schemas.microsoft.com/office/powerpoint/2010/main" val="3895911574"/>
+      </p:ext>
+    </p:extLst>
+  </p:cSld>
+  <p:clrMapOvr>
+    <a:masterClrMapping/>
+  </p:clrMapOvr>
+</p:sld>
+</file>
+
+<file path=ppt/slides/slide20.xml><?xml version="1.0" encoding="utf-8"?>
 <p:sld xmlns:a="http://schemas.openxmlformats.org/drawingml/2006/main" xmlns:r="http://schemas.openxmlformats.org/officeDocument/2006/relationships" xmlns:p="http://schemas.openxmlformats.org/presentationml/2006/main">
   <p:cSld>
     <p:spTree>
@@ -22901,65 +25611,6 @@
     <p:extLst>
       <p:ext uri="{BB962C8B-B14F-4D97-AF65-F5344CB8AC3E}">
         <p14:creationId xmlns:p14="http://schemas.microsoft.com/office/powerpoint/2010/main" val="2841103106"/>
-      </p:ext>
-    </p:extLst>
-  </p:cSld>
-  <p:clrMapOvr>
-    <a:masterClrMapping/>
-  </p:clrMapOvr>
-</p:sld>
-</file>
-
-<file path=ppt/slides/slide2.xml><?xml version="1.0" encoding="utf-8"?>
-<p:sld xmlns:a="http://schemas.openxmlformats.org/drawingml/2006/main" xmlns:r="http://schemas.openxmlformats.org/officeDocument/2006/relationships" xmlns:p="http://schemas.openxmlformats.org/presentationml/2006/main">
-  <p:cSld>
-    <p:spTree>
-      <p:nvGrpSpPr>
-        <p:cNvPr id="1" name=""/>
-        <p:cNvGrpSpPr/>
-        <p:nvPr/>
-      </p:nvGrpSpPr>
-      <p:grpSpPr>
-        <a:xfrm>
-          <a:off x="0" y="0"/>
-          <a:ext cx="0" cy="0"/>
-          <a:chOff x="0" y="0"/>
-          <a:chExt cx="0" cy="0"/>
-        </a:xfrm>
-      </p:grpSpPr>
-      <p:pic>
-        <p:nvPicPr>
-          <p:cNvPr id="41" name="Picture 40">
-            <a:extLst>
-              <a:ext uri="{FF2B5EF4-FFF2-40B4-BE49-F238E27FC236}">
-                <a16:creationId xmlns:a16="http://schemas.microsoft.com/office/drawing/2014/main" id="{609624A9-CCAE-924C-80B0-6648109B1D42}"/>
-              </a:ext>
-            </a:extLst>
-          </p:cNvPr>
-          <p:cNvPicPr>
-            <a:picLocks noChangeAspect="1"/>
-          </p:cNvPicPr>
-          <p:nvPr/>
-        </p:nvPicPr>
-        <p:blipFill rotWithShape="1">
-          <a:blip r:embed="rId2"/>
-          <a:srcRect t="8798" r="51455" b="56701"/>
-          <a:stretch/>
-        </p:blipFill>
-        <p:spPr>
-          <a:xfrm>
-            <a:off x="0" y="0"/>
-            <a:ext cx="6645135" cy="3657600"/>
-          </a:xfrm>
-          <a:prstGeom prst="rect">
-            <a:avLst/>
-          </a:prstGeom>
-        </p:spPr>
-      </p:pic>
-    </p:spTree>
-    <p:extLst>
-      <p:ext uri="{BB962C8B-B14F-4D97-AF65-F5344CB8AC3E}">
-        <p14:creationId xmlns:p14="http://schemas.microsoft.com/office/powerpoint/2010/main" val="3895911574"/>
       </p:ext>
     </p:extLst>
   </p:cSld>

</xml_diff>

<commit_message>
added navigation paths to the picture example of mobile robot problem -- for paper uses
</commit_message>
<xml_diff>
--- a/XPlanningEvaluation/data/instruction/instruction-color-blind-friendly.pptx
+++ b/XPlanningEvaluation/data/instruction/instruction-color-blind-friendly.pptx
@@ -5,7 +5,7 @@
     <p:sldMasterId id="2147483648" r:id="rId1"/>
   </p:sldMasterIdLst>
   <p:notesMasterIdLst>
-    <p:notesMasterId r:id="rId22"/>
+    <p:notesMasterId r:id="rId23"/>
   </p:notesMasterIdLst>
   <p:sldIdLst>
     <p:sldId id="258" r:id="rId2"/>
@@ -23,11 +23,12 @@
     <p:sldId id="291" r:id="rId14"/>
     <p:sldId id="296" r:id="rId15"/>
     <p:sldId id="303" r:id="rId16"/>
-    <p:sldId id="287" r:id="rId17"/>
-    <p:sldId id="297" r:id="rId18"/>
-    <p:sldId id="301" r:id="rId19"/>
-    <p:sldId id="299" r:id="rId20"/>
-    <p:sldId id="302" r:id="rId21"/>
+    <p:sldId id="304" r:id="rId17"/>
+    <p:sldId id="287" r:id="rId18"/>
+    <p:sldId id="297" r:id="rId19"/>
+    <p:sldId id="301" r:id="rId20"/>
+    <p:sldId id="299" r:id="rId21"/>
+    <p:sldId id="302" r:id="rId22"/>
   </p:sldIdLst>
   <p:sldSz cx="12192000" cy="6858000"/>
   <p:notesSz cx="6858000" cy="9144000"/>
@@ -216,7 +217,7 @@
           <a:p>
             <a:fld id="{EFB11D43-C1E7-274A-84D8-148414CF7825}" type="datetimeFigureOut">
               <a:rPr lang="en-US" smtClean="0"/>
-              <a:t>4/9/20</a:t>
+              <a:t>4/22/20</a:t>
             </a:fld>
             <a:endParaRPr lang="en-US"/>
           </a:p>
@@ -1114,10 +1115,14 @@
           <a:bodyPr/>
           <a:lstStyle/>
           <a:p>
-            <a:pPr marL="171450" indent="-171450">
+            <a:pPr marL="0" indent="0">
               <a:buFont typeface="Arial" panose="020B0604020202020204" pitchFamily="34" charset="0"/>
-              <a:buChar char="•"/>
+              <a:buNone/>
             </a:pPr>
+            <a:r>
+              <a:rPr lang="en-US"/>
+              <a:t>For paper uses</a:t>
+            </a:r>
             <a:endParaRPr lang="en-US" dirty="0"/>
           </a:p>
         </p:txBody>
@@ -1202,6 +1207,97 @@
           <a:bodyPr/>
           <a:lstStyle/>
           <a:p>
+            <a:pPr marL="0" indent="0">
+              <a:buFont typeface="Arial" panose="020B0604020202020204" pitchFamily="34" charset="0"/>
+              <a:buNone/>
+            </a:pPr>
+            <a:r>
+              <a:rPr lang="en-US" dirty="0"/>
+              <a:t>For paper uses</a:t>
+            </a:r>
+          </a:p>
+        </p:txBody>
+      </p:sp>
+      <p:sp>
+        <p:nvSpPr>
+          <p:cNvPr id="4" name="Slide Number Placeholder 3"/>
+          <p:cNvSpPr>
+            <a:spLocks noGrp="1"/>
+          </p:cNvSpPr>
+          <p:nvPr>
+            <p:ph type="sldNum" sz="quarter" idx="5"/>
+          </p:nvPr>
+        </p:nvSpPr>
+        <p:spPr/>
+        <p:txBody>
+          <a:bodyPr/>
+          <a:lstStyle/>
+          <a:p>
+            <a:fld id="{EB44CB67-3B38-3142-A3A6-00A348D8C8B3}" type="slidenum">
+              <a:rPr lang="en-US" smtClean="0"/>
+              <a:t>16</a:t>
+            </a:fld>
+            <a:endParaRPr lang="en-US"/>
+          </a:p>
+        </p:txBody>
+      </p:sp>
+    </p:spTree>
+    <p:extLst>
+      <p:ext uri="{BB962C8B-B14F-4D97-AF65-F5344CB8AC3E}">
+        <p14:creationId xmlns:p14="http://schemas.microsoft.com/office/powerpoint/2010/main" val="2598114787"/>
+      </p:ext>
+    </p:extLst>
+  </p:cSld>
+  <p:clrMapOvr>
+    <a:masterClrMapping/>
+  </p:clrMapOvr>
+</p:notes>
+</file>
+
+<file path=ppt/notesSlides/notesSlide8.xml><?xml version="1.0" encoding="utf-8"?>
+<p:notes xmlns:a="http://schemas.openxmlformats.org/drawingml/2006/main" xmlns:r="http://schemas.openxmlformats.org/officeDocument/2006/relationships" xmlns:p="http://schemas.openxmlformats.org/presentationml/2006/main">
+  <p:cSld>
+    <p:spTree>
+      <p:nvGrpSpPr>
+        <p:cNvPr id="1" name=""/>
+        <p:cNvGrpSpPr/>
+        <p:nvPr/>
+      </p:nvGrpSpPr>
+      <p:grpSpPr>
+        <a:xfrm>
+          <a:off x="0" y="0"/>
+          <a:ext cx="0" cy="0"/>
+          <a:chOff x="0" y="0"/>
+          <a:chExt cx="0" cy="0"/>
+        </a:xfrm>
+      </p:grpSpPr>
+      <p:sp>
+        <p:nvSpPr>
+          <p:cNvPr id="2" name="Slide Image Placeholder 1"/>
+          <p:cNvSpPr>
+            <a:spLocks noGrp="1" noRot="1" noChangeAspect="1"/>
+          </p:cNvSpPr>
+          <p:nvPr>
+            <p:ph type="sldImg"/>
+          </p:nvPr>
+        </p:nvSpPr>
+        <p:spPr/>
+      </p:sp>
+      <p:sp>
+        <p:nvSpPr>
+          <p:cNvPr id="3" name="Notes Placeholder 2"/>
+          <p:cNvSpPr>
+            <a:spLocks noGrp="1"/>
+          </p:cNvSpPr>
+          <p:nvPr>
+            <p:ph type="body" idx="1"/>
+          </p:nvPr>
+        </p:nvSpPr>
+        <p:spPr/>
+        <p:txBody>
+          <a:bodyPr/>
+          <a:lstStyle/>
+          <a:p>
             <a:endParaRPr lang="en-US" dirty="0"/>
           </a:p>
         </p:txBody>
@@ -1223,7 +1319,7 @@
           <a:p>
             <a:fld id="{EB44CB67-3B38-3142-A3A6-00A348D8C8B3}" type="slidenum">
               <a:rPr lang="en-US" smtClean="0"/>
-              <a:t>17</a:t>
+              <a:t>18</a:t>
             </a:fld>
             <a:endParaRPr lang="en-US"/>
           </a:p>
@@ -1389,7 +1485,7 @@
           <a:p>
             <a:fld id="{3D5FB918-36D9-FF42-B3AA-21D6BEE0D123}" type="datetimeFigureOut">
               <a:rPr lang="en-US" smtClean="0"/>
-              <a:t>4/9/20</a:t>
+              <a:t>4/22/20</a:t>
             </a:fld>
             <a:endParaRPr lang="en-US"/>
           </a:p>
@@ -1587,7 +1683,7 @@
           <a:p>
             <a:fld id="{3D5FB918-36D9-FF42-B3AA-21D6BEE0D123}" type="datetimeFigureOut">
               <a:rPr lang="en-US" smtClean="0"/>
-              <a:t>4/9/20</a:t>
+              <a:t>4/22/20</a:t>
             </a:fld>
             <a:endParaRPr lang="en-US"/>
           </a:p>
@@ -1795,7 +1891,7 @@
           <a:p>
             <a:fld id="{3D5FB918-36D9-FF42-B3AA-21D6BEE0D123}" type="datetimeFigureOut">
               <a:rPr lang="en-US" smtClean="0"/>
-              <a:t>4/9/20</a:t>
+              <a:t>4/22/20</a:t>
             </a:fld>
             <a:endParaRPr lang="en-US"/>
           </a:p>
@@ -1993,7 +2089,7 @@
           <a:p>
             <a:fld id="{3D5FB918-36D9-FF42-B3AA-21D6BEE0D123}" type="datetimeFigureOut">
               <a:rPr lang="en-US" smtClean="0"/>
-              <a:t>4/9/20</a:t>
+              <a:t>4/22/20</a:t>
             </a:fld>
             <a:endParaRPr lang="en-US"/>
           </a:p>
@@ -2268,7 +2364,7 @@
           <a:p>
             <a:fld id="{3D5FB918-36D9-FF42-B3AA-21D6BEE0D123}" type="datetimeFigureOut">
               <a:rPr lang="en-US" smtClean="0"/>
-              <a:t>4/9/20</a:t>
+              <a:t>4/22/20</a:t>
             </a:fld>
             <a:endParaRPr lang="en-US"/>
           </a:p>
@@ -2533,7 +2629,7 @@
           <a:p>
             <a:fld id="{3D5FB918-36D9-FF42-B3AA-21D6BEE0D123}" type="datetimeFigureOut">
               <a:rPr lang="en-US" smtClean="0"/>
-              <a:t>4/9/20</a:t>
+              <a:t>4/22/20</a:t>
             </a:fld>
             <a:endParaRPr lang="en-US"/>
           </a:p>
@@ -2945,7 +3041,7 @@
           <a:p>
             <a:fld id="{3D5FB918-36D9-FF42-B3AA-21D6BEE0D123}" type="datetimeFigureOut">
               <a:rPr lang="en-US" smtClean="0"/>
-              <a:t>4/9/20</a:t>
+              <a:t>4/22/20</a:t>
             </a:fld>
             <a:endParaRPr lang="en-US"/>
           </a:p>
@@ -3086,7 +3182,7 @@
           <a:p>
             <a:fld id="{3D5FB918-36D9-FF42-B3AA-21D6BEE0D123}" type="datetimeFigureOut">
               <a:rPr lang="en-US" smtClean="0"/>
-              <a:t>4/9/20</a:t>
+              <a:t>4/22/20</a:t>
             </a:fld>
             <a:endParaRPr lang="en-US"/>
           </a:p>
@@ -3199,7 +3295,7 @@
           <a:p>
             <a:fld id="{3D5FB918-36D9-FF42-B3AA-21D6BEE0D123}" type="datetimeFigureOut">
               <a:rPr lang="en-US" smtClean="0"/>
-              <a:t>4/9/20</a:t>
+              <a:t>4/22/20</a:t>
             </a:fld>
             <a:endParaRPr lang="en-US"/>
           </a:p>
@@ -3510,7 +3606,7 @@
           <a:p>
             <a:fld id="{3D5FB918-36D9-FF42-B3AA-21D6BEE0D123}" type="datetimeFigureOut">
               <a:rPr lang="en-US" smtClean="0"/>
-              <a:t>4/9/20</a:t>
+              <a:t>4/22/20</a:t>
             </a:fld>
             <a:endParaRPr lang="en-US"/>
           </a:p>
@@ -3798,7 +3894,7 @@
           <a:p>
             <a:fld id="{3D5FB918-36D9-FF42-B3AA-21D6BEE0D123}" type="datetimeFigureOut">
               <a:rPr lang="en-US" smtClean="0"/>
-              <a:t>4/9/20</a:t>
+              <a:t>4/22/20</a:t>
             </a:fld>
             <a:endParaRPr lang="en-US"/>
           </a:p>
@@ -4039,7 +4135,7 @@
           <a:p>
             <a:fld id="{3D5FB918-36D9-FF42-B3AA-21D6BEE0D123}" type="datetimeFigureOut">
               <a:rPr lang="en-US" smtClean="0"/>
-              <a:t>4/9/20</a:t>
+              <a:t>4/22/20</a:t>
             </a:fld>
             <a:endParaRPr lang="en-US"/>
           </a:p>
@@ -17279,6 +17375,2708 @@
           <a:chExt cx="0" cy="0"/>
         </a:xfrm>
       </p:grpSpPr>
+      <p:pic>
+        <p:nvPicPr>
+          <p:cNvPr id="2" name="Picture 1">
+            <a:extLst>
+              <a:ext uri="{FF2B5EF4-FFF2-40B4-BE49-F238E27FC236}">
+                <a16:creationId xmlns:a16="http://schemas.microsoft.com/office/drawing/2014/main" id="{1F29CBBD-0258-F442-8CFE-F09FFE818D11}"/>
+              </a:ext>
+            </a:extLst>
+          </p:cNvPr>
+          <p:cNvPicPr>
+            <a:picLocks noChangeAspect="1"/>
+          </p:cNvPicPr>
+          <p:nvPr/>
+        </p:nvPicPr>
+        <p:blipFill rotWithShape="1">
+          <a:blip r:embed="rId3"/>
+          <a:srcRect t="8798" r="51455" b="56701"/>
+          <a:stretch/>
+        </p:blipFill>
+        <p:spPr>
+          <a:xfrm>
+            <a:off x="0" y="0"/>
+            <a:ext cx="6645135" cy="3657600"/>
+          </a:xfrm>
+          <a:prstGeom prst="rect">
+            <a:avLst/>
+          </a:prstGeom>
+        </p:spPr>
+      </p:pic>
+      <p:cxnSp>
+        <p:nvCxnSpPr>
+          <p:cNvPr id="58" name="Straight Arrow Connector 57">
+            <a:extLst>
+              <a:ext uri="{FF2B5EF4-FFF2-40B4-BE49-F238E27FC236}">
+                <a16:creationId xmlns:a16="http://schemas.microsoft.com/office/drawing/2014/main" id="{08176597-5192-7D47-8491-94B8F1741448}"/>
+              </a:ext>
+            </a:extLst>
+          </p:cNvPr>
+          <p:cNvCxnSpPr>
+            <a:cxnSpLocks/>
+          </p:cNvCxnSpPr>
+          <p:nvPr/>
+        </p:nvCxnSpPr>
+        <p:spPr>
+          <a:xfrm flipV="1">
+            <a:off x="560318" y="2406257"/>
+            <a:ext cx="5522345" cy="1998"/>
+          </a:xfrm>
+          <a:prstGeom prst="straightConnector1">
+            <a:avLst/>
+          </a:prstGeom>
+          <a:ln w="38100">
+            <a:solidFill>
+              <a:srgbClr val="0000FF"/>
+            </a:solidFill>
+            <a:prstDash val="sysDot"/>
+            <a:tailEnd type="triangle"/>
+          </a:ln>
+        </p:spPr>
+        <p:style>
+          <a:lnRef idx="1">
+            <a:schemeClr val="accent1"/>
+          </a:lnRef>
+          <a:fillRef idx="0">
+            <a:schemeClr val="accent1"/>
+          </a:fillRef>
+          <a:effectRef idx="0">
+            <a:schemeClr val="accent1"/>
+          </a:effectRef>
+          <a:fontRef idx="minor">
+            <a:schemeClr val="tx1"/>
+          </a:fontRef>
+        </p:style>
+      </p:cxnSp>
+      <p:sp>
+        <p:nvSpPr>
+          <p:cNvPr id="5" name="5-Point Star 4">
+            <a:extLst>
+              <a:ext uri="{FF2B5EF4-FFF2-40B4-BE49-F238E27FC236}">
+                <a16:creationId xmlns:a16="http://schemas.microsoft.com/office/drawing/2014/main" id="{8DB8F06C-CAE0-2E42-8AF0-1EE4A7F4EB3C}"/>
+              </a:ext>
+            </a:extLst>
+          </p:cNvPr>
+          <p:cNvSpPr>
+            <a:spLocks noChangeAspect="1"/>
+          </p:cNvSpPr>
+          <p:nvPr/>
+        </p:nvSpPr>
+        <p:spPr>
+          <a:xfrm>
+            <a:off x="6179004" y="2145402"/>
+            <a:ext cx="365760" cy="365760"/>
+          </a:xfrm>
+          <a:prstGeom prst="star5">
+            <a:avLst/>
+          </a:prstGeom>
+          <a:solidFill>
+            <a:srgbClr val="CC79A7"/>
+          </a:solidFill>
+          <a:ln>
+            <a:solidFill>
+              <a:schemeClr val="accent1">
+                <a:lumMod val="50000"/>
+              </a:schemeClr>
+            </a:solidFill>
+          </a:ln>
+        </p:spPr>
+        <p:style>
+          <a:lnRef idx="2">
+            <a:schemeClr val="accent1">
+              <a:shade val="50000"/>
+            </a:schemeClr>
+          </a:lnRef>
+          <a:fillRef idx="1">
+            <a:schemeClr val="accent1"/>
+          </a:fillRef>
+          <a:effectRef idx="0">
+            <a:schemeClr val="accent1"/>
+          </a:effectRef>
+          <a:fontRef idx="minor">
+            <a:schemeClr val="lt1"/>
+          </a:fontRef>
+        </p:style>
+        <p:txBody>
+          <a:bodyPr rtlCol="0" anchor="ctr"/>
+          <a:lstStyle/>
+          <a:p>
+            <a:pPr algn="ctr"/>
+            <a:endParaRPr lang="en-US"/>
+          </a:p>
+        </p:txBody>
+      </p:sp>
+      <p:sp>
+        <p:nvSpPr>
+          <p:cNvPr id="9" name="TextBox 8">
+            <a:extLst>
+              <a:ext uri="{FF2B5EF4-FFF2-40B4-BE49-F238E27FC236}">
+                <a16:creationId xmlns:a16="http://schemas.microsoft.com/office/drawing/2014/main" id="{F3BE6089-08BE-A544-A310-02A323F0D7C6}"/>
+              </a:ext>
+            </a:extLst>
+          </p:cNvPr>
+          <p:cNvSpPr txBox="1"/>
+          <p:nvPr/>
+        </p:nvSpPr>
+        <p:spPr>
+          <a:xfrm>
+            <a:off x="6645135" y="2191122"/>
+            <a:ext cx="615874" cy="369332"/>
+          </a:xfrm>
+          <a:prstGeom prst="rect">
+            <a:avLst/>
+          </a:prstGeom>
+          <a:noFill/>
+        </p:spPr>
+        <p:txBody>
+          <a:bodyPr wrap="none" rtlCol="0">
+            <a:spAutoFit/>
+          </a:bodyPr>
+          <a:lstStyle/>
+          <a:p>
+            <a:r>
+              <a:rPr lang="en-US" dirty="0"/>
+              <a:t>Goal</a:t>
+            </a:r>
+          </a:p>
+        </p:txBody>
+      </p:sp>
+      <p:sp>
+        <p:nvSpPr>
+          <p:cNvPr id="12" name="TextBox 11">
+            <a:extLst>
+              <a:ext uri="{FF2B5EF4-FFF2-40B4-BE49-F238E27FC236}">
+                <a16:creationId xmlns:a16="http://schemas.microsoft.com/office/drawing/2014/main" id="{40BC0126-A564-9640-BA29-43CE3B906A09}"/>
+              </a:ext>
+            </a:extLst>
+          </p:cNvPr>
+          <p:cNvSpPr txBox="1"/>
+          <p:nvPr/>
+        </p:nvSpPr>
+        <p:spPr>
+          <a:xfrm>
+            <a:off x="3721516" y="2191122"/>
+            <a:ext cx="2037802" cy="461665"/>
+          </a:xfrm>
+          <a:prstGeom prst="rect">
+            <a:avLst/>
+          </a:prstGeom>
+          <a:noFill/>
+        </p:spPr>
+        <p:txBody>
+          <a:bodyPr wrap="none" rtlCol="0">
+            <a:spAutoFit/>
+          </a:bodyPr>
+          <a:lstStyle/>
+          <a:p>
+            <a:r>
+              <a:rPr lang="en-US" sz="2400" dirty="0">
+                <a:solidFill>
+                  <a:srgbClr val="C00000"/>
+                </a:solidFill>
+              </a:rPr>
+              <a:t>Private Offices</a:t>
+            </a:r>
+          </a:p>
+        </p:txBody>
+      </p:sp>
+      <p:grpSp>
+        <p:nvGrpSpPr>
+          <p:cNvPr id="7" name="Group 6">
+            <a:extLst>
+              <a:ext uri="{FF2B5EF4-FFF2-40B4-BE49-F238E27FC236}">
+                <a16:creationId xmlns:a16="http://schemas.microsoft.com/office/drawing/2014/main" id="{5682E90D-E132-2B45-A11C-59353BCEB32E}"/>
+              </a:ext>
+            </a:extLst>
+          </p:cNvPr>
+          <p:cNvGrpSpPr/>
+          <p:nvPr/>
+        </p:nvGrpSpPr>
+        <p:grpSpPr>
+          <a:xfrm>
+            <a:off x="2451495" y="1827350"/>
+            <a:ext cx="3336640" cy="1830249"/>
+            <a:chOff x="2451495" y="1827350"/>
+            <a:chExt cx="3336640" cy="1830249"/>
+          </a:xfrm>
+          <a:solidFill>
+            <a:srgbClr val="FF0000"/>
+          </a:solidFill>
+        </p:grpSpPr>
+        <p:sp>
+          <p:nvSpPr>
+            <p:cNvPr id="4" name="Rectangle 3">
+              <a:extLst>
+                <a:ext uri="{FF2B5EF4-FFF2-40B4-BE49-F238E27FC236}">
+                  <a16:creationId xmlns:a16="http://schemas.microsoft.com/office/drawing/2014/main" id="{60BDB631-105C-EB40-8EBF-A20C497F9FFC}"/>
+                </a:ext>
+              </a:extLst>
+            </p:cNvPr>
+            <p:cNvSpPr/>
+            <p:nvPr/>
+          </p:nvSpPr>
+          <p:spPr>
+            <a:xfrm>
+              <a:off x="2583286" y="1827350"/>
+              <a:ext cx="228600" cy="411480"/>
+            </a:xfrm>
+            <a:prstGeom prst="rect">
+              <a:avLst/>
+            </a:prstGeom>
+            <a:grpFill/>
+            <a:ln>
+              <a:noFill/>
+            </a:ln>
+          </p:spPr>
+          <p:style>
+            <a:lnRef idx="2">
+              <a:schemeClr val="accent1">
+                <a:shade val="50000"/>
+              </a:schemeClr>
+            </a:lnRef>
+            <a:fillRef idx="1">
+              <a:schemeClr val="accent1"/>
+            </a:fillRef>
+            <a:effectRef idx="0">
+              <a:schemeClr val="accent1"/>
+            </a:effectRef>
+            <a:fontRef idx="minor">
+              <a:schemeClr val="lt1"/>
+            </a:fontRef>
+          </p:style>
+          <p:txBody>
+            <a:bodyPr rtlCol="0" anchor="ctr"/>
+            <a:lstStyle/>
+            <a:p>
+              <a:pPr algn="ctr"/>
+              <a:endParaRPr lang="en-US"/>
+            </a:p>
+          </p:txBody>
+        </p:sp>
+        <p:sp>
+          <p:nvSpPr>
+            <p:cNvPr id="19" name="Rectangle 18">
+              <a:extLst>
+                <a:ext uri="{FF2B5EF4-FFF2-40B4-BE49-F238E27FC236}">
+                  <a16:creationId xmlns:a16="http://schemas.microsoft.com/office/drawing/2014/main" id="{1CDB0BD3-E905-5946-AC15-4D764AAF07B2}"/>
+                </a:ext>
+              </a:extLst>
+            </p:cNvPr>
+            <p:cNvSpPr/>
+            <p:nvPr/>
+          </p:nvSpPr>
+          <p:spPr>
+            <a:xfrm>
+              <a:off x="2901703" y="1827350"/>
+              <a:ext cx="228600" cy="411480"/>
+            </a:xfrm>
+            <a:prstGeom prst="rect">
+              <a:avLst/>
+            </a:prstGeom>
+            <a:grpFill/>
+            <a:ln>
+              <a:noFill/>
+            </a:ln>
+          </p:spPr>
+          <p:style>
+            <a:lnRef idx="2">
+              <a:schemeClr val="accent1">
+                <a:shade val="50000"/>
+              </a:schemeClr>
+            </a:lnRef>
+            <a:fillRef idx="1">
+              <a:schemeClr val="accent1"/>
+            </a:fillRef>
+            <a:effectRef idx="0">
+              <a:schemeClr val="accent1"/>
+            </a:effectRef>
+            <a:fontRef idx="minor">
+              <a:schemeClr val="lt1"/>
+            </a:fontRef>
+          </p:style>
+          <p:txBody>
+            <a:bodyPr rtlCol="0" anchor="ctr"/>
+            <a:lstStyle/>
+            <a:p>
+              <a:pPr algn="ctr"/>
+              <a:endParaRPr lang="en-US"/>
+            </a:p>
+          </p:txBody>
+        </p:sp>
+        <p:sp>
+          <p:nvSpPr>
+            <p:cNvPr id="20" name="Rectangle 19">
+              <a:extLst>
+                <a:ext uri="{FF2B5EF4-FFF2-40B4-BE49-F238E27FC236}">
+                  <a16:creationId xmlns:a16="http://schemas.microsoft.com/office/drawing/2014/main" id="{DAB96A59-984F-8348-86FC-B8C4B57C1E51}"/>
+                </a:ext>
+              </a:extLst>
+            </p:cNvPr>
+            <p:cNvSpPr/>
+            <p:nvPr/>
+          </p:nvSpPr>
+          <p:spPr>
+            <a:xfrm>
+              <a:off x="3220120" y="1827350"/>
+              <a:ext cx="228600" cy="411480"/>
+            </a:xfrm>
+            <a:prstGeom prst="rect">
+              <a:avLst/>
+            </a:prstGeom>
+            <a:grpFill/>
+            <a:ln>
+              <a:noFill/>
+            </a:ln>
+          </p:spPr>
+          <p:style>
+            <a:lnRef idx="2">
+              <a:schemeClr val="accent1">
+                <a:shade val="50000"/>
+              </a:schemeClr>
+            </a:lnRef>
+            <a:fillRef idx="1">
+              <a:schemeClr val="accent1"/>
+            </a:fillRef>
+            <a:effectRef idx="0">
+              <a:schemeClr val="accent1"/>
+            </a:effectRef>
+            <a:fontRef idx="minor">
+              <a:schemeClr val="lt1"/>
+            </a:fontRef>
+          </p:style>
+          <p:txBody>
+            <a:bodyPr rtlCol="0" anchor="ctr"/>
+            <a:lstStyle/>
+            <a:p>
+              <a:pPr algn="ctr"/>
+              <a:endParaRPr lang="en-US"/>
+            </a:p>
+          </p:txBody>
+        </p:sp>
+        <p:sp>
+          <p:nvSpPr>
+            <p:cNvPr id="21" name="Rectangle 20">
+              <a:extLst>
+                <a:ext uri="{FF2B5EF4-FFF2-40B4-BE49-F238E27FC236}">
+                  <a16:creationId xmlns:a16="http://schemas.microsoft.com/office/drawing/2014/main" id="{2B873526-8C85-E74C-8EC8-D778E59D29BA}"/>
+                </a:ext>
+              </a:extLst>
+            </p:cNvPr>
+            <p:cNvSpPr/>
+            <p:nvPr/>
+          </p:nvSpPr>
+          <p:spPr>
+            <a:xfrm>
+              <a:off x="3538537" y="1827350"/>
+              <a:ext cx="228600" cy="411480"/>
+            </a:xfrm>
+            <a:prstGeom prst="rect">
+              <a:avLst/>
+            </a:prstGeom>
+            <a:grpFill/>
+            <a:ln>
+              <a:noFill/>
+            </a:ln>
+          </p:spPr>
+          <p:style>
+            <a:lnRef idx="2">
+              <a:schemeClr val="accent1">
+                <a:shade val="50000"/>
+              </a:schemeClr>
+            </a:lnRef>
+            <a:fillRef idx="1">
+              <a:schemeClr val="accent1"/>
+            </a:fillRef>
+            <a:effectRef idx="0">
+              <a:schemeClr val="accent1"/>
+            </a:effectRef>
+            <a:fontRef idx="minor">
+              <a:schemeClr val="lt1"/>
+            </a:fontRef>
+          </p:style>
+          <p:txBody>
+            <a:bodyPr rtlCol="0" anchor="ctr"/>
+            <a:lstStyle/>
+            <a:p>
+              <a:pPr algn="ctr"/>
+              <a:endParaRPr lang="en-US"/>
+            </a:p>
+          </p:txBody>
+        </p:sp>
+        <p:sp>
+          <p:nvSpPr>
+            <p:cNvPr id="22" name="Rectangle 21">
+              <a:extLst>
+                <a:ext uri="{FF2B5EF4-FFF2-40B4-BE49-F238E27FC236}">
+                  <a16:creationId xmlns:a16="http://schemas.microsoft.com/office/drawing/2014/main" id="{568CB06F-EEE6-7240-82D5-DD634EF9511C}"/>
+                </a:ext>
+              </a:extLst>
+            </p:cNvPr>
+            <p:cNvSpPr/>
+            <p:nvPr/>
+          </p:nvSpPr>
+          <p:spPr>
+            <a:xfrm>
+              <a:off x="3856954" y="1827350"/>
+              <a:ext cx="228600" cy="411480"/>
+            </a:xfrm>
+            <a:prstGeom prst="rect">
+              <a:avLst/>
+            </a:prstGeom>
+            <a:grpFill/>
+            <a:ln>
+              <a:noFill/>
+            </a:ln>
+          </p:spPr>
+          <p:style>
+            <a:lnRef idx="2">
+              <a:schemeClr val="accent1">
+                <a:shade val="50000"/>
+              </a:schemeClr>
+            </a:lnRef>
+            <a:fillRef idx="1">
+              <a:schemeClr val="accent1"/>
+            </a:fillRef>
+            <a:effectRef idx="0">
+              <a:schemeClr val="accent1"/>
+            </a:effectRef>
+            <a:fontRef idx="minor">
+              <a:schemeClr val="lt1"/>
+            </a:fontRef>
+          </p:style>
+          <p:txBody>
+            <a:bodyPr rtlCol="0" anchor="ctr"/>
+            <a:lstStyle/>
+            <a:p>
+              <a:pPr algn="ctr"/>
+              <a:endParaRPr lang="en-US"/>
+            </a:p>
+          </p:txBody>
+        </p:sp>
+        <p:sp>
+          <p:nvSpPr>
+            <p:cNvPr id="23" name="Rectangle 22">
+              <a:extLst>
+                <a:ext uri="{FF2B5EF4-FFF2-40B4-BE49-F238E27FC236}">
+                  <a16:creationId xmlns:a16="http://schemas.microsoft.com/office/drawing/2014/main" id="{48A8790F-7865-C440-9D2A-6FAE477EA528}"/>
+                </a:ext>
+              </a:extLst>
+            </p:cNvPr>
+            <p:cNvSpPr/>
+            <p:nvPr/>
+          </p:nvSpPr>
+          <p:spPr>
+            <a:xfrm>
+              <a:off x="4175371" y="1827350"/>
+              <a:ext cx="228600" cy="411480"/>
+            </a:xfrm>
+            <a:prstGeom prst="rect">
+              <a:avLst/>
+            </a:prstGeom>
+            <a:grpFill/>
+            <a:ln>
+              <a:noFill/>
+            </a:ln>
+          </p:spPr>
+          <p:style>
+            <a:lnRef idx="2">
+              <a:schemeClr val="accent1">
+                <a:shade val="50000"/>
+              </a:schemeClr>
+            </a:lnRef>
+            <a:fillRef idx="1">
+              <a:schemeClr val="accent1"/>
+            </a:fillRef>
+            <a:effectRef idx="0">
+              <a:schemeClr val="accent1"/>
+            </a:effectRef>
+            <a:fontRef idx="minor">
+              <a:schemeClr val="lt1"/>
+            </a:fontRef>
+          </p:style>
+          <p:txBody>
+            <a:bodyPr rtlCol="0" anchor="ctr"/>
+            <a:lstStyle/>
+            <a:p>
+              <a:pPr algn="ctr"/>
+              <a:endParaRPr lang="en-US"/>
+            </a:p>
+          </p:txBody>
+        </p:sp>
+        <p:sp>
+          <p:nvSpPr>
+            <p:cNvPr id="24" name="Rectangle 23">
+              <a:extLst>
+                <a:ext uri="{FF2B5EF4-FFF2-40B4-BE49-F238E27FC236}">
+                  <a16:creationId xmlns:a16="http://schemas.microsoft.com/office/drawing/2014/main" id="{A0BBB900-D7C4-DB4B-A6EB-4EC96A1F03AA}"/>
+                </a:ext>
+              </a:extLst>
+            </p:cNvPr>
+            <p:cNvSpPr/>
+            <p:nvPr/>
+          </p:nvSpPr>
+          <p:spPr>
+            <a:xfrm>
+              <a:off x="4493788" y="1827350"/>
+              <a:ext cx="228600" cy="411480"/>
+            </a:xfrm>
+            <a:prstGeom prst="rect">
+              <a:avLst/>
+            </a:prstGeom>
+            <a:grpFill/>
+            <a:ln>
+              <a:noFill/>
+            </a:ln>
+          </p:spPr>
+          <p:style>
+            <a:lnRef idx="2">
+              <a:schemeClr val="accent1">
+                <a:shade val="50000"/>
+              </a:schemeClr>
+            </a:lnRef>
+            <a:fillRef idx="1">
+              <a:schemeClr val="accent1"/>
+            </a:fillRef>
+            <a:effectRef idx="0">
+              <a:schemeClr val="accent1"/>
+            </a:effectRef>
+            <a:fontRef idx="minor">
+              <a:schemeClr val="lt1"/>
+            </a:fontRef>
+          </p:style>
+          <p:txBody>
+            <a:bodyPr rtlCol="0" anchor="ctr"/>
+            <a:lstStyle/>
+            <a:p>
+              <a:pPr algn="ctr"/>
+              <a:endParaRPr lang="en-US"/>
+            </a:p>
+          </p:txBody>
+        </p:sp>
+        <p:sp>
+          <p:nvSpPr>
+            <p:cNvPr id="25" name="Rectangle 24">
+              <a:extLst>
+                <a:ext uri="{FF2B5EF4-FFF2-40B4-BE49-F238E27FC236}">
+                  <a16:creationId xmlns:a16="http://schemas.microsoft.com/office/drawing/2014/main" id="{2AC1DDFD-456B-854E-82AA-CA413839BD53}"/>
+                </a:ext>
+              </a:extLst>
+            </p:cNvPr>
+            <p:cNvSpPr/>
+            <p:nvPr/>
+          </p:nvSpPr>
+          <p:spPr>
+            <a:xfrm>
+              <a:off x="4812205" y="1827350"/>
+              <a:ext cx="228600" cy="411480"/>
+            </a:xfrm>
+            <a:prstGeom prst="rect">
+              <a:avLst/>
+            </a:prstGeom>
+            <a:grpFill/>
+            <a:ln>
+              <a:noFill/>
+            </a:ln>
+          </p:spPr>
+          <p:style>
+            <a:lnRef idx="2">
+              <a:schemeClr val="accent1">
+                <a:shade val="50000"/>
+              </a:schemeClr>
+            </a:lnRef>
+            <a:fillRef idx="1">
+              <a:schemeClr val="accent1"/>
+            </a:fillRef>
+            <a:effectRef idx="0">
+              <a:schemeClr val="accent1"/>
+            </a:effectRef>
+            <a:fontRef idx="minor">
+              <a:schemeClr val="lt1"/>
+            </a:fontRef>
+          </p:style>
+          <p:txBody>
+            <a:bodyPr rtlCol="0" anchor="ctr"/>
+            <a:lstStyle/>
+            <a:p>
+              <a:pPr algn="ctr"/>
+              <a:endParaRPr lang="en-US"/>
+            </a:p>
+          </p:txBody>
+        </p:sp>
+        <p:sp>
+          <p:nvSpPr>
+            <p:cNvPr id="26" name="Rectangle 25">
+              <a:extLst>
+                <a:ext uri="{FF2B5EF4-FFF2-40B4-BE49-F238E27FC236}">
+                  <a16:creationId xmlns:a16="http://schemas.microsoft.com/office/drawing/2014/main" id="{9C9559D3-34FB-894E-B9B2-70BA316390C3}"/>
+                </a:ext>
+              </a:extLst>
+            </p:cNvPr>
+            <p:cNvSpPr/>
+            <p:nvPr/>
+          </p:nvSpPr>
+          <p:spPr>
+            <a:xfrm>
+              <a:off x="2451495" y="2616629"/>
+              <a:ext cx="228600" cy="411480"/>
+            </a:xfrm>
+            <a:prstGeom prst="rect">
+              <a:avLst/>
+            </a:prstGeom>
+            <a:grpFill/>
+            <a:ln>
+              <a:noFill/>
+            </a:ln>
+          </p:spPr>
+          <p:style>
+            <a:lnRef idx="2">
+              <a:schemeClr val="accent1">
+                <a:shade val="50000"/>
+              </a:schemeClr>
+            </a:lnRef>
+            <a:fillRef idx="1">
+              <a:schemeClr val="accent1"/>
+            </a:fillRef>
+            <a:effectRef idx="0">
+              <a:schemeClr val="accent1"/>
+            </a:effectRef>
+            <a:fontRef idx="minor">
+              <a:schemeClr val="lt1"/>
+            </a:fontRef>
+          </p:style>
+          <p:txBody>
+            <a:bodyPr rtlCol="0" anchor="ctr"/>
+            <a:lstStyle/>
+            <a:p>
+              <a:pPr algn="ctr"/>
+              <a:endParaRPr lang="en-US"/>
+            </a:p>
+          </p:txBody>
+        </p:sp>
+        <p:sp>
+          <p:nvSpPr>
+            <p:cNvPr id="27" name="Rectangle 26">
+              <a:extLst>
+                <a:ext uri="{FF2B5EF4-FFF2-40B4-BE49-F238E27FC236}">
+                  <a16:creationId xmlns:a16="http://schemas.microsoft.com/office/drawing/2014/main" id="{4E1D71ED-573F-E24A-92D6-E2711EC87308}"/>
+                </a:ext>
+              </a:extLst>
+            </p:cNvPr>
+            <p:cNvSpPr/>
+            <p:nvPr/>
+          </p:nvSpPr>
+          <p:spPr>
+            <a:xfrm>
+              <a:off x="2787797" y="2616629"/>
+              <a:ext cx="342506" cy="411480"/>
+            </a:xfrm>
+            <a:prstGeom prst="rect">
+              <a:avLst/>
+            </a:prstGeom>
+            <a:grpFill/>
+            <a:ln>
+              <a:noFill/>
+            </a:ln>
+          </p:spPr>
+          <p:style>
+            <a:lnRef idx="2">
+              <a:schemeClr val="accent1">
+                <a:shade val="50000"/>
+              </a:schemeClr>
+            </a:lnRef>
+            <a:fillRef idx="1">
+              <a:schemeClr val="accent1"/>
+            </a:fillRef>
+            <a:effectRef idx="0">
+              <a:schemeClr val="accent1"/>
+            </a:effectRef>
+            <a:fontRef idx="minor">
+              <a:schemeClr val="lt1"/>
+            </a:fontRef>
+          </p:style>
+          <p:txBody>
+            <a:bodyPr rtlCol="0" anchor="ctr"/>
+            <a:lstStyle/>
+            <a:p>
+              <a:pPr algn="ctr"/>
+              <a:endParaRPr lang="en-US"/>
+            </a:p>
+          </p:txBody>
+        </p:sp>
+        <p:sp>
+          <p:nvSpPr>
+            <p:cNvPr id="28" name="Rectangle 27">
+              <a:extLst>
+                <a:ext uri="{FF2B5EF4-FFF2-40B4-BE49-F238E27FC236}">
+                  <a16:creationId xmlns:a16="http://schemas.microsoft.com/office/drawing/2014/main" id="{EA277CB1-D025-B149-9FE2-148DD0A4D7D8}"/>
+                </a:ext>
+              </a:extLst>
+            </p:cNvPr>
+            <p:cNvSpPr/>
+            <p:nvPr/>
+          </p:nvSpPr>
+          <p:spPr>
+            <a:xfrm>
+              <a:off x="3238005" y="2616629"/>
+              <a:ext cx="228600" cy="411480"/>
+            </a:xfrm>
+            <a:prstGeom prst="rect">
+              <a:avLst/>
+            </a:prstGeom>
+            <a:grpFill/>
+            <a:ln>
+              <a:noFill/>
+            </a:ln>
+          </p:spPr>
+          <p:style>
+            <a:lnRef idx="2">
+              <a:schemeClr val="accent1">
+                <a:shade val="50000"/>
+              </a:schemeClr>
+            </a:lnRef>
+            <a:fillRef idx="1">
+              <a:schemeClr val="accent1"/>
+            </a:fillRef>
+            <a:effectRef idx="0">
+              <a:schemeClr val="accent1"/>
+            </a:effectRef>
+            <a:fontRef idx="minor">
+              <a:schemeClr val="lt1"/>
+            </a:fontRef>
+          </p:style>
+          <p:txBody>
+            <a:bodyPr rtlCol="0" anchor="ctr"/>
+            <a:lstStyle/>
+            <a:p>
+              <a:pPr algn="ctr"/>
+              <a:endParaRPr lang="en-US"/>
+            </a:p>
+          </p:txBody>
+        </p:sp>
+        <p:sp>
+          <p:nvSpPr>
+            <p:cNvPr id="29" name="Rectangle 28">
+              <a:extLst>
+                <a:ext uri="{FF2B5EF4-FFF2-40B4-BE49-F238E27FC236}">
+                  <a16:creationId xmlns:a16="http://schemas.microsoft.com/office/drawing/2014/main" id="{268F5D8E-7CCB-F847-B2A8-AE63A19B5F27}"/>
+                </a:ext>
+              </a:extLst>
+            </p:cNvPr>
+            <p:cNvSpPr/>
+            <p:nvPr/>
+          </p:nvSpPr>
+          <p:spPr>
+            <a:xfrm>
+              <a:off x="3555514" y="2616629"/>
+              <a:ext cx="228600" cy="411480"/>
+            </a:xfrm>
+            <a:prstGeom prst="rect">
+              <a:avLst/>
+            </a:prstGeom>
+            <a:grpFill/>
+            <a:ln>
+              <a:noFill/>
+            </a:ln>
+          </p:spPr>
+          <p:style>
+            <a:lnRef idx="2">
+              <a:schemeClr val="accent1">
+                <a:shade val="50000"/>
+              </a:schemeClr>
+            </a:lnRef>
+            <a:fillRef idx="1">
+              <a:schemeClr val="accent1"/>
+            </a:fillRef>
+            <a:effectRef idx="0">
+              <a:schemeClr val="accent1"/>
+            </a:effectRef>
+            <a:fontRef idx="minor">
+              <a:schemeClr val="lt1"/>
+            </a:fontRef>
+          </p:style>
+          <p:txBody>
+            <a:bodyPr rtlCol="0" anchor="ctr"/>
+            <a:lstStyle/>
+            <a:p>
+              <a:pPr algn="ctr"/>
+              <a:endParaRPr lang="en-US"/>
+            </a:p>
+          </p:txBody>
+        </p:sp>
+        <p:sp>
+          <p:nvSpPr>
+            <p:cNvPr id="30" name="Rectangle 29">
+              <a:extLst>
+                <a:ext uri="{FF2B5EF4-FFF2-40B4-BE49-F238E27FC236}">
+                  <a16:creationId xmlns:a16="http://schemas.microsoft.com/office/drawing/2014/main" id="{ED00D9A8-B8D7-5E45-BF44-CB89298B8B76}"/>
+                </a:ext>
+              </a:extLst>
+            </p:cNvPr>
+            <p:cNvSpPr/>
+            <p:nvPr/>
+          </p:nvSpPr>
+          <p:spPr>
+            <a:xfrm>
+              <a:off x="3865590" y="2616629"/>
+              <a:ext cx="228600" cy="411480"/>
+            </a:xfrm>
+            <a:prstGeom prst="rect">
+              <a:avLst/>
+            </a:prstGeom>
+            <a:grpFill/>
+            <a:ln>
+              <a:noFill/>
+            </a:ln>
+          </p:spPr>
+          <p:style>
+            <a:lnRef idx="2">
+              <a:schemeClr val="accent1">
+                <a:shade val="50000"/>
+              </a:schemeClr>
+            </a:lnRef>
+            <a:fillRef idx="1">
+              <a:schemeClr val="accent1"/>
+            </a:fillRef>
+            <a:effectRef idx="0">
+              <a:schemeClr val="accent1"/>
+            </a:effectRef>
+            <a:fontRef idx="minor">
+              <a:schemeClr val="lt1"/>
+            </a:fontRef>
+          </p:style>
+          <p:txBody>
+            <a:bodyPr rtlCol="0" anchor="ctr"/>
+            <a:lstStyle/>
+            <a:p>
+              <a:pPr algn="ctr"/>
+              <a:endParaRPr lang="en-US"/>
+            </a:p>
+          </p:txBody>
+        </p:sp>
+        <p:sp>
+          <p:nvSpPr>
+            <p:cNvPr id="31" name="Rectangle 30">
+              <a:extLst>
+                <a:ext uri="{FF2B5EF4-FFF2-40B4-BE49-F238E27FC236}">
+                  <a16:creationId xmlns:a16="http://schemas.microsoft.com/office/drawing/2014/main" id="{98504C9C-5FD8-9646-A5D0-CF5951AE7535}"/>
+                </a:ext>
+              </a:extLst>
+            </p:cNvPr>
+            <p:cNvSpPr/>
+            <p:nvPr/>
+          </p:nvSpPr>
+          <p:spPr>
+            <a:xfrm>
+              <a:off x="4184816" y="2616629"/>
+              <a:ext cx="525469" cy="411480"/>
+            </a:xfrm>
+            <a:prstGeom prst="rect">
+              <a:avLst/>
+            </a:prstGeom>
+            <a:grpFill/>
+            <a:ln>
+              <a:noFill/>
+            </a:ln>
+          </p:spPr>
+          <p:style>
+            <a:lnRef idx="2">
+              <a:schemeClr val="accent1">
+                <a:shade val="50000"/>
+              </a:schemeClr>
+            </a:lnRef>
+            <a:fillRef idx="1">
+              <a:schemeClr val="accent1"/>
+            </a:fillRef>
+            <a:effectRef idx="0">
+              <a:schemeClr val="accent1"/>
+            </a:effectRef>
+            <a:fontRef idx="minor">
+              <a:schemeClr val="lt1"/>
+            </a:fontRef>
+          </p:style>
+          <p:txBody>
+            <a:bodyPr rtlCol="0" anchor="ctr"/>
+            <a:lstStyle/>
+            <a:p>
+              <a:pPr algn="ctr"/>
+              <a:endParaRPr lang="en-US"/>
+            </a:p>
+          </p:txBody>
+        </p:sp>
+        <p:sp>
+          <p:nvSpPr>
+            <p:cNvPr id="32" name="Rectangle 31">
+              <a:extLst>
+                <a:ext uri="{FF2B5EF4-FFF2-40B4-BE49-F238E27FC236}">
+                  <a16:creationId xmlns:a16="http://schemas.microsoft.com/office/drawing/2014/main" id="{32E2DDAC-7018-4B47-B9EF-DB00BD03D69B}"/>
+                </a:ext>
+              </a:extLst>
+            </p:cNvPr>
+            <p:cNvSpPr/>
+            <p:nvPr/>
+          </p:nvSpPr>
+          <p:spPr>
+            <a:xfrm>
+              <a:off x="4815976" y="2616629"/>
+              <a:ext cx="228600" cy="411480"/>
+            </a:xfrm>
+            <a:prstGeom prst="rect">
+              <a:avLst/>
+            </a:prstGeom>
+            <a:grpFill/>
+            <a:ln>
+              <a:noFill/>
+            </a:ln>
+          </p:spPr>
+          <p:style>
+            <a:lnRef idx="2">
+              <a:schemeClr val="accent1">
+                <a:shade val="50000"/>
+              </a:schemeClr>
+            </a:lnRef>
+            <a:fillRef idx="1">
+              <a:schemeClr val="accent1"/>
+            </a:fillRef>
+            <a:effectRef idx="0">
+              <a:schemeClr val="accent1"/>
+            </a:effectRef>
+            <a:fontRef idx="minor">
+              <a:schemeClr val="lt1"/>
+            </a:fontRef>
+          </p:style>
+          <p:txBody>
+            <a:bodyPr rtlCol="0" anchor="ctr"/>
+            <a:lstStyle/>
+            <a:p>
+              <a:pPr algn="ctr"/>
+              <a:endParaRPr lang="en-US"/>
+            </a:p>
+          </p:txBody>
+        </p:sp>
+        <p:sp>
+          <p:nvSpPr>
+            <p:cNvPr id="38" name="Rectangle 37">
+              <a:extLst>
+                <a:ext uri="{FF2B5EF4-FFF2-40B4-BE49-F238E27FC236}">
+                  <a16:creationId xmlns:a16="http://schemas.microsoft.com/office/drawing/2014/main" id="{1D8CD442-6D3A-0344-9777-287DBA1FB312}"/>
+                </a:ext>
+              </a:extLst>
+            </p:cNvPr>
+            <p:cNvSpPr/>
+            <p:nvPr/>
+          </p:nvSpPr>
+          <p:spPr>
+            <a:xfrm>
+              <a:off x="5212063" y="2616628"/>
+              <a:ext cx="576072" cy="1040971"/>
+            </a:xfrm>
+            <a:prstGeom prst="rect">
+              <a:avLst/>
+            </a:prstGeom>
+            <a:grpFill/>
+            <a:ln>
+              <a:noFill/>
+            </a:ln>
+          </p:spPr>
+          <p:style>
+            <a:lnRef idx="2">
+              <a:schemeClr val="accent1">
+                <a:shade val="50000"/>
+              </a:schemeClr>
+            </a:lnRef>
+            <a:fillRef idx="1">
+              <a:schemeClr val="accent1"/>
+            </a:fillRef>
+            <a:effectRef idx="0">
+              <a:schemeClr val="accent1"/>
+            </a:effectRef>
+            <a:fontRef idx="minor">
+              <a:schemeClr val="lt1"/>
+            </a:fontRef>
+          </p:style>
+          <p:txBody>
+            <a:bodyPr rtlCol="0" anchor="ctr"/>
+            <a:lstStyle/>
+            <a:p>
+              <a:pPr algn="ctr"/>
+              <a:endParaRPr lang="en-US"/>
+            </a:p>
+          </p:txBody>
+        </p:sp>
+      </p:grpSp>
+      <p:grpSp>
+        <p:nvGrpSpPr>
+          <p:cNvPr id="10" name="Group 9">
+            <a:extLst>
+              <a:ext uri="{FF2B5EF4-FFF2-40B4-BE49-F238E27FC236}">
+                <a16:creationId xmlns:a16="http://schemas.microsoft.com/office/drawing/2014/main" id="{FF0CC5F2-1DD0-844D-A19D-1FE823622158}"/>
+              </a:ext>
+            </a:extLst>
+          </p:cNvPr>
+          <p:cNvGrpSpPr/>
+          <p:nvPr/>
+        </p:nvGrpSpPr>
+        <p:grpSpPr>
+          <a:xfrm>
+            <a:off x="1220831" y="540920"/>
+            <a:ext cx="1139224" cy="2487189"/>
+            <a:chOff x="1220831" y="540920"/>
+            <a:chExt cx="1139224" cy="2487189"/>
+          </a:xfrm>
+        </p:grpSpPr>
+        <p:sp>
+          <p:nvSpPr>
+            <p:cNvPr id="34" name="Rectangle 33">
+              <a:extLst>
+                <a:ext uri="{FF2B5EF4-FFF2-40B4-BE49-F238E27FC236}">
+                  <a16:creationId xmlns:a16="http://schemas.microsoft.com/office/drawing/2014/main" id="{469395CA-2F46-704E-ADED-A8AFA90C31FE}"/>
+                </a:ext>
+              </a:extLst>
+            </p:cNvPr>
+            <p:cNvSpPr/>
+            <p:nvPr/>
+          </p:nvSpPr>
+          <p:spPr>
+            <a:xfrm>
+              <a:off x="1362906" y="540920"/>
+              <a:ext cx="370078" cy="745829"/>
+            </a:xfrm>
+            <a:prstGeom prst="rect">
+              <a:avLst/>
+            </a:prstGeom>
+            <a:solidFill>
+              <a:srgbClr val="FFFF00"/>
+            </a:solidFill>
+            <a:ln>
+              <a:noFill/>
+            </a:ln>
+          </p:spPr>
+          <p:style>
+            <a:lnRef idx="2">
+              <a:schemeClr val="accent1">
+                <a:shade val="50000"/>
+              </a:schemeClr>
+            </a:lnRef>
+            <a:fillRef idx="1">
+              <a:schemeClr val="accent1"/>
+            </a:fillRef>
+            <a:effectRef idx="0">
+              <a:schemeClr val="accent1"/>
+            </a:effectRef>
+            <a:fontRef idx="minor">
+              <a:schemeClr val="lt1"/>
+            </a:fontRef>
+          </p:style>
+          <p:txBody>
+            <a:bodyPr rtlCol="0" anchor="ctr"/>
+            <a:lstStyle/>
+            <a:p>
+              <a:pPr algn="ctr"/>
+              <a:endParaRPr lang="en-US" dirty="0"/>
+            </a:p>
+          </p:txBody>
+        </p:sp>
+        <p:sp>
+          <p:nvSpPr>
+            <p:cNvPr id="35" name="Rectangle 34">
+              <a:extLst>
+                <a:ext uri="{FF2B5EF4-FFF2-40B4-BE49-F238E27FC236}">
+                  <a16:creationId xmlns:a16="http://schemas.microsoft.com/office/drawing/2014/main" id="{862FA1C8-6173-DC42-A75A-8FBC922B0FFE}"/>
+                </a:ext>
+              </a:extLst>
+            </p:cNvPr>
+            <p:cNvSpPr/>
+            <p:nvPr/>
+          </p:nvSpPr>
+          <p:spPr>
+            <a:xfrm>
+              <a:off x="1838707" y="540920"/>
+              <a:ext cx="262213" cy="471941"/>
+            </a:xfrm>
+            <a:prstGeom prst="rect">
+              <a:avLst/>
+            </a:prstGeom>
+            <a:solidFill>
+              <a:srgbClr val="FFFF00"/>
+            </a:solidFill>
+            <a:ln>
+              <a:noFill/>
+            </a:ln>
+          </p:spPr>
+          <p:style>
+            <a:lnRef idx="2">
+              <a:schemeClr val="accent1">
+                <a:shade val="50000"/>
+              </a:schemeClr>
+            </a:lnRef>
+            <a:fillRef idx="1">
+              <a:schemeClr val="accent1"/>
+            </a:fillRef>
+            <a:effectRef idx="0">
+              <a:schemeClr val="accent1"/>
+            </a:effectRef>
+            <a:fontRef idx="minor">
+              <a:schemeClr val="lt1"/>
+            </a:fontRef>
+          </p:style>
+          <p:txBody>
+            <a:bodyPr rtlCol="0" anchor="ctr"/>
+            <a:lstStyle/>
+            <a:p>
+              <a:pPr algn="ctr"/>
+              <a:endParaRPr lang="en-US"/>
+            </a:p>
+          </p:txBody>
+        </p:sp>
+        <p:sp>
+          <p:nvSpPr>
+            <p:cNvPr id="40" name="Rectangle 39">
+              <a:extLst>
+                <a:ext uri="{FF2B5EF4-FFF2-40B4-BE49-F238E27FC236}">
+                  <a16:creationId xmlns:a16="http://schemas.microsoft.com/office/drawing/2014/main" id="{BB00ECA9-1A76-7040-8814-290A5D9953BA}"/>
+                </a:ext>
+              </a:extLst>
+            </p:cNvPr>
+            <p:cNvSpPr/>
+            <p:nvPr/>
+          </p:nvSpPr>
+          <p:spPr>
+            <a:xfrm>
+              <a:off x="1349679" y="2616629"/>
+              <a:ext cx="274320" cy="411480"/>
+            </a:xfrm>
+            <a:prstGeom prst="rect">
+              <a:avLst/>
+            </a:prstGeom>
+            <a:solidFill>
+              <a:srgbClr val="FFFF00"/>
+            </a:solidFill>
+            <a:ln>
+              <a:noFill/>
+            </a:ln>
+          </p:spPr>
+          <p:style>
+            <a:lnRef idx="2">
+              <a:schemeClr val="accent1">
+                <a:shade val="50000"/>
+              </a:schemeClr>
+            </a:lnRef>
+            <a:fillRef idx="1">
+              <a:schemeClr val="accent1"/>
+            </a:fillRef>
+            <a:effectRef idx="0">
+              <a:schemeClr val="accent1"/>
+            </a:effectRef>
+            <a:fontRef idx="minor">
+              <a:schemeClr val="lt1"/>
+            </a:fontRef>
+          </p:style>
+          <p:txBody>
+            <a:bodyPr rtlCol="0" anchor="ctr"/>
+            <a:lstStyle/>
+            <a:p>
+              <a:pPr algn="ctr"/>
+              <a:endParaRPr lang="en-US"/>
+            </a:p>
+          </p:txBody>
+        </p:sp>
+        <p:sp>
+          <p:nvSpPr>
+            <p:cNvPr id="41" name="Rectangle 40">
+              <a:extLst>
+                <a:ext uri="{FF2B5EF4-FFF2-40B4-BE49-F238E27FC236}">
+                  <a16:creationId xmlns:a16="http://schemas.microsoft.com/office/drawing/2014/main" id="{8C1B92E1-845F-0546-A990-63E214FF03D3}"/>
+                </a:ext>
+              </a:extLst>
+            </p:cNvPr>
+            <p:cNvSpPr/>
+            <p:nvPr/>
+          </p:nvSpPr>
+          <p:spPr>
+            <a:xfrm>
+              <a:off x="1646039" y="2616629"/>
+              <a:ext cx="274320" cy="411480"/>
+            </a:xfrm>
+            <a:prstGeom prst="rect">
+              <a:avLst/>
+            </a:prstGeom>
+            <a:solidFill>
+              <a:srgbClr val="FFFF00"/>
+            </a:solidFill>
+            <a:ln>
+              <a:noFill/>
+            </a:ln>
+          </p:spPr>
+          <p:style>
+            <a:lnRef idx="2">
+              <a:schemeClr val="accent1">
+                <a:shade val="50000"/>
+              </a:schemeClr>
+            </a:lnRef>
+            <a:fillRef idx="1">
+              <a:schemeClr val="accent1"/>
+            </a:fillRef>
+            <a:effectRef idx="0">
+              <a:schemeClr val="accent1"/>
+            </a:effectRef>
+            <a:fontRef idx="minor">
+              <a:schemeClr val="lt1"/>
+            </a:fontRef>
+          </p:style>
+          <p:txBody>
+            <a:bodyPr rtlCol="0" anchor="ctr"/>
+            <a:lstStyle/>
+            <a:p>
+              <a:pPr algn="ctr"/>
+              <a:endParaRPr lang="en-US"/>
+            </a:p>
+          </p:txBody>
+        </p:sp>
+        <p:sp>
+          <p:nvSpPr>
+            <p:cNvPr id="42" name="Rectangle 41">
+              <a:extLst>
+                <a:ext uri="{FF2B5EF4-FFF2-40B4-BE49-F238E27FC236}">
+                  <a16:creationId xmlns:a16="http://schemas.microsoft.com/office/drawing/2014/main" id="{14F4E382-854C-7B42-930E-3B943EE92EDA}"/>
+                </a:ext>
+              </a:extLst>
+            </p:cNvPr>
+            <p:cNvSpPr/>
+            <p:nvPr/>
+          </p:nvSpPr>
+          <p:spPr>
+            <a:xfrm>
+              <a:off x="1980340" y="2616629"/>
+              <a:ext cx="379715" cy="411480"/>
+            </a:xfrm>
+            <a:prstGeom prst="rect">
+              <a:avLst/>
+            </a:prstGeom>
+            <a:solidFill>
+              <a:srgbClr val="FFFF00"/>
+            </a:solidFill>
+            <a:ln>
+              <a:noFill/>
+            </a:ln>
+          </p:spPr>
+          <p:style>
+            <a:lnRef idx="2">
+              <a:schemeClr val="accent1">
+                <a:shade val="50000"/>
+              </a:schemeClr>
+            </a:lnRef>
+            <a:fillRef idx="1">
+              <a:schemeClr val="accent1"/>
+            </a:fillRef>
+            <a:effectRef idx="0">
+              <a:schemeClr val="accent1"/>
+            </a:effectRef>
+            <a:fontRef idx="minor">
+              <a:schemeClr val="lt1"/>
+            </a:fontRef>
+          </p:style>
+          <p:txBody>
+            <a:bodyPr rtlCol="0" anchor="ctr"/>
+            <a:lstStyle/>
+            <a:p>
+              <a:pPr algn="ctr"/>
+              <a:endParaRPr lang="en-US"/>
+            </a:p>
+          </p:txBody>
+        </p:sp>
+        <p:sp>
+          <p:nvSpPr>
+            <p:cNvPr id="8" name="Rectangle 7">
+              <a:extLst>
+                <a:ext uri="{FF2B5EF4-FFF2-40B4-BE49-F238E27FC236}">
+                  <a16:creationId xmlns:a16="http://schemas.microsoft.com/office/drawing/2014/main" id="{53879360-8F14-0B47-9F96-B8E029B41AE5}"/>
+                </a:ext>
+              </a:extLst>
+            </p:cNvPr>
+            <p:cNvSpPr/>
+            <p:nvPr/>
+          </p:nvSpPr>
+          <p:spPr>
+            <a:xfrm>
+              <a:off x="1519790" y="1348230"/>
+              <a:ext cx="740197" cy="368002"/>
+            </a:xfrm>
+            <a:prstGeom prst="rect">
+              <a:avLst/>
+            </a:prstGeom>
+            <a:solidFill>
+              <a:srgbClr val="FFFF00"/>
+            </a:solidFill>
+            <a:ln>
+              <a:noFill/>
+            </a:ln>
+          </p:spPr>
+          <p:style>
+            <a:lnRef idx="2">
+              <a:schemeClr val="accent1">
+                <a:shade val="50000"/>
+              </a:schemeClr>
+            </a:lnRef>
+            <a:fillRef idx="1">
+              <a:schemeClr val="accent1"/>
+            </a:fillRef>
+            <a:effectRef idx="0">
+              <a:schemeClr val="accent1"/>
+            </a:effectRef>
+            <a:fontRef idx="minor">
+              <a:schemeClr val="lt1"/>
+            </a:fontRef>
+          </p:style>
+          <p:txBody>
+            <a:bodyPr rtlCol="0" anchor="ctr"/>
+            <a:lstStyle/>
+            <a:p>
+              <a:pPr algn="ctr"/>
+              <a:endParaRPr lang="en-US"/>
+            </a:p>
+          </p:txBody>
+        </p:sp>
+        <p:sp>
+          <p:nvSpPr>
+            <p:cNvPr id="57" name="Rectangle 56">
+              <a:extLst>
+                <a:ext uri="{FF2B5EF4-FFF2-40B4-BE49-F238E27FC236}">
+                  <a16:creationId xmlns:a16="http://schemas.microsoft.com/office/drawing/2014/main" id="{FCB9FD27-6914-0E47-A681-CCB6A24112CA}"/>
+                </a:ext>
+              </a:extLst>
+            </p:cNvPr>
+            <p:cNvSpPr/>
+            <p:nvPr/>
+          </p:nvSpPr>
+          <p:spPr>
+            <a:xfrm>
+              <a:off x="1220831" y="1819144"/>
+              <a:ext cx="1039156" cy="368002"/>
+            </a:xfrm>
+            <a:prstGeom prst="rect">
+              <a:avLst/>
+            </a:prstGeom>
+            <a:solidFill>
+              <a:srgbClr val="FFFF00"/>
+            </a:solidFill>
+            <a:ln>
+              <a:noFill/>
+            </a:ln>
+          </p:spPr>
+          <p:style>
+            <a:lnRef idx="2">
+              <a:schemeClr val="accent1">
+                <a:shade val="50000"/>
+              </a:schemeClr>
+            </a:lnRef>
+            <a:fillRef idx="1">
+              <a:schemeClr val="accent1"/>
+            </a:fillRef>
+            <a:effectRef idx="0">
+              <a:schemeClr val="accent1"/>
+            </a:effectRef>
+            <a:fontRef idx="minor">
+              <a:schemeClr val="lt1"/>
+            </a:fontRef>
+          </p:style>
+          <p:txBody>
+            <a:bodyPr rtlCol="0" anchor="ctr"/>
+            <a:lstStyle/>
+            <a:p>
+              <a:pPr algn="ctr"/>
+              <a:endParaRPr lang="en-US"/>
+            </a:p>
+          </p:txBody>
+        </p:sp>
+      </p:grpSp>
+      <p:sp>
+        <p:nvSpPr>
+          <p:cNvPr id="11" name="TextBox 10">
+            <a:extLst>
+              <a:ext uri="{FF2B5EF4-FFF2-40B4-BE49-F238E27FC236}">
+                <a16:creationId xmlns:a16="http://schemas.microsoft.com/office/drawing/2014/main" id="{810DCE5D-F69B-BB40-B676-3E25093E32A6}"/>
+              </a:ext>
+            </a:extLst>
+          </p:cNvPr>
+          <p:cNvSpPr txBox="1"/>
+          <p:nvPr/>
+        </p:nvSpPr>
+        <p:spPr>
+          <a:xfrm>
+            <a:off x="1470068" y="1305903"/>
+            <a:ext cx="906017" cy="461665"/>
+          </a:xfrm>
+          <a:prstGeom prst="rect">
+            <a:avLst/>
+          </a:prstGeom>
+          <a:noFill/>
+        </p:spPr>
+        <p:txBody>
+          <a:bodyPr wrap="none" rtlCol="0">
+            <a:spAutoFit/>
+          </a:bodyPr>
+          <a:lstStyle/>
+          <a:p>
+            <a:r>
+              <a:rPr lang="en-US" sz="2400" dirty="0">
+                <a:solidFill>
+                  <a:schemeClr val="accent4">
+                    <a:lumMod val="75000"/>
+                  </a:schemeClr>
+                </a:solidFill>
+              </a:rPr>
+              <a:t>Semi-</a:t>
+            </a:r>
+          </a:p>
+        </p:txBody>
+      </p:sp>
+      <p:sp>
+        <p:nvSpPr>
+          <p:cNvPr id="71" name="TextBox 70">
+            <a:extLst>
+              <a:ext uri="{FF2B5EF4-FFF2-40B4-BE49-F238E27FC236}">
+                <a16:creationId xmlns:a16="http://schemas.microsoft.com/office/drawing/2014/main" id="{DCD38A44-3E14-154F-89D8-8E16157F82F1}"/>
+              </a:ext>
+            </a:extLst>
+          </p:cNvPr>
+          <p:cNvSpPr txBox="1"/>
+          <p:nvPr/>
+        </p:nvSpPr>
+        <p:spPr>
+          <a:xfrm>
+            <a:off x="1306049" y="1796304"/>
+            <a:ext cx="1082412" cy="461665"/>
+          </a:xfrm>
+          <a:prstGeom prst="rect">
+            <a:avLst/>
+          </a:prstGeom>
+          <a:noFill/>
+        </p:spPr>
+        <p:txBody>
+          <a:bodyPr wrap="none" rtlCol="0">
+            <a:spAutoFit/>
+          </a:bodyPr>
+          <a:lstStyle/>
+          <a:p>
+            <a:r>
+              <a:rPr lang="en-US" sz="2400" dirty="0">
+                <a:solidFill>
+                  <a:schemeClr val="accent4">
+                    <a:lumMod val="75000"/>
+                  </a:schemeClr>
+                </a:solidFill>
+              </a:rPr>
+              <a:t>Private</a:t>
+            </a:r>
+          </a:p>
+        </p:txBody>
+      </p:sp>
+      <p:grpSp>
+        <p:nvGrpSpPr>
+          <p:cNvPr id="6" name="Group 5">
+            <a:extLst>
+              <a:ext uri="{FF2B5EF4-FFF2-40B4-BE49-F238E27FC236}">
+                <a16:creationId xmlns:a16="http://schemas.microsoft.com/office/drawing/2014/main" id="{E2B11991-59D1-144F-998D-2F11433B9701}"/>
+              </a:ext>
+            </a:extLst>
+          </p:cNvPr>
+          <p:cNvGrpSpPr/>
+          <p:nvPr/>
+        </p:nvGrpSpPr>
+        <p:grpSpPr>
+          <a:xfrm>
+            <a:off x="3359575" y="0"/>
+            <a:ext cx="1757917" cy="1127866"/>
+            <a:chOff x="3359575" y="0"/>
+            <a:chExt cx="1757917" cy="1127866"/>
+          </a:xfrm>
+        </p:grpSpPr>
+        <p:grpSp>
+          <p:nvGrpSpPr>
+            <p:cNvPr id="43" name="Group 42">
+              <a:extLst>
+                <a:ext uri="{FF2B5EF4-FFF2-40B4-BE49-F238E27FC236}">
+                  <a16:creationId xmlns:a16="http://schemas.microsoft.com/office/drawing/2014/main" id="{DEA436B5-5E07-364A-A051-CF0B90BCDC13}"/>
+                </a:ext>
+              </a:extLst>
+            </p:cNvPr>
+            <p:cNvGrpSpPr/>
+            <p:nvPr/>
+          </p:nvGrpSpPr>
+          <p:grpSpPr>
+            <a:xfrm>
+              <a:off x="4404041" y="832825"/>
+              <a:ext cx="365760" cy="295041"/>
+              <a:chOff x="7803055" y="2574583"/>
+              <a:chExt cx="365760" cy="295041"/>
+            </a:xfrm>
+          </p:grpSpPr>
+          <p:sp>
+            <p:nvSpPr>
+              <p:cNvPr id="44" name="Cube 43">
+                <a:extLst>
+                  <a:ext uri="{FF2B5EF4-FFF2-40B4-BE49-F238E27FC236}">
+                    <a16:creationId xmlns:a16="http://schemas.microsoft.com/office/drawing/2014/main" id="{D4F7C08F-5707-4D49-99FC-BA152B7707FB}"/>
+                  </a:ext>
+                </a:extLst>
+              </p:cNvPr>
+              <p:cNvSpPr>
+                <a:spLocks noChangeAspect="1"/>
+              </p:cNvSpPr>
+              <p:nvPr/>
+            </p:nvSpPr>
+            <p:spPr>
+              <a:xfrm>
+                <a:off x="7803055" y="2686744"/>
+                <a:ext cx="182880" cy="182880"/>
+              </a:xfrm>
+              <a:prstGeom prst="cube">
+                <a:avLst/>
+              </a:prstGeom>
+              <a:solidFill>
+                <a:schemeClr val="accent4">
+                  <a:lumMod val="75000"/>
+                </a:schemeClr>
+              </a:solidFill>
+              <a:ln>
+                <a:solidFill>
+                  <a:schemeClr val="tx1"/>
+                </a:solidFill>
+              </a:ln>
+            </p:spPr>
+            <p:style>
+              <a:lnRef idx="2">
+                <a:schemeClr val="accent1">
+                  <a:shade val="50000"/>
+                </a:schemeClr>
+              </a:lnRef>
+              <a:fillRef idx="1">
+                <a:schemeClr val="accent1"/>
+              </a:fillRef>
+              <a:effectRef idx="0">
+                <a:schemeClr val="accent1"/>
+              </a:effectRef>
+              <a:fontRef idx="minor">
+                <a:schemeClr val="lt1"/>
+              </a:fontRef>
+            </p:style>
+            <p:txBody>
+              <a:bodyPr rtlCol="0" anchor="ctr"/>
+              <a:lstStyle/>
+              <a:p>
+                <a:pPr algn="ctr"/>
+                <a:endParaRPr lang="en-US"/>
+              </a:p>
+            </p:txBody>
+          </p:sp>
+          <p:sp>
+            <p:nvSpPr>
+              <p:cNvPr id="45" name="Cube 44">
+                <a:extLst>
+                  <a:ext uri="{FF2B5EF4-FFF2-40B4-BE49-F238E27FC236}">
+                    <a16:creationId xmlns:a16="http://schemas.microsoft.com/office/drawing/2014/main" id="{AC526403-8B3F-4B4A-845A-E8E4CCC53956}"/>
+                  </a:ext>
+                </a:extLst>
+              </p:cNvPr>
+              <p:cNvSpPr>
+                <a:spLocks noChangeAspect="1"/>
+              </p:cNvSpPr>
+              <p:nvPr/>
+            </p:nvSpPr>
+            <p:spPr>
+              <a:xfrm>
+                <a:off x="7985935" y="2686744"/>
+                <a:ext cx="182880" cy="182880"/>
+              </a:xfrm>
+              <a:prstGeom prst="cube">
+                <a:avLst/>
+              </a:prstGeom>
+              <a:solidFill>
+                <a:schemeClr val="accent4">
+                  <a:lumMod val="75000"/>
+                </a:schemeClr>
+              </a:solidFill>
+              <a:ln>
+                <a:solidFill>
+                  <a:schemeClr val="tx1"/>
+                </a:solidFill>
+              </a:ln>
+            </p:spPr>
+            <p:style>
+              <a:lnRef idx="2">
+                <a:schemeClr val="accent1">
+                  <a:shade val="50000"/>
+                </a:schemeClr>
+              </a:lnRef>
+              <a:fillRef idx="1">
+                <a:schemeClr val="accent1"/>
+              </a:fillRef>
+              <a:effectRef idx="0">
+                <a:schemeClr val="accent1"/>
+              </a:effectRef>
+              <a:fontRef idx="minor">
+                <a:schemeClr val="lt1"/>
+              </a:fontRef>
+            </p:style>
+            <p:txBody>
+              <a:bodyPr rtlCol="0" anchor="ctr"/>
+              <a:lstStyle/>
+              <a:p>
+                <a:pPr algn="ctr"/>
+                <a:endParaRPr lang="en-US"/>
+              </a:p>
+            </p:txBody>
+          </p:sp>
+          <p:sp>
+            <p:nvSpPr>
+              <p:cNvPr id="46" name="Cube 45">
+                <a:extLst>
+                  <a:ext uri="{FF2B5EF4-FFF2-40B4-BE49-F238E27FC236}">
+                    <a16:creationId xmlns:a16="http://schemas.microsoft.com/office/drawing/2014/main" id="{EFF278F7-ECD6-9C4C-B41D-7F58BDE86C47}"/>
+                  </a:ext>
+                </a:extLst>
+              </p:cNvPr>
+              <p:cNvSpPr>
+                <a:spLocks noChangeAspect="1"/>
+              </p:cNvSpPr>
+              <p:nvPr/>
+            </p:nvSpPr>
+            <p:spPr>
+              <a:xfrm>
+                <a:off x="7803055" y="2574583"/>
+                <a:ext cx="182880" cy="182880"/>
+              </a:xfrm>
+              <a:prstGeom prst="cube">
+                <a:avLst/>
+              </a:prstGeom>
+              <a:solidFill>
+                <a:schemeClr val="accent4">
+                  <a:lumMod val="75000"/>
+                </a:schemeClr>
+              </a:solidFill>
+              <a:ln>
+                <a:solidFill>
+                  <a:schemeClr val="tx1"/>
+                </a:solidFill>
+              </a:ln>
+            </p:spPr>
+            <p:style>
+              <a:lnRef idx="2">
+                <a:schemeClr val="accent1">
+                  <a:shade val="50000"/>
+                </a:schemeClr>
+              </a:lnRef>
+              <a:fillRef idx="1">
+                <a:schemeClr val="accent1"/>
+              </a:fillRef>
+              <a:effectRef idx="0">
+                <a:schemeClr val="accent1"/>
+              </a:effectRef>
+              <a:fontRef idx="minor">
+                <a:schemeClr val="lt1"/>
+              </a:fontRef>
+            </p:style>
+            <p:txBody>
+              <a:bodyPr rtlCol="0" anchor="ctr"/>
+              <a:lstStyle/>
+              <a:p>
+                <a:pPr algn="ctr"/>
+                <a:endParaRPr lang="en-US"/>
+              </a:p>
+            </p:txBody>
+          </p:sp>
+          <p:sp>
+            <p:nvSpPr>
+              <p:cNvPr id="47" name="Cube 46">
+                <a:extLst>
+                  <a:ext uri="{FF2B5EF4-FFF2-40B4-BE49-F238E27FC236}">
+                    <a16:creationId xmlns:a16="http://schemas.microsoft.com/office/drawing/2014/main" id="{9746346B-3169-7146-AB22-19CB6E3319D6}"/>
+                  </a:ext>
+                </a:extLst>
+              </p:cNvPr>
+              <p:cNvSpPr>
+                <a:spLocks noChangeAspect="1"/>
+              </p:cNvSpPr>
+              <p:nvPr/>
+            </p:nvSpPr>
+            <p:spPr>
+              <a:xfrm>
+                <a:off x="7985935" y="2574583"/>
+                <a:ext cx="182880" cy="182880"/>
+              </a:xfrm>
+              <a:prstGeom prst="cube">
+                <a:avLst/>
+              </a:prstGeom>
+              <a:solidFill>
+                <a:schemeClr val="accent4">
+                  <a:lumMod val="75000"/>
+                </a:schemeClr>
+              </a:solidFill>
+              <a:ln>
+                <a:solidFill>
+                  <a:schemeClr val="tx1"/>
+                </a:solidFill>
+              </a:ln>
+            </p:spPr>
+            <p:style>
+              <a:lnRef idx="2">
+                <a:schemeClr val="accent1">
+                  <a:shade val="50000"/>
+                </a:schemeClr>
+              </a:lnRef>
+              <a:fillRef idx="1">
+                <a:schemeClr val="accent1"/>
+              </a:fillRef>
+              <a:effectRef idx="0">
+                <a:schemeClr val="accent1"/>
+              </a:effectRef>
+              <a:fontRef idx="minor">
+                <a:schemeClr val="lt1"/>
+              </a:fontRef>
+            </p:style>
+            <p:txBody>
+              <a:bodyPr rtlCol="0" anchor="ctr"/>
+              <a:lstStyle/>
+              <a:p>
+                <a:pPr algn="ctr"/>
+                <a:endParaRPr lang="en-US"/>
+              </a:p>
+            </p:txBody>
+          </p:sp>
+        </p:grpSp>
+        <p:sp>
+          <p:nvSpPr>
+            <p:cNvPr id="63" name="TextBox 62">
+              <a:extLst>
+                <a:ext uri="{FF2B5EF4-FFF2-40B4-BE49-F238E27FC236}">
+                  <a16:creationId xmlns:a16="http://schemas.microsoft.com/office/drawing/2014/main" id="{4917D807-C5A1-7541-A487-B0B392AEF9DA}"/>
+                </a:ext>
+              </a:extLst>
+            </p:cNvPr>
+            <p:cNvSpPr txBox="1"/>
+            <p:nvPr/>
+          </p:nvSpPr>
+          <p:spPr>
+            <a:xfrm>
+              <a:off x="3359575" y="0"/>
+              <a:ext cx="1757917" cy="369332"/>
+            </a:xfrm>
+            <a:prstGeom prst="rect">
+              <a:avLst/>
+            </a:prstGeom>
+            <a:noFill/>
+          </p:spPr>
+          <p:txBody>
+            <a:bodyPr wrap="none" rtlCol="0">
+              <a:spAutoFit/>
+            </a:bodyPr>
+            <a:lstStyle/>
+            <a:p>
+              <a:r>
+                <a:rPr lang="en-US" dirty="0">
+                  <a:solidFill>
+                    <a:schemeClr val="accent1">
+                      <a:lumMod val="75000"/>
+                    </a:schemeClr>
+                  </a:solidFill>
+                </a:rPr>
+                <a:t>Sparse Obstacles</a:t>
+              </a:r>
+            </a:p>
+          </p:txBody>
+        </p:sp>
+        <p:cxnSp>
+          <p:nvCxnSpPr>
+            <p:cNvPr id="64" name="Curved Connector 63">
+              <a:extLst>
+                <a:ext uri="{FF2B5EF4-FFF2-40B4-BE49-F238E27FC236}">
+                  <a16:creationId xmlns:a16="http://schemas.microsoft.com/office/drawing/2014/main" id="{EE694F8E-C811-B547-AB62-D300F7FA6D2C}"/>
+                </a:ext>
+              </a:extLst>
+            </p:cNvPr>
+            <p:cNvCxnSpPr>
+              <a:cxnSpLocks/>
+              <a:stCxn id="63" idx="2"/>
+            </p:cNvCxnSpPr>
+            <p:nvPr/>
+          </p:nvCxnSpPr>
+          <p:spPr>
+            <a:xfrm rot="16200000" flipH="1">
+              <a:off x="4201254" y="406611"/>
+              <a:ext cx="463494" cy="388935"/>
+            </a:xfrm>
+            <a:prstGeom prst="curvedConnector3">
+              <a:avLst>
+                <a:gd name="adj1" fmla="val 50000"/>
+              </a:avLst>
+            </a:prstGeom>
+            <a:ln w="38100">
+              <a:solidFill>
+                <a:schemeClr val="accent1"/>
+              </a:solidFill>
+              <a:tailEnd type="triangle"/>
+            </a:ln>
+          </p:spPr>
+          <p:style>
+            <a:lnRef idx="1">
+              <a:schemeClr val="accent1"/>
+            </a:lnRef>
+            <a:fillRef idx="0">
+              <a:schemeClr val="accent1"/>
+            </a:fillRef>
+            <a:effectRef idx="0">
+              <a:schemeClr val="accent1"/>
+            </a:effectRef>
+            <a:fontRef idx="minor">
+              <a:schemeClr val="tx1"/>
+            </a:fontRef>
+          </p:style>
+        </p:cxnSp>
+      </p:grpSp>
+      <p:grpSp>
+        <p:nvGrpSpPr>
+          <p:cNvPr id="13" name="Group 12">
+            <a:extLst>
+              <a:ext uri="{FF2B5EF4-FFF2-40B4-BE49-F238E27FC236}">
+                <a16:creationId xmlns:a16="http://schemas.microsoft.com/office/drawing/2014/main" id="{EE309C1E-4B4B-8D4A-881C-B9B1D88D69E7}"/>
+              </a:ext>
+            </a:extLst>
+          </p:cNvPr>
+          <p:cNvGrpSpPr/>
+          <p:nvPr/>
+        </p:nvGrpSpPr>
+        <p:grpSpPr>
+          <a:xfrm>
+            <a:off x="2810935" y="2111215"/>
+            <a:ext cx="1906301" cy="1543966"/>
+            <a:chOff x="2810935" y="2111215"/>
+            <a:chExt cx="1906301" cy="1543966"/>
+          </a:xfrm>
+        </p:grpSpPr>
+        <p:grpSp>
+          <p:nvGrpSpPr>
+            <p:cNvPr id="48" name="Group 47">
+              <a:extLst>
+                <a:ext uri="{FF2B5EF4-FFF2-40B4-BE49-F238E27FC236}">
+                  <a16:creationId xmlns:a16="http://schemas.microsoft.com/office/drawing/2014/main" id="{0D1BB188-F0D8-9C42-8A6F-BB0E02FBABDA}"/>
+                </a:ext>
+              </a:extLst>
+            </p:cNvPr>
+            <p:cNvGrpSpPr/>
+            <p:nvPr/>
+          </p:nvGrpSpPr>
+          <p:grpSpPr>
+            <a:xfrm>
+              <a:off x="2810935" y="2111215"/>
+              <a:ext cx="731520" cy="295041"/>
+              <a:chOff x="9699621" y="3380438"/>
+              <a:chExt cx="731520" cy="295041"/>
+            </a:xfrm>
+          </p:grpSpPr>
+          <p:sp>
+            <p:nvSpPr>
+              <p:cNvPr id="49" name="Cube 48">
+                <a:extLst>
+                  <a:ext uri="{FF2B5EF4-FFF2-40B4-BE49-F238E27FC236}">
+                    <a16:creationId xmlns:a16="http://schemas.microsoft.com/office/drawing/2014/main" id="{D63C733B-479C-0E4F-8D69-44A8AD582F93}"/>
+                  </a:ext>
+                </a:extLst>
+              </p:cNvPr>
+              <p:cNvSpPr>
+                <a:spLocks noChangeAspect="1"/>
+              </p:cNvSpPr>
+              <p:nvPr/>
+            </p:nvSpPr>
+            <p:spPr>
+              <a:xfrm>
+                <a:off x="9882501" y="3492599"/>
+                <a:ext cx="182880" cy="182880"/>
+              </a:xfrm>
+              <a:prstGeom prst="cube">
+                <a:avLst/>
+              </a:prstGeom>
+              <a:solidFill>
+                <a:schemeClr val="accent4">
+                  <a:lumMod val="75000"/>
+                </a:schemeClr>
+              </a:solidFill>
+              <a:ln>
+                <a:solidFill>
+                  <a:schemeClr val="tx1"/>
+                </a:solidFill>
+              </a:ln>
+            </p:spPr>
+            <p:style>
+              <a:lnRef idx="2">
+                <a:schemeClr val="accent1">
+                  <a:shade val="50000"/>
+                </a:schemeClr>
+              </a:lnRef>
+              <a:fillRef idx="1">
+                <a:schemeClr val="accent1"/>
+              </a:fillRef>
+              <a:effectRef idx="0">
+                <a:schemeClr val="accent1"/>
+              </a:effectRef>
+              <a:fontRef idx="minor">
+                <a:schemeClr val="lt1"/>
+              </a:fontRef>
+            </p:style>
+            <p:txBody>
+              <a:bodyPr rtlCol="0" anchor="ctr"/>
+              <a:lstStyle/>
+              <a:p>
+                <a:pPr algn="ctr"/>
+                <a:endParaRPr lang="en-US"/>
+              </a:p>
+            </p:txBody>
+          </p:sp>
+          <p:sp>
+            <p:nvSpPr>
+              <p:cNvPr id="50" name="Cube 49">
+                <a:extLst>
+                  <a:ext uri="{FF2B5EF4-FFF2-40B4-BE49-F238E27FC236}">
+                    <a16:creationId xmlns:a16="http://schemas.microsoft.com/office/drawing/2014/main" id="{A1C36A0A-7391-4547-95B4-9A704D4EA7FF}"/>
+                  </a:ext>
+                </a:extLst>
+              </p:cNvPr>
+              <p:cNvSpPr>
+                <a:spLocks noChangeAspect="1"/>
+              </p:cNvSpPr>
+              <p:nvPr/>
+            </p:nvSpPr>
+            <p:spPr>
+              <a:xfrm>
+                <a:off x="10065381" y="3492599"/>
+                <a:ext cx="182880" cy="182880"/>
+              </a:xfrm>
+              <a:prstGeom prst="cube">
+                <a:avLst/>
+              </a:prstGeom>
+              <a:solidFill>
+                <a:schemeClr val="accent4">
+                  <a:lumMod val="75000"/>
+                </a:schemeClr>
+              </a:solidFill>
+              <a:ln>
+                <a:solidFill>
+                  <a:schemeClr val="tx1"/>
+                </a:solidFill>
+              </a:ln>
+            </p:spPr>
+            <p:style>
+              <a:lnRef idx="2">
+                <a:schemeClr val="accent1">
+                  <a:shade val="50000"/>
+                </a:schemeClr>
+              </a:lnRef>
+              <a:fillRef idx="1">
+                <a:schemeClr val="accent1"/>
+              </a:fillRef>
+              <a:effectRef idx="0">
+                <a:schemeClr val="accent1"/>
+              </a:effectRef>
+              <a:fontRef idx="minor">
+                <a:schemeClr val="lt1"/>
+              </a:fontRef>
+            </p:style>
+            <p:txBody>
+              <a:bodyPr rtlCol="0" anchor="ctr"/>
+              <a:lstStyle/>
+              <a:p>
+                <a:pPr algn="ctr"/>
+                <a:endParaRPr lang="en-US"/>
+              </a:p>
+            </p:txBody>
+          </p:sp>
+          <p:sp>
+            <p:nvSpPr>
+              <p:cNvPr id="51" name="Cube 50">
+                <a:extLst>
+                  <a:ext uri="{FF2B5EF4-FFF2-40B4-BE49-F238E27FC236}">
+                    <a16:creationId xmlns:a16="http://schemas.microsoft.com/office/drawing/2014/main" id="{7694E954-63B8-234D-A64E-A0D757903E80}"/>
+                  </a:ext>
+                </a:extLst>
+              </p:cNvPr>
+              <p:cNvSpPr>
+                <a:spLocks noChangeAspect="1"/>
+              </p:cNvSpPr>
+              <p:nvPr/>
+            </p:nvSpPr>
+            <p:spPr>
+              <a:xfrm>
+                <a:off x="9882501" y="3380438"/>
+                <a:ext cx="182880" cy="182880"/>
+              </a:xfrm>
+              <a:prstGeom prst="cube">
+                <a:avLst/>
+              </a:prstGeom>
+              <a:solidFill>
+                <a:schemeClr val="accent4">
+                  <a:lumMod val="75000"/>
+                </a:schemeClr>
+              </a:solidFill>
+              <a:ln>
+                <a:solidFill>
+                  <a:schemeClr val="tx1"/>
+                </a:solidFill>
+              </a:ln>
+            </p:spPr>
+            <p:style>
+              <a:lnRef idx="2">
+                <a:schemeClr val="accent1">
+                  <a:shade val="50000"/>
+                </a:schemeClr>
+              </a:lnRef>
+              <a:fillRef idx="1">
+                <a:schemeClr val="accent1"/>
+              </a:fillRef>
+              <a:effectRef idx="0">
+                <a:schemeClr val="accent1"/>
+              </a:effectRef>
+              <a:fontRef idx="minor">
+                <a:schemeClr val="lt1"/>
+              </a:fontRef>
+            </p:style>
+            <p:txBody>
+              <a:bodyPr rtlCol="0" anchor="ctr"/>
+              <a:lstStyle/>
+              <a:p>
+                <a:pPr algn="ctr"/>
+                <a:endParaRPr lang="en-US"/>
+              </a:p>
+            </p:txBody>
+          </p:sp>
+          <p:sp>
+            <p:nvSpPr>
+              <p:cNvPr id="52" name="Cube 51">
+                <a:extLst>
+                  <a:ext uri="{FF2B5EF4-FFF2-40B4-BE49-F238E27FC236}">
+                    <a16:creationId xmlns:a16="http://schemas.microsoft.com/office/drawing/2014/main" id="{BC387846-E84D-1B4A-94FA-05E991AC4710}"/>
+                  </a:ext>
+                </a:extLst>
+              </p:cNvPr>
+              <p:cNvSpPr>
+                <a:spLocks noChangeAspect="1"/>
+              </p:cNvSpPr>
+              <p:nvPr/>
+            </p:nvSpPr>
+            <p:spPr>
+              <a:xfrm>
+                <a:off x="10065381" y="3380438"/>
+                <a:ext cx="182880" cy="182880"/>
+              </a:xfrm>
+              <a:prstGeom prst="cube">
+                <a:avLst/>
+              </a:prstGeom>
+              <a:solidFill>
+                <a:schemeClr val="accent4">
+                  <a:lumMod val="75000"/>
+                </a:schemeClr>
+              </a:solidFill>
+              <a:ln>
+                <a:solidFill>
+                  <a:schemeClr val="tx1"/>
+                </a:solidFill>
+              </a:ln>
+            </p:spPr>
+            <p:style>
+              <a:lnRef idx="2">
+                <a:schemeClr val="accent1">
+                  <a:shade val="50000"/>
+                </a:schemeClr>
+              </a:lnRef>
+              <a:fillRef idx="1">
+                <a:schemeClr val="accent1"/>
+              </a:fillRef>
+              <a:effectRef idx="0">
+                <a:schemeClr val="accent1"/>
+              </a:effectRef>
+              <a:fontRef idx="minor">
+                <a:schemeClr val="lt1"/>
+              </a:fontRef>
+            </p:style>
+            <p:txBody>
+              <a:bodyPr rtlCol="0" anchor="ctr"/>
+              <a:lstStyle/>
+              <a:p>
+                <a:pPr algn="ctr"/>
+                <a:endParaRPr lang="en-US"/>
+              </a:p>
+            </p:txBody>
+          </p:sp>
+          <p:sp>
+            <p:nvSpPr>
+              <p:cNvPr id="53" name="Cube 52">
+                <a:extLst>
+                  <a:ext uri="{FF2B5EF4-FFF2-40B4-BE49-F238E27FC236}">
+                    <a16:creationId xmlns:a16="http://schemas.microsoft.com/office/drawing/2014/main" id="{07DFB99B-C604-DB47-9F48-95849850B197}"/>
+                  </a:ext>
+                </a:extLst>
+              </p:cNvPr>
+              <p:cNvSpPr>
+                <a:spLocks noChangeAspect="1"/>
+              </p:cNvSpPr>
+              <p:nvPr/>
+            </p:nvSpPr>
+            <p:spPr>
+              <a:xfrm>
+                <a:off x="10248261" y="3492599"/>
+                <a:ext cx="182880" cy="182880"/>
+              </a:xfrm>
+              <a:prstGeom prst="cube">
+                <a:avLst/>
+              </a:prstGeom>
+              <a:solidFill>
+                <a:schemeClr val="accent4">
+                  <a:lumMod val="75000"/>
+                </a:schemeClr>
+              </a:solidFill>
+              <a:ln>
+                <a:solidFill>
+                  <a:schemeClr val="tx1"/>
+                </a:solidFill>
+              </a:ln>
+            </p:spPr>
+            <p:style>
+              <a:lnRef idx="2">
+                <a:schemeClr val="accent1">
+                  <a:shade val="50000"/>
+                </a:schemeClr>
+              </a:lnRef>
+              <a:fillRef idx="1">
+                <a:schemeClr val="accent1"/>
+              </a:fillRef>
+              <a:effectRef idx="0">
+                <a:schemeClr val="accent1"/>
+              </a:effectRef>
+              <a:fontRef idx="minor">
+                <a:schemeClr val="lt1"/>
+              </a:fontRef>
+            </p:style>
+            <p:txBody>
+              <a:bodyPr rtlCol="0" anchor="ctr"/>
+              <a:lstStyle/>
+              <a:p>
+                <a:pPr algn="ctr"/>
+                <a:endParaRPr lang="en-US"/>
+              </a:p>
+            </p:txBody>
+          </p:sp>
+          <p:sp>
+            <p:nvSpPr>
+              <p:cNvPr id="54" name="Cube 53">
+                <a:extLst>
+                  <a:ext uri="{FF2B5EF4-FFF2-40B4-BE49-F238E27FC236}">
+                    <a16:creationId xmlns:a16="http://schemas.microsoft.com/office/drawing/2014/main" id="{D01BB3D6-2E95-A24C-B55F-2AD88B0B431D}"/>
+                  </a:ext>
+                </a:extLst>
+              </p:cNvPr>
+              <p:cNvSpPr>
+                <a:spLocks noChangeAspect="1"/>
+              </p:cNvSpPr>
+              <p:nvPr/>
+            </p:nvSpPr>
+            <p:spPr>
+              <a:xfrm>
+                <a:off x="10248261" y="3380438"/>
+                <a:ext cx="182880" cy="182880"/>
+              </a:xfrm>
+              <a:prstGeom prst="cube">
+                <a:avLst/>
+              </a:prstGeom>
+              <a:solidFill>
+                <a:schemeClr val="accent4">
+                  <a:lumMod val="75000"/>
+                </a:schemeClr>
+              </a:solidFill>
+              <a:ln>
+                <a:solidFill>
+                  <a:schemeClr val="tx1"/>
+                </a:solidFill>
+              </a:ln>
+            </p:spPr>
+            <p:style>
+              <a:lnRef idx="2">
+                <a:schemeClr val="accent1">
+                  <a:shade val="50000"/>
+                </a:schemeClr>
+              </a:lnRef>
+              <a:fillRef idx="1">
+                <a:schemeClr val="accent1"/>
+              </a:fillRef>
+              <a:effectRef idx="0">
+                <a:schemeClr val="accent1"/>
+              </a:effectRef>
+              <a:fontRef idx="minor">
+                <a:schemeClr val="lt1"/>
+              </a:fontRef>
+            </p:style>
+            <p:txBody>
+              <a:bodyPr rtlCol="0" anchor="ctr"/>
+              <a:lstStyle/>
+              <a:p>
+                <a:pPr algn="ctr"/>
+                <a:endParaRPr lang="en-US"/>
+              </a:p>
+            </p:txBody>
+          </p:sp>
+          <p:sp>
+            <p:nvSpPr>
+              <p:cNvPr id="55" name="Cube 54">
+                <a:extLst>
+                  <a:ext uri="{FF2B5EF4-FFF2-40B4-BE49-F238E27FC236}">
+                    <a16:creationId xmlns:a16="http://schemas.microsoft.com/office/drawing/2014/main" id="{AA5864EE-D0B7-434D-9581-3882DC12C406}"/>
+                  </a:ext>
+                </a:extLst>
+              </p:cNvPr>
+              <p:cNvSpPr>
+                <a:spLocks noChangeAspect="1"/>
+              </p:cNvSpPr>
+              <p:nvPr/>
+            </p:nvSpPr>
+            <p:spPr>
+              <a:xfrm>
+                <a:off x="9699621" y="3492599"/>
+                <a:ext cx="182880" cy="182880"/>
+              </a:xfrm>
+              <a:prstGeom prst="cube">
+                <a:avLst/>
+              </a:prstGeom>
+              <a:solidFill>
+                <a:schemeClr val="accent4">
+                  <a:lumMod val="75000"/>
+                </a:schemeClr>
+              </a:solidFill>
+              <a:ln>
+                <a:solidFill>
+                  <a:schemeClr val="tx1"/>
+                </a:solidFill>
+              </a:ln>
+            </p:spPr>
+            <p:style>
+              <a:lnRef idx="2">
+                <a:schemeClr val="accent1">
+                  <a:shade val="50000"/>
+                </a:schemeClr>
+              </a:lnRef>
+              <a:fillRef idx="1">
+                <a:schemeClr val="accent1"/>
+              </a:fillRef>
+              <a:effectRef idx="0">
+                <a:schemeClr val="accent1"/>
+              </a:effectRef>
+              <a:fontRef idx="minor">
+                <a:schemeClr val="lt1"/>
+              </a:fontRef>
+            </p:style>
+            <p:txBody>
+              <a:bodyPr rtlCol="0" anchor="ctr"/>
+              <a:lstStyle/>
+              <a:p>
+                <a:pPr algn="ctr"/>
+                <a:endParaRPr lang="en-US"/>
+              </a:p>
+            </p:txBody>
+          </p:sp>
+          <p:sp>
+            <p:nvSpPr>
+              <p:cNvPr id="56" name="Cube 55">
+                <a:extLst>
+                  <a:ext uri="{FF2B5EF4-FFF2-40B4-BE49-F238E27FC236}">
+                    <a16:creationId xmlns:a16="http://schemas.microsoft.com/office/drawing/2014/main" id="{628613B1-B6C0-7B42-B616-32E3359EF3B2}"/>
+                  </a:ext>
+                </a:extLst>
+              </p:cNvPr>
+              <p:cNvSpPr>
+                <a:spLocks noChangeAspect="1"/>
+              </p:cNvSpPr>
+              <p:nvPr/>
+            </p:nvSpPr>
+            <p:spPr>
+              <a:xfrm>
+                <a:off x="9699621" y="3380438"/>
+                <a:ext cx="182880" cy="182880"/>
+              </a:xfrm>
+              <a:prstGeom prst="cube">
+                <a:avLst/>
+              </a:prstGeom>
+              <a:solidFill>
+                <a:schemeClr val="accent4">
+                  <a:lumMod val="75000"/>
+                </a:schemeClr>
+              </a:solidFill>
+              <a:ln>
+                <a:solidFill>
+                  <a:schemeClr val="tx1"/>
+                </a:solidFill>
+              </a:ln>
+            </p:spPr>
+            <p:style>
+              <a:lnRef idx="2">
+                <a:schemeClr val="accent1">
+                  <a:shade val="50000"/>
+                </a:schemeClr>
+              </a:lnRef>
+              <a:fillRef idx="1">
+                <a:schemeClr val="accent1"/>
+              </a:fillRef>
+              <a:effectRef idx="0">
+                <a:schemeClr val="accent1"/>
+              </a:effectRef>
+              <a:fontRef idx="minor">
+                <a:schemeClr val="lt1"/>
+              </a:fontRef>
+            </p:style>
+            <p:txBody>
+              <a:bodyPr rtlCol="0" anchor="ctr"/>
+              <a:lstStyle/>
+              <a:p>
+                <a:pPr algn="ctr"/>
+                <a:endParaRPr lang="en-US"/>
+              </a:p>
+            </p:txBody>
+          </p:sp>
+        </p:grpSp>
+        <p:sp>
+          <p:nvSpPr>
+            <p:cNvPr id="79" name="TextBox 78">
+              <a:extLst>
+                <a:ext uri="{FF2B5EF4-FFF2-40B4-BE49-F238E27FC236}">
+                  <a16:creationId xmlns:a16="http://schemas.microsoft.com/office/drawing/2014/main" id="{34349BBD-7F74-0E48-8895-12A6D3DCB13C}"/>
+                </a:ext>
+              </a:extLst>
+            </p:cNvPr>
+            <p:cNvSpPr txBox="1"/>
+            <p:nvPr/>
+          </p:nvSpPr>
+          <p:spPr>
+            <a:xfrm>
+              <a:off x="2993815" y="3285849"/>
+              <a:ext cx="1723421" cy="369332"/>
+            </a:xfrm>
+            <a:prstGeom prst="rect">
+              <a:avLst/>
+            </a:prstGeom>
+            <a:noFill/>
+          </p:spPr>
+          <p:txBody>
+            <a:bodyPr wrap="none" rtlCol="0">
+              <a:spAutoFit/>
+            </a:bodyPr>
+            <a:lstStyle/>
+            <a:p>
+              <a:r>
+                <a:rPr lang="en-US" dirty="0">
+                  <a:solidFill>
+                    <a:schemeClr val="accent1">
+                      <a:lumMod val="75000"/>
+                    </a:schemeClr>
+                  </a:solidFill>
+                </a:rPr>
+                <a:t>Dense Obstacles</a:t>
+              </a:r>
+            </a:p>
+          </p:txBody>
+        </p:sp>
+        <p:cxnSp>
+          <p:nvCxnSpPr>
+            <p:cNvPr id="80" name="Curved Connector 79">
+              <a:extLst>
+                <a:ext uri="{FF2B5EF4-FFF2-40B4-BE49-F238E27FC236}">
+                  <a16:creationId xmlns:a16="http://schemas.microsoft.com/office/drawing/2014/main" id="{2F899582-1278-AF49-A9FF-7CECC66357FC}"/>
+                </a:ext>
+              </a:extLst>
+            </p:cNvPr>
+            <p:cNvCxnSpPr>
+              <a:cxnSpLocks/>
+              <a:stCxn id="79" idx="0"/>
+            </p:cNvCxnSpPr>
+            <p:nvPr/>
+          </p:nvCxnSpPr>
+          <p:spPr>
+            <a:xfrm rot="16200000" flipV="1">
+              <a:off x="3104977" y="2535300"/>
+              <a:ext cx="832824" cy="668274"/>
+            </a:xfrm>
+            <a:prstGeom prst="curvedConnector3">
+              <a:avLst/>
+            </a:prstGeom>
+            <a:ln w="38100">
+              <a:solidFill>
+                <a:schemeClr val="accent1"/>
+              </a:solidFill>
+              <a:tailEnd type="triangle"/>
+            </a:ln>
+          </p:spPr>
+          <p:style>
+            <a:lnRef idx="1">
+              <a:schemeClr val="accent1"/>
+            </a:lnRef>
+            <a:fillRef idx="0">
+              <a:schemeClr val="accent1"/>
+            </a:fillRef>
+            <a:effectRef idx="0">
+              <a:schemeClr val="accent1"/>
+            </a:effectRef>
+            <a:fontRef idx="minor">
+              <a:schemeClr val="tx1"/>
+            </a:fontRef>
+          </p:style>
+        </p:cxnSp>
+      </p:grpSp>
+      <p:cxnSp>
+        <p:nvCxnSpPr>
+          <p:cNvPr id="73" name="Elbow Connector 72">
+            <a:extLst>
+              <a:ext uri="{FF2B5EF4-FFF2-40B4-BE49-F238E27FC236}">
+                <a16:creationId xmlns:a16="http://schemas.microsoft.com/office/drawing/2014/main" id="{6B073EAA-84FB-6747-8F22-2C4FF5E8AF20}"/>
+              </a:ext>
+            </a:extLst>
+          </p:cNvPr>
+          <p:cNvCxnSpPr>
+            <a:cxnSpLocks/>
+          </p:cNvCxnSpPr>
+          <p:nvPr/>
+        </p:nvCxnSpPr>
+        <p:spPr>
+          <a:xfrm flipV="1">
+            <a:off x="564762" y="1159479"/>
+            <a:ext cx="4698377" cy="1246778"/>
+          </a:xfrm>
+          <a:prstGeom prst="bentConnector3">
+            <a:avLst>
+              <a:gd name="adj1" fmla="val 39876"/>
+            </a:avLst>
+          </a:prstGeom>
+          <a:ln w="38100">
+            <a:solidFill>
+              <a:srgbClr val="00B0F0"/>
+            </a:solidFill>
+            <a:prstDash val="dash"/>
+            <a:headEnd type="none" w="med" len="med"/>
+            <a:tailEnd type="none" w="med" len="med"/>
+          </a:ln>
+        </p:spPr>
+        <p:style>
+          <a:lnRef idx="1">
+            <a:schemeClr val="accent1"/>
+          </a:lnRef>
+          <a:fillRef idx="0">
+            <a:schemeClr val="accent1"/>
+          </a:fillRef>
+          <a:effectRef idx="0">
+            <a:schemeClr val="accent1"/>
+          </a:effectRef>
+          <a:fontRef idx="minor">
+            <a:schemeClr val="tx1"/>
+          </a:fontRef>
+        </p:style>
+      </p:cxnSp>
+      <p:cxnSp>
+        <p:nvCxnSpPr>
+          <p:cNvPr id="78" name="Elbow Connector 77">
+            <a:extLst>
+              <a:ext uri="{FF2B5EF4-FFF2-40B4-BE49-F238E27FC236}">
+                <a16:creationId xmlns:a16="http://schemas.microsoft.com/office/drawing/2014/main" id="{D1D3008B-F009-034C-8877-F7A875CACE50}"/>
+              </a:ext>
+            </a:extLst>
+          </p:cNvPr>
+          <p:cNvCxnSpPr>
+            <a:cxnSpLocks/>
+          </p:cNvCxnSpPr>
+          <p:nvPr/>
+        </p:nvCxnSpPr>
+        <p:spPr>
+          <a:xfrm>
+            <a:off x="5263139" y="1159479"/>
+            <a:ext cx="1171495" cy="951736"/>
+          </a:xfrm>
+          <a:prstGeom prst="bentConnector3">
+            <a:avLst>
+              <a:gd name="adj1" fmla="val 100178"/>
+            </a:avLst>
+          </a:prstGeom>
+          <a:ln w="38100">
+            <a:solidFill>
+              <a:srgbClr val="00B0F0"/>
+            </a:solidFill>
+            <a:prstDash val="dash"/>
+            <a:tailEnd type="triangle"/>
+          </a:ln>
+        </p:spPr>
+        <p:style>
+          <a:lnRef idx="1">
+            <a:schemeClr val="accent1"/>
+          </a:lnRef>
+          <a:fillRef idx="0">
+            <a:schemeClr val="accent1"/>
+          </a:fillRef>
+          <a:effectRef idx="0">
+            <a:schemeClr val="accent1"/>
+          </a:effectRef>
+          <a:fontRef idx="minor">
+            <a:schemeClr val="tx1"/>
+          </a:fontRef>
+        </p:style>
+      </p:cxnSp>
+      <p:sp>
+        <p:nvSpPr>
+          <p:cNvPr id="72" name="TextBox 71">
+            <a:extLst>
+              <a:ext uri="{FF2B5EF4-FFF2-40B4-BE49-F238E27FC236}">
+                <a16:creationId xmlns:a16="http://schemas.microsoft.com/office/drawing/2014/main" id="{6BA6EE71-44E0-F342-BA93-B8F3CB3D5B37}"/>
+              </a:ext>
+            </a:extLst>
+          </p:cNvPr>
+          <p:cNvSpPr txBox="1"/>
+          <p:nvPr/>
+        </p:nvSpPr>
+        <p:spPr>
+          <a:xfrm>
+            <a:off x="1325669" y="2539367"/>
+            <a:ext cx="1056123" cy="461665"/>
+          </a:xfrm>
+          <a:prstGeom prst="rect">
+            <a:avLst/>
+          </a:prstGeom>
+          <a:noFill/>
+        </p:spPr>
+        <p:txBody>
+          <a:bodyPr wrap="none" rtlCol="0">
+            <a:spAutoFit/>
+          </a:bodyPr>
+          <a:lstStyle/>
+          <a:p>
+            <a:r>
+              <a:rPr lang="en-US" sz="2400" dirty="0">
+                <a:solidFill>
+                  <a:schemeClr val="accent4">
+                    <a:lumMod val="75000"/>
+                  </a:schemeClr>
+                </a:solidFill>
+              </a:rPr>
+              <a:t>Rooms</a:t>
+            </a:r>
+          </a:p>
+        </p:txBody>
+      </p:sp>
+      <p:grpSp>
+        <p:nvGrpSpPr>
+          <p:cNvPr id="74" name="Group 73">
+            <a:extLst>
+              <a:ext uri="{FF2B5EF4-FFF2-40B4-BE49-F238E27FC236}">
+                <a16:creationId xmlns:a16="http://schemas.microsoft.com/office/drawing/2014/main" id="{BDC3E5EC-FB9F-0A4F-8146-7D20479ADF4C}"/>
+              </a:ext>
+            </a:extLst>
+          </p:cNvPr>
+          <p:cNvGrpSpPr/>
+          <p:nvPr/>
+        </p:nvGrpSpPr>
+        <p:grpSpPr>
+          <a:xfrm>
+            <a:off x="32150" y="1354229"/>
+            <a:ext cx="632289" cy="1156933"/>
+            <a:chOff x="32150" y="1354229"/>
+            <a:chExt cx="632289" cy="1156933"/>
+          </a:xfrm>
+        </p:grpSpPr>
+        <p:pic>
+          <p:nvPicPr>
+            <p:cNvPr id="75" name="Picture 74">
+              <a:extLst>
+                <a:ext uri="{FF2B5EF4-FFF2-40B4-BE49-F238E27FC236}">
+                  <a16:creationId xmlns:a16="http://schemas.microsoft.com/office/drawing/2014/main" id="{47C12018-89A8-F14C-9D56-69DC26469AA0}"/>
+                </a:ext>
+              </a:extLst>
+            </p:cNvPr>
+            <p:cNvPicPr>
+              <a:picLocks noChangeAspect="1"/>
+            </p:cNvPicPr>
+            <p:nvPr/>
+          </p:nvPicPr>
+          <p:blipFill rotWithShape="1">
+            <a:blip r:embed="rId4"/>
+            <a:srcRect l="26302" t="1905" r="24095"/>
+            <a:stretch/>
+          </p:blipFill>
+          <p:spPr>
+            <a:xfrm>
+              <a:off x="133213" y="1871082"/>
+              <a:ext cx="431549" cy="640080"/>
+            </a:xfrm>
+            <a:prstGeom prst="rect">
+              <a:avLst/>
+            </a:prstGeom>
+          </p:spPr>
+        </p:pic>
+        <p:sp>
+          <p:nvSpPr>
+            <p:cNvPr id="76" name="TextBox 75">
+              <a:extLst>
+                <a:ext uri="{FF2B5EF4-FFF2-40B4-BE49-F238E27FC236}">
+                  <a16:creationId xmlns:a16="http://schemas.microsoft.com/office/drawing/2014/main" id="{32A95E6C-66FE-5343-A6E1-16FF2005F4E8}"/>
+                </a:ext>
+              </a:extLst>
+            </p:cNvPr>
+            <p:cNvSpPr txBox="1"/>
+            <p:nvPr/>
+          </p:nvSpPr>
+          <p:spPr>
+            <a:xfrm>
+              <a:off x="32150" y="1354229"/>
+              <a:ext cx="632289" cy="369332"/>
+            </a:xfrm>
+            <a:prstGeom prst="rect">
+              <a:avLst/>
+            </a:prstGeom>
+            <a:noFill/>
+          </p:spPr>
+          <p:txBody>
+            <a:bodyPr wrap="none" rtlCol="0">
+              <a:spAutoFit/>
+            </a:bodyPr>
+            <a:lstStyle/>
+            <a:p>
+              <a:r>
+                <a:rPr lang="en-US" dirty="0"/>
+                <a:t>Start</a:t>
+              </a:r>
+            </a:p>
+          </p:txBody>
+        </p:sp>
+      </p:grpSp>
+    </p:spTree>
+    <p:extLst>
+      <p:ext uri="{BB962C8B-B14F-4D97-AF65-F5344CB8AC3E}">
+        <p14:creationId xmlns:p14="http://schemas.microsoft.com/office/powerpoint/2010/main" val="1527944628"/>
+      </p:ext>
+    </p:extLst>
+  </p:cSld>
+  <p:clrMapOvr>
+    <a:masterClrMapping/>
+  </p:clrMapOvr>
+</p:sld>
+</file>
+
+<file path=ppt/slides/slide17.xml><?xml version="1.0" encoding="utf-8"?>
+<p:sld xmlns:a="http://schemas.openxmlformats.org/drawingml/2006/main" xmlns:r="http://schemas.openxmlformats.org/officeDocument/2006/relationships" xmlns:p="http://schemas.openxmlformats.org/presentationml/2006/main">
+  <p:cSld>
+    <p:spTree>
+      <p:nvGrpSpPr>
+        <p:cNvPr id="1" name=""/>
+        <p:cNvGrpSpPr/>
+        <p:nvPr/>
+      </p:nvGrpSpPr>
+      <p:grpSpPr>
+        <a:xfrm>
+          <a:off x="0" y="0"/>
+          <a:ext cx="0" cy="0"/>
+          <a:chOff x="0" y="0"/>
+          <a:chExt cx="0" cy="0"/>
+        </a:xfrm>
+      </p:grpSpPr>
       <p:sp>
         <p:nvSpPr>
           <p:cNvPr id="2" name="Title 1">
@@ -17345,7 +20143,7 @@
 </p:sld>
 </file>
 
-<file path=ppt/slides/slide17.xml><?xml version="1.0" encoding="utf-8"?>
+<file path=ppt/slides/slide18.xml><?xml version="1.0" encoding="utf-8"?>
 <p:sld xmlns:a="http://schemas.openxmlformats.org/drawingml/2006/main" xmlns:r="http://schemas.openxmlformats.org/officeDocument/2006/relationships" xmlns:p="http://schemas.openxmlformats.org/presentationml/2006/main">
   <p:cSld>
     <p:spTree>
@@ -19482,7 +22280,7 @@
 </p:sld>
 </file>
 
-<file path=ppt/slides/slide18.xml><?xml version="1.0" encoding="utf-8"?>
+<file path=ppt/slides/slide19.xml><?xml version="1.0" encoding="utf-8"?>
 <p:sld xmlns:a="http://schemas.openxmlformats.org/drawingml/2006/main" xmlns:r="http://schemas.openxmlformats.org/officeDocument/2006/relationships" xmlns:p="http://schemas.openxmlformats.org/presentationml/2006/main">
   <p:cSld>
     <p:spTree>
@@ -21408,7 +24206,66 @@
 </p:sld>
 </file>
 
-<file path=ppt/slides/slide19.xml><?xml version="1.0" encoding="utf-8"?>
+<file path=ppt/slides/slide2.xml><?xml version="1.0" encoding="utf-8"?>
+<p:sld xmlns:a="http://schemas.openxmlformats.org/drawingml/2006/main" xmlns:r="http://schemas.openxmlformats.org/officeDocument/2006/relationships" xmlns:p="http://schemas.openxmlformats.org/presentationml/2006/main">
+  <p:cSld>
+    <p:spTree>
+      <p:nvGrpSpPr>
+        <p:cNvPr id="1" name=""/>
+        <p:cNvGrpSpPr/>
+        <p:nvPr/>
+      </p:nvGrpSpPr>
+      <p:grpSpPr>
+        <a:xfrm>
+          <a:off x="0" y="0"/>
+          <a:ext cx="0" cy="0"/>
+          <a:chOff x="0" y="0"/>
+          <a:chExt cx="0" cy="0"/>
+        </a:xfrm>
+      </p:grpSpPr>
+      <p:pic>
+        <p:nvPicPr>
+          <p:cNvPr id="41" name="Picture 40">
+            <a:extLst>
+              <a:ext uri="{FF2B5EF4-FFF2-40B4-BE49-F238E27FC236}">
+                <a16:creationId xmlns:a16="http://schemas.microsoft.com/office/drawing/2014/main" id="{609624A9-CCAE-924C-80B0-6648109B1D42}"/>
+              </a:ext>
+            </a:extLst>
+          </p:cNvPr>
+          <p:cNvPicPr>
+            <a:picLocks noChangeAspect="1"/>
+          </p:cNvPicPr>
+          <p:nvPr/>
+        </p:nvPicPr>
+        <p:blipFill rotWithShape="1">
+          <a:blip r:embed="rId2"/>
+          <a:srcRect t="8798" r="51455" b="56701"/>
+          <a:stretch/>
+        </p:blipFill>
+        <p:spPr>
+          <a:xfrm>
+            <a:off x="0" y="0"/>
+            <a:ext cx="6645135" cy="3657600"/>
+          </a:xfrm>
+          <a:prstGeom prst="rect">
+            <a:avLst/>
+          </a:prstGeom>
+        </p:spPr>
+      </p:pic>
+    </p:spTree>
+    <p:extLst>
+      <p:ext uri="{BB962C8B-B14F-4D97-AF65-F5344CB8AC3E}">
+        <p14:creationId xmlns:p14="http://schemas.microsoft.com/office/powerpoint/2010/main" val="3895911574"/>
+      </p:ext>
+    </p:extLst>
+  </p:cSld>
+  <p:clrMapOvr>
+    <a:masterClrMapping/>
+  </p:clrMapOvr>
+</p:sld>
+</file>
+
+<file path=ppt/slides/slide20.xml><?xml version="1.0" encoding="utf-8"?>
 <p:sld xmlns:a="http://schemas.openxmlformats.org/drawingml/2006/main" xmlns:r="http://schemas.openxmlformats.org/officeDocument/2006/relationships" xmlns:p="http://schemas.openxmlformats.org/presentationml/2006/main">
   <p:cSld>
     <p:spTree>
@@ -23635,66 +26492,7 @@
 </p:sld>
 </file>
 
-<file path=ppt/slides/slide2.xml><?xml version="1.0" encoding="utf-8"?>
-<p:sld xmlns:a="http://schemas.openxmlformats.org/drawingml/2006/main" xmlns:r="http://schemas.openxmlformats.org/officeDocument/2006/relationships" xmlns:p="http://schemas.openxmlformats.org/presentationml/2006/main">
-  <p:cSld>
-    <p:spTree>
-      <p:nvGrpSpPr>
-        <p:cNvPr id="1" name=""/>
-        <p:cNvGrpSpPr/>
-        <p:nvPr/>
-      </p:nvGrpSpPr>
-      <p:grpSpPr>
-        <a:xfrm>
-          <a:off x="0" y="0"/>
-          <a:ext cx="0" cy="0"/>
-          <a:chOff x="0" y="0"/>
-          <a:chExt cx="0" cy="0"/>
-        </a:xfrm>
-      </p:grpSpPr>
-      <p:pic>
-        <p:nvPicPr>
-          <p:cNvPr id="41" name="Picture 40">
-            <a:extLst>
-              <a:ext uri="{FF2B5EF4-FFF2-40B4-BE49-F238E27FC236}">
-                <a16:creationId xmlns:a16="http://schemas.microsoft.com/office/drawing/2014/main" id="{609624A9-CCAE-924C-80B0-6648109B1D42}"/>
-              </a:ext>
-            </a:extLst>
-          </p:cNvPr>
-          <p:cNvPicPr>
-            <a:picLocks noChangeAspect="1"/>
-          </p:cNvPicPr>
-          <p:nvPr/>
-        </p:nvPicPr>
-        <p:blipFill rotWithShape="1">
-          <a:blip r:embed="rId2"/>
-          <a:srcRect t="8798" r="51455" b="56701"/>
-          <a:stretch/>
-        </p:blipFill>
-        <p:spPr>
-          <a:xfrm>
-            <a:off x="0" y="0"/>
-            <a:ext cx="6645135" cy="3657600"/>
-          </a:xfrm>
-          <a:prstGeom prst="rect">
-            <a:avLst/>
-          </a:prstGeom>
-        </p:spPr>
-      </p:pic>
-    </p:spTree>
-    <p:extLst>
-      <p:ext uri="{BB962C8B-B14F-4D97-AF65-F5344CB8AC3E}">
-        <p14:creationId xmlns:p14="http://schemas.microsoft.com/office/powerpoint/2010/main" val="3895911574"/>
-      </p:ext>
-    </p:extLst>
-  </p:cSld>
-  <p:clrMapOvr>
-    <a:masterClrMapping/>
-  </p:clrMapOvr>
-</p:sld>
-</file>
-
-<file path=ppt/slides/slide20.xml><?xml version="1.0" encoding="utf-8"?>
+<file path=ppt/slides/slide21.xml><?xml version="1.0" encoding="utf-8"?>
 <p:sld xmlns:a="http://schemas.openxmlformats.org/drawingml/2006/main" xmlns:r="http://schemas.openxmlformats.org/officeDocument/2006/relationships" xmlns:p="http://schemas.openxmlformats.org/presentationml/2006/main">
   <p:cSld>
     <p:spTree>

</xml_diff>